<commit_message>
Fix some bugs inside the OBJ parser
</commit_message>
<xml_diff>
--- a/docs/OBJ to binary structure_20210611_V1.1.pptx
+++ b/docs/OBJ to binary structure_20210611_V1.1.pptx
@@ -10,11 +10,13 @@
     <p:sldId id="264" r:id="rId4"/>
     <p:sldId id="258" r:id="rId5"/>
     <p:sldId id="260" r:id="rId6"/>
-    <p:sldId id="261" r:id="rId7"/>
-    <p:sldId id="265" r:id="rId8"/>
-    <p:sldId id="263" r:id="rId9"/>
+    <p:sldId id="267" r:id="rId7"/>
+    <p:sldId id="261" r:id="rId8"/>
+    <p:sldId id="265" r:id="rId9"/>
     <p:sldId id="257" r:id="rId10"/>
-    <p:sldId id="259" r:id="rId11"/>
+    <p:sldId id="263" r:id="rId11"/>
+    <p:sldId id="266" r:id="rId12"/>
+    <p:sldId id="259" r:id="rId13"/>
   </p:sldIdLst>
   <p:sldSz cx="12192000" cy="6858000"/>
   <p:notesSz cx="6858000" cy="9144000"/>
@@ -270,7 +272,7 @@
           <a:p>
             <a:fld id="{B2678478-075C-4254-9D50-CE1E7AF0251E}" type="datetimeFigureOut">
               <a:rPr lang="en-US" smtClean="0"/>
-              <a:t>7/15/2021</a:t>
+              <a:t>7/23/2021</a:t>
             </a:fld>
             <a:endParaRPr lang="en-US"/>
           </a:p>
@@ -470,7 +472,7 @@
           <a:p>
             <a:fld id="{B2678478-075C-4254-9D50-CE1E7AF0251E}" type="datetimeFigureOut">
               <a:rPr lang="en-US" smtClean="0"/>
-              <a:t>7/15/2021</a:t>
+              <a:t>7/23/2021</a:t>
             </a:fld>
             <a:endParaRPr lang="en-US"/>
           </a:p>
@@ -680,7 +682,7 @@
           <a:p>
             <a:fld id="{B2678478-075C-4254-9D50-CE1E7AF0251E}" type="datetimeFigureOut">
               <a:rPr lang="en-US" smtClean="0"/>
-              <a:t>7/15/2021</a:t>
+              <a:t>7/23/2021</a:t>
             </a:fld>
             <a:endParaRPr lang="en-US"/>
           </a:p>
@@ -880,7 +882,7 @@
           <a:p>
             <a:fld id="{B2678478-075C-4254-9D50-CE1E7AF0251E}" type="datetimeFigureOut">
               <a:rPr lang="en-US" smtClean="0"/>
-              <a:t>7/15/2021</a:t>
+              <a:t>7/23/2021</a:t>
             </a:fld>
             <a:endParaRPr lang="en-US"/>
           </a:p>
@@ -1156,7 +1158,7 @@
           <a:p>
             <a:fld id="{B2678478-075C-4254-9D50-CE1E7AF0251E}" type="datetimeFigureOut">
               <a:rPr lang="en-US" smtClean="0"/>
-              <a:t>7/15/2021</a:t>
+              <a:t>7/23/2021</a:t>
             </a:fld>
             <a:endParaRPr lang="en-US"/>
           </a:p>
@@ -1424,7 +1426,7 @@
           <a:p>
             <a:fld id="{B2678478-075C-4254-9D50-CE1E7AF0251E}" type="datetimeFigureOut">
               <a:rPr lang="en-US" smtClean="0"/>
-              <a:t>7/15/2021</a:t>
+              <a:t>7/23/2021</a:t>
             </a:fld>
             <a:endParaRPr lang="en-US"/>
           </a:p>
@@ -1839,7 +1841,7 @@
           <a:p>
             <a:fld id="{B2678478-075C-4254-9D50-CE1E7AF0251E}" type="datetimeFigureOut">
               <a:rPr lang="en-US" smtClean="0"/>
-              <a:t>7/15/2021</a:t>
+              <a:t>7/23/2021</a:t>
             </a:fld>
             <a:endParaRPr lang="en-US"/>
           </a:p>
@@ -1981,7 +1983,7 @@
           <a:p>
             <a:fld id="{B2678478-075C-4254-9D50-CE1E7AF0251E}" type="datetimeFigureOut">
               <a:rPr lang="en-US" smtClean="0"/>
-              <a:t>7/15/2021</a:t>
+              <a:t>7/23/2021</a:t>
             </a:fld>
             <a:endParaRPr lang="en-US"/>
           </a:p>
@@ -2094,7 +2096,7 @@
           <a:p>
             <a:fld id="{B2678478-075C-4254-9D50-CE1E7AF0251E}" type="datetimeFigureOut">
               <a:rPr lang="en-US" smtClean="0"/>
-              <a:t>7/15/2021</a:t>
+              <a:t>7/23/2021</a:t>
             </a:fld>
             <a:endParaRPr lang="en-US"/>
           </a:p>
@@ -2407,7 +2409,7 @@
           <a:p>
             <a:fld id="{B2678478-075C-4254-9D50-CE1E7AF0251E}" type="datetimeFigureOut">
               <a:rPr lang="en-US" smtClean="0"/>
-              <a:t>7/15/2021</a:t>
+              <a:t>7/23/2021</a:t>
             </a:fld>
             <a:endParaRPr lang="en-US"/>
           </a:p>
@@ -2696,7 +2698,7 @@
           <a:p>
             <a:fld id="{B2678478-075C-4254-9D50-CE1E7AF0251E}" type="datetimeFigureOut">
               <a:rPr lang="en-US" smtClean="0"/>
-              <a:t>7/15/2021</a:t>
+              <a:t>7/23/2021</a:t>
             </a:fld>
             <a:endParaRPr lang="en-US"/>
           </a:p>
@@ -2939,7 +2941,7 @@
           <a:p>
             <a:fld id="{B2678478-075C-4254-9D50-CE1E7AF0251E}" type="datetimeFigureOut">
               <a:rPr lang="en-US" smtClean="0"/>
-              <a:t>7/15/2021</a:t>
+              <a:t>7/23/2021</a:t>
             </a:fld>
             <a:endParaRPr lang="en-US"/>
           </a:p>
@@ -3456,148 +3458,397 @@
           <a:chExt cx="0" cy="0"/>
         </a:xfrm>
       </p:grpSpPr>
-      <p:grpSp>
-        <p:nvGrpSpPr>
-          <p:cNvPr id="4" name="Gruppieren 3">
-            <a:extLst>
-              <a:ext uri="{FF2B5EF4-FFF2-40B4-BE49-F238E27FC236}">
-                <a16:creationId xmlns:a16="http://schemas.microsoft.com/office/drawing/2014/main" id="{DBC92F83-DE6B-4DD6-92B7-2BE6C40473A7}"/>
-              </a:ext>
-            </a:extLst>
-          </p:cNvPr>
-          <p:cNvGrpSpPr/>
+      <p:sp>
+        <p:nvSpPr>
+          <p:cNvPr id="4" name="Textfeld 3">
+            <a:extLst>
+              <a:ext uri="{FF2B5EF4-FFF2-40B4-BE49-F238E27FC236}">
+                <a16:creationId xmlns:a16="http://schemas.microsoft.com/office/drawing/2014/main" id="{1E6CB427-E49A-4BF4-9E5E-CD11C40C3810}"/>
+              </a:ext>
+            </a:extLst>
+          </p:cNvPr>
+          <p:cNvSpPr txBox="1"/>
           <p:nvPr/>
-        </p:nvGrpSpPr>
-        <p:grpSpPr>
-          <a:xfrm>
-            <a:off x="594978" y="780176"/>
-            <a:ext cx="4411751" cy="249831"/>
-            <a:chOff x="803187" y="1173480"/>
-            <a:chExt cx="4411751" cy="249831"/>
-          </a:xfrm>
-        </p:grpSpPr>
-        <p:sp>
-          <p:nvSpPr>
-            <p:cNvPr id="5" name="Rechteck 4">
-              <a:extLst>
-                <a:ext uri="{FF2B5EF4-FFF2-40B4-BE49-F238E27FC236}">
-                  <a16:creationId xmlns:a16="http://schemas.microsoft.com/office/drawing/2014/main" id="{198F9C39-F1A7-4A23-B118-D16883A43CCD}"/>
-                </a:ext>
-              </a:extLst>
-            </p:cNvPr>
-            <p:cNvSpPr/>
-            <p:nvPr/>
-          </p:nvSpPr>
-          <p:spPr>
-            <a:xfrm>
-              <a:off x="803187" y="1173480"/>
-              <a:ext cx="4411751" cy="249831"/>
-            </a:xfrm>
-            <a:prstGeom prst="rect">
-              <a:avLst/>
-            </a:prstGeom>
-          </p:spPr>
-          <p:style>
-            <a:lnRef idx="2">
-              <a:schemeClr val="accent1">
-                <a:shade val="50000"/>
-              </a:schemeClr>
-            </a:lnRef>
-            <a:fillRef idx="1">
-              <a:schemeClr val="accent1"/>
-            </a:fillRef>
-            <a:effectRef idx="0">
-              <a:schemeClr val="accent1"/>
-            </a:effectRef>
-            <a:fontRef idx="minor">
-              <a:schemeClr val="lt1"/>
-            </a:fontRef>
-          </p:style>
-          <p:txBody>
-            <a:bodyPr rtlCol="0" anchor="ctr"/>
-            <a:lstStyle/>
-            <a:p>
-              <a:pPr algn="ctr"/>
-              <a:r>
-                <a:rPr lang="en-US" sz="1000" dirty="0"/>
-                <a:t>Obj name</a:t>
-              </a:r>
-            </a:p>
-            <a:p>
-              <a:pPr algn="ctr"/>
-              <a:r>
-                <a:rPr lang="en-US" sz="1000" dirty="0"/>
-                <a:t>&lt;array of signed chars&gt;</a:t>
-              </a:r>
-            </a:p>
-          </p:txBody>
-        </p:sp>
-        <p:sp>
-          <p:nvSpPr>
-            <p:cNvPr id="6" name="Rechteck 5">
-              <a:extLst>
-                <a:ext uri="{FF2B5EF4-FFF2-40B4-BE49-F238E27FC236}">
-                  <a16:creationId xmlns:a16="http://schemas.microsoft.com/office/drawing/2014/main" id="{E2BD51AD-60B7-45DB-BDEC-489F947FB650}"/>
-                </a:ext>
-              </a:extLst>
-            </p:cNvPr>
-            <p:cNvSpPr/>
-            <p:nvPr/>
-          </p:nvSpPr>
-          <p:spPr>
-            <a:xfrm>
-              <a:off x="803187" y="1173480"/>
-              <a:ext cx="692238" cy="249831"/>
-            </a:xfrm>
-            <a:prstGeom prst="rect">
-              <a:avLst/>
-            </a:prstGeom>
-            <a:solidFill>
-              <a:schemeClr val="accent2"/>
-            </a:solidFill>
-          </p:spPr>
-          <p:style>
-            <a:lnRef idx="2">
-              <a:schemeClr val="accent1">
-                <a:shade val="50000"/>
-              </a:schemeClr>
-            </a:lnRef>
-            <a:fillRef idx="1">
-              <a:schemeClr val="accent1"/>
-            </a:fillRef>
-            <a:effectRef idx="0">
-              <a:schemeClr val="accent1"/>
-            </a:effectRef>
-            <a:fontRef idx="minor">
-              <a:schemeClr val="lt1"/>
-            </a:fontRef>
-          </p:style>
-          <p:txBody>
-            <a:bodyPr rtlCol="0" anchor="ctr"/>
-            <a:lstStyle/>
-            <a:p>
-              <a:pPr algn="ctr"/>
-              <a:r>
-                <a:rPr lang="en-US" sz="800" dirty="0"/>
-                <a:t>No of chars</a:t>
-              </a:r>
-              <a:br>
-                <a:rPr lang="en-US" sz="800" dirty="0"/>
-              </a:br>
-              <a:r>
-                <a:rPr lang="en-US" sz="800" dirty="0"/>
-                <a:t>&lt;short&gt;</a:t>
-              </a:r>
-            </a:p>
-          </p:txBody>
-        </p:sp>
-      </p:grpSp>
-      <p:sp>
-        <p:nvSpPr>
-          <p:cNvPr id="7" name="Inhaltsplatzhalter 2">
-            <a:extLst>
-              <a:ext uri="{FF2B5EF4-FFF2-40B4-BE49-F238E27FC236}">
-                <a16:creationId xmlns:a16="http://schemas.microsoft.com/office/drawing/2014/main" id="{54BA9101-8566-4103-B973-DD19ED2B2A83}"/>
+        </p:nvSpPr>
+        <p:spPr>
+          <a:xfrm>
+            <a:off x="243281" y="226503"/>
+            <a:ext cx="11862033" cy="369332"/>
+          </a:xfrm>
+          <a:prstGeom prst="rect">
+            <a:avLst/>
+          </a:prstGeom>
+          <a:noFill/>
+        </p:spPr>
+        <p:txBody>
+          <a:bodyPr wrap="square" rtlCol="0">
+            <a:spAutoFit/>
+          </a:bodyPr>
+          <a:lstStyle/>
+          <a:p>
+            <a:r>
+              <a:rPr lang="en-US" dirty="0"/>
+              <a:t>Known limitations: MTL structure</a:t>
+            </a:r>
+          </a:p>
+        </p:txBody>
+      </p:sp>
+      <p:sp>
+        <p:nvSpPr>
+          <p:cNvPr id="23" name="Textfeld 22">
+            <a:extLst>
+              <a:ext uri="{FF2B5EF4-FFF2-40B4-BE49-F238E27FC236}">
+                <a16:creationId xmlns:a16="http://schemas.microsoft.com/office/drawing/2014/main" id="{D4EEA3AA-84FE-4E76-B685-386FFC9EF8BD}"/>
+              </a:ext>
+            </a:extLst>
+          </p:cNvPr>
+          <p:cNvSpPr txBox="1"/>
+          <p:nvPr/>
+        </p:nvSpPr>
+        <p:spPr>
+          <a:xfrm>
+            <a:off x="243281" y="595836"/>
+            <a:ext cx="11862033" cy="3277820"/>
+          </a:xfrm>
+          <a:prstGeom prst="rect">
+            <a:avLst/>
+          </a:prstGeom>
+          <a:noFill/>
+        </p:spPr>
+        <p:txBody>
+          <a:bodyPr wrap="square" rtlCol="0">
+            <a:spAutoFit/>
+          </a:bodyPr>
+          <a:lstStyle/>
+          <a:p>
+            <a:pPr marL="342900" indent="-342900">
+              <a:buFont typeface="+mj-lt"/>
+              <a:buAutoNum type="arabicPeriod"/>
+            </a:pPr>
+            <a:r>
+              <a:rPr lang="en-US" dirty="0" err="1"/>
+              <a:t>Map_ka</a:t>
+            </a:r>
+            <a:r>
+              <a:rPr lang="en-US" dirty="0"/>
+              <a:t>, </a:t>
+            </a:r>
+            <a:r>
+              <a:rPr lang="en-US" dirty="0" err="1"/>
+              <a:t>map_kd</a:t>
+            </a:r>
+            <a:r>
+              <a:rPr lang="en-US" dirty="0"/>
+              <a:t> are supported without “options”:</a:t>
+            </a:r>
+            <a:br>
+              <a:rPr lang="en-US" dirty="0"/>
+            </a:br>
+            <a:endParaRPr lang="en-US" dirty="0"/>
+          </a:p>
+          <a:p>
+            <a:pPr marL="800100" lvl="1" indent="-342900">
+              <a:buFont typeface="Arial" panose="020B0604020202020204" pitchFamily="34" charset="0"/>
+              <a:buChar char="•"/>
+            </a:pPr>
+            <a:r>
+              <a:rPr lang="en-US" dirty="0">
+                <a:highlight>
+                  <a:srgbClr val="00FF00"/>
+                </a:highlight>
+              </a:rPr>
+              <a:t>OK</a:t>
+            </a:r>
+            <a:r>
+              <a:rPr lang="en-US" dirty="0"/>
+              <a:t> =&gt; “</a:t>
+            </a:r>
+            <a:r>
+              <a:rPr lang="en-US" i="1" dirty="0" err="1">
+                <a:solidFill>
+                  <a:schemeClr val="accent6"/>
+                </a:solidFill>
+              </a:rPr>
+              <a:t>map_Ka</a:t>
+            </a:r>
+            <a:r>
+              <a:rPr lang="en-US" i="1" dirty="0">
+                <a:solidFill>
+                  <a:schemeClr val="accent6"/>
+                </a:solidFill>
+              </a:rPr>
+              <a:t> mapfile.png</a:t>
+            </a:r>
+            <a:r>
+              <a:rPr lang="en-US" dirty="0"/>
+              <a:t>”</a:t>
+            </a:r>
+          </a:p>
+          <a:p>
+            <a:pPr marL="800100" lvl="1" indent="-342900">
+              <a:buFont typeface="Arial" panose="020B0604020202020204" pitchFamily="34" charset="0"/>
+              <a:buChar char="•"/>
+            </a:pPr>
+            <a:r>
+              <a:rPr lang="en-US" dirty="0">
+                <a:highlight>
+                  <a:srgbClr val="FF0000"/>
+                </a:highlight>
+              </a:rPr>
+              <a:t>NOK</a:t>
+            </a:r>
+            <a:r>
+              <a:rPr lang="en-US" dirty="0"/>
+              <a:t> =&gt; “</a:t>
+            </a:r>
+            <a:r>
+              <a:rPr lang="en-US" i="1" dirty="0" err="1">
+                <a:solidFill>
+                  <a:srgbClr val="FF0000"/>
+                </a:solidFill>
+              </a:rPr>
+              <a:t>map_Ka</a:t>
+            </a:r>
+            <a:r>
+              <a:rPr lang="en-US" i="1" dirty="0">
+                <a:solidFill>
+                  <a:srgbClr val="FF0000"/>
+                </a:solidFill>
+              </a:rPr>
+              <a:t> -s 1 1 1 -o 0 0 0 -mm 0 1 </a:t>
+            </a:r>
+            <a:r>
+              <a:rPr lang="en-US" i="1" dirty="0" err="1">
+                <a:solidFill>
+                  <a:srgbClr val="FF0000"/>
+                </a:solidFill>
+              </a:rPr>
+              <a:t>chrome.mpc</a:t>
+            </a:r>
+            <a:r>
+              <a:rPr lang="en-US" dirty="0"/>
+              <a:t>” (</a:t>
+            </a:r>
+            <a:r>
+              <a:rPr lang="en-US" u="sng" dirty="0"/>
+              <a:t>program will crash</a:t>
+            </a:r>
+            <a:r>
+              <a:rPr lang="en-US" dirty="0"/>
+              <a:t>!)</a:t>
+            </a:r>
+          </a:p>
+          <a:p>
+            <a:pPr marL="800100" lvl="1" indent="-342900">
+              <a:buFont typeface="Arial" panose="020B0604020202020204" pitchFamily="34" charset="0"/>
+              <a:buChar char="•"/>
+            </a:pPr>
+            <a:r>
+              <a:rPr lang="en-US" dirty="0"/>
+              <a:t>Options that are not supported (according to </a:t>
+            </a:r>
+            <a:r>
+              <a:rPr lang="en-US" dirty="0">
+                <a:hlinkClick r:id="rId2"/>
+              </a:rPr>
+              <a:t>http://paulbourke.net/dataformats/mtl/</a:t>
+            </a:r>
+            <a:r>
+              <a:rPr lang="en-US" dirty="0"/>
+              <a:t> )</a:t>
+            </a:r>
+          </a:p>
+          <a:p>
+            <a:pPr marL="1257300" lvl="2" indent="-342900">
+              <a:buFont typeface="Courier New" panose="02070309020205020404" pitchFamily="49" charset="0"/>
+              <a:buChar char="o"/>
+            </a:pPr>
+            <a:r>
+              <a:rPr lang="en-US" sz="1100" dirty="0"/>
+              <a:t>-</a:t>
+            </a:r>
+            <a:r>
+              <a:rPr lang="en-US" sz="1100" dirty="0" err="1"/>
+              <a:t>blendu</a:t>
+            </a:r>
+            <a:r>
+              <a:rPr lang="en-US" sz="1100" dirty="0"/>
+              <a:t> on | off</a:t>
+            </a:r>
+          </a:p>
+          <a:p>
+            <a:pPr marL="1257300" lvl="2" indent="-342900">
+              <a:buFont typeface="Courier New" panose="02070309020205020404" pitchFamily="49" charset="0"/>
+              <a:buChar char="o"/>
+            </a:pPr>
+            <a:r>
+              <a:rPr lang="en-US" sz="1100" dirty="0"/>
+              <a:t>-</a:t>
+            </a:r>
+            <a:r>
+              <a:rPr lang="en-US" sz="1100" dirty="0" err="1"/>
+              <a:t>blendv</a:t>
+            </a:r>
+            <a:r>
+              <a:rPr lang="en-US" sz="1100" dirty="0"/>
+              <a:t> on | off</a:t>
+            </a:r>
+          </a:p>
+          <a:p>
+            <a:pPr marL="1257300" lvl="2" indent="-342900">
+              <a:buFont typeface="Courier New" panose="02070309020205020404" pitchFamily="49" charset="0"/>
+              <a:buChar char="o"/>
+            </a:pPr>
+            <a:r>
+              <a:rPr lang="en-US" sz="1100" dirty="0"/>
+              <a:t>-cc on | off</a:t>
+            </a:r>
+          </a:p>
+          <a:p>
+            <a:pPr marL="1257300" lvl="2" indent="-342900">
+              <a:buFont typeface="Courier New" panose="02070309020205020404" pitchFamily="49" charset="0"/>
+              <a:buChar char="o"/>
+            </a:pPr>
+            <a:r>
+              <a:rPr lang="en-US" sz="1100" dirty="0"/>
+              <a:t>-clamp on | off</a:t>
+            </a:r>
+          </a:p>
+          <a:p>
+            <a:pPr marL="1257300" lvl="2" indent="-342900">
+              <a:buFont typeface="Courier New" panose="02070309020205020404" pitchFamily="49" charset="0"/>
+              <a:buChar char="o"/>
+            </a:pPr>
+            <a:r>
+              <a:rPr lang="en-US" sz="1100" dirty="0"/>
+              <a:t>-mm base gain</a:t>
+            </a:r>
+          </a:p>
+          <a:p>
+            <a:pPr marL="1257300" lvl="2" indent="-342900">
+              <a:buFont typeface="Courier New" panose="02070309020205020404" pitchFamily="49" charset="0"/>
+              <a:buChar char="o"/>
+            </a:pPr>
+            <a:r>
+              <a:rPr lang="en-US" sz="1100" dirty="0"/>
+              <a:t>-o u v w</a:t>
+            </a:r>
+          </a:p>
+          <a:p>
+            <a:pPr marL="1257300" lvl="2" indent="-342900">
+              <a:buFont typeface="Courier New" panose="02070309020205020404" pitchFamily="49" charset="0"/>
+              <a:buChar char="o"/>
+            </a:pPr>
+            <a:r>
+              <a:rPr lang="en-US" sz="1100" dirty="0"/>
+              <a:t>-s u v w</a:t>
+            </a:r>
+          </a:p>
+          <a:p>
+            <a:pPr marL="1257300" lvl="2" indent="-342900">
+              <a:buFont typeface="Courier New" panose="02070309020205020404" pitchFamily="49" charset="0"/>
+              <a:buChar char="o"/>
+            </a:pPr>
+            <a:r>
+              <a:rPr lang="en-US" sz="1100" dirty="0"/>
+              <a:t>-t u v w</a:t>
+            </a:r>
+          </a:p>
+          <a:p>
+            <a:pPr marL="1257300" lvl="2" indent="-342900">
+              <a:buFont typeface="Courier New" panose="02070309020205020404" pitchFamily="49" charset="0"/>
+              <a:buChar char="o"/>
+            </a:pPr>
+            <a:r>
+              <a:rPr lang="en-US" sz="1100" dirty="0"/>
+              <a:t>-</a:t>
+            </a:r>
+            <a:r>
+              <a:rPr lang="en-US" sz="1100" dirty="0" err="1"/>
+              <a:t>texres</a:t>
+            </a:r>
+            <a:r>
+              <a:rPr lang="en-US" sz="1100" dirty="0"/>
+              <a:t> value</a:t>
+            </a:r>
+          </a:p>
+          <a:p>
+            <a:r>
+              <a:rPr lang="en-US" dirty="0"/>
+              <a:t>2. </a:t>
+            </a:r>
+            <a:r>
+              <a:rPr lang="en-US"/>
+              <a:t>All strings are US-ASCII</a:t>
+            </a:r>
+            <a:endParaRPr lang="en-US" dirty="0"/>
+          </a:p>
+        </p:txBody>
+      </p:sp>
+    </p:spTree>
+    <p:extLst>
+      <p:ext uri="{BB962C8B-B14F-4D97-AF65-F5344CB8AC3E}">
+        <p14:creationId xmlns:p14="http://schemas.microsoft.com/office/powerpoint/2010/main" val="1691624654"/>
+      </p:ext>
+    </p:extLst>
+  </p:cSld>
+  <p:clrMapOvr>
+    <a:masterClrMapping/>
+  </p:clrMapOvr>
+</p:sld>
+</file>
+
+<file path=ppt/slides/slide11.xml><?xml version="1.0" encoding="utf-8"?>
+<p:sld xmlns:a="http://schemas.openxmlformats.org/drawingml/2006/main" xmlns:r="http://schemas.openxmlformats.org/officeDocument/2006/relationships" xmlns:p="http://schemas.openxmlformats.org/presentationml/2006/main">
+  <p:cSld>
+    <p:spTree>
+      <p:nvGrpSpPr>
+        <p:cNvPr id="1" name=""/>
+        <p:cNvGrpSpPr/>
+        <p:nvPr/>
+      </p:nvGrpSpPr>
+      <p:grpSpPr>
+        <a:xfrm>
+          <a:off x="0" y="0"/>
+          <a:ext cx="0" cy="0"/>
+          <a:chOff x="0" y="0"/>
+          <a:chExt cx="0" cy="0"/>
+        </a:xfrm>
+      </p:grpSpPr>
+      <p:sp>
+        <p:nvSpPr>
+          <p:cNvPr id="2" name="Titel 1">
+            <a:extLst>
+              <a:ext uri="{FF2B5EF4-FFF2-40B4-BE49-F238E27FC236}">
+                <a16:creationId xmlns:a16="http://schemas.microsoft.com/office/drawing/2014/main" id="{5E206153-2601-40AC-9E13-33AAFECD630E}"/>
+              </a:ext>
+            </a:extLst>
+          </p:cNvPr>
+          <p:cNvSpPr>
+            <a:spLocks noGrp="1"/>
+          </p:cNvSpPr>
+          <p:nvPr>
+            <p:ph type="title"/>
+          </p:nvPr>
+        </p:nvSpPr>
+        <p:spPr/>
+        <p:txBody>
+          <a:bodyPr/>
+          <a:lstStyle/>
+          <a:p>
+            <a:r>
+              <a:rPr lang="en-US" dirty="0"/>
+              <a:t>Example</a:t>
+            </a:r>
+          </a:p>
+        </p:txBody>
+      </p:sp>
+      <p:sp>
+        <p:nvSpPr>
+          <p:cNvPr id="3" name="Inhaltsplatzhalter 2">
+            <a:extLst>
+              <a:ext uri="{FF2B5EF4-FFF2-40B4-BE49-F238E27FC236}">
+                <a16:creationId xmlns:a16="http://schemas.microsoft.com/office/drawing/2014/main" id="{D702EE6D-7276-4F32-B135-6E0E7F14589C}"/>
               </a:ext>
             </a:extLst>
           </p:cNvPr>
@@ -3608,10 +3859,88 @@
             <p:ph idx="1"/>
           </p:nvPr>
         </p:nvSpPr>
-        <p:spPr>
-          <a:xfrm>
-            <a:off x="465095" y="313509"/>
-            <a:ext cx="10515600" cy="466667"/>
+        <p:spPr/>
+        <p:txBody>
+          <a:bodyPr/>
+          <a:lstStyle/>
+          <a:p>
+            <a:r>
+              <a:rPr lang="en-US" dirty="0"/>
+              <a:t>Take as an example the already serialized file “</a:t>
+            </a:r>
+            <a:r>
+              <a:rPr lang="en-US" i="1" dirty="0">
+                <a:solidFill>
+                  <a:schemeClr val="accent6"/>
+                </a:solidFill>
+              </a:rPr>
+              <a:t>/examples/</a:t>
+            </a:r>
+            <a:r>
+              <a:rPr lang="en-US" i="1" dirty="0" err="1">
+                <a:solidFill>
+                  <a:schemeClr val="accent6"/>
+                </a:solidFill>
+              </a:rPr>
+              <a:t>cube_output.bin</a:t>
+            </a:r>
+            <a:r>
+              <a:rPr lang="en-US" dirty="0"/>
+              <a:t>”</a:t>
+            </a:r>
+          </a:p>
+        </p:txBody>
+      </p:sp>
+    </p:spTree>
+    <p:extLst>
+      <p:ext uri="{BB962C8B-B14F-4D97-AF65-F5344CB8AC3E}">
+        <p14:creationId xmlns:p14="http://schemas.microsoft.com/office/powerpoint/2010/main" val="4241951597"/>
+      </p:ext>
+    </p:extLst>
+  </p:cSld>
+  <p:clrMapOvr>
+    <a:masterClrMapping/>
+  </p:clrMapOvr>
+</p:sld>
+</file>
+
+<file path=ppt/slides/slide12.xml><?xml version="1.0" encoding="utf-8"?>
+<p:sld xmlns:a="http://schemas.openxmlformats.org/drawingml/2006/main" xmlns:r="http://schemas.openxmlformats.org/officeDocument/2006/relationships" xmlns:p="http://schemas.openxmlformats.org/presentationml/2006/main">
+  <p:cSld>
+    <p:spTree>
+      <p:nvGrpSpPr>
+        <p:cNvPr id="1" name=""/>
+        <p:cNvGrpSpPr/>
+        <p:nvPr/>
+      </p:nvGrpSpPr>
+      <p:grpSpPr>
+        <a:xfrm>
+          <a:off x="0" y="0"/>
+          <a:ext cx="0" cy="0"/>
+          <a:chOff x="0" y="0"/>
+          <a:chExt cx="0" cy="0"/>
+        </a:xfrm>
+      </p:grpSpPr>
+      <p:sp>
+        <p:nvSpPr>
+          <p:cNvPr id="7" name="Inhaltsplatzhalter 2">
+            <a:extLst>
+              <a:ext uri="{FF2B5EF4-FFF2-40B4-BE49-F238E27FC236}">
+                <a16:creationId xmlns:a16="http://schemas.microsoft.com/office/drawing/2014/main" id="{54BA9101-8566-4103-B973-DD19ED2B2A83}"/>
+              </a:ext>
+            </a:extLst>
+          </p:cNvPr>
+          <p:cNvSpPr>
+            <a:spLocks noGrp="1"/>
+          </p:cNvSpPr>
+          <p:nvPr>
+            <p:ph idx="1"/>
+          </p:nvPr>
+        </p:nvSpPr>
+        <p:spPr>
+          <a:xfrm>
+            <a:off x="465095" y="313510"/>
+            <a:ext cx="11229158" cy="340832"/>
           </a:xfrm>
         </p:spPr>
         <p:txBody>
@@ -3622,17 +3951,58 @@
           <a:p>
             <a:r>
               <a:rPr lang="en-US" sz="1800" dirty="0"/>
-              <a:t>OBJ structure Example:</a:t>
+              <a:t>Structure Example:</a:t>
+            </a:r>
+          </a:p>
+        </p:txBody>
+      </p:sp>
+      <p:sp>
+        <p:nvSpPr>
+          <p:cNvPr id="4" name="Textfeld 3">
+            <a:extLst>
+              <a:ext uri="{FF2B5EF4-FFF2-40B4-BE49-F238E27FC236}">
+                <a16:creationId xmlns:a16="http://schemas.microsoft.com/office/drawing/2014/main" id="{FD9FBD94-5E36-4566-BCC1-306E14BE6EB5}"/>
+              </a:ext>
+            </a:extLst>
+          </p:cNvPr>
+          <p:cNvSpPr txBox="1"/>
+          <p:nvPr/>
+        </p:nvSpPr>
+        <p:spPr>
+          <a:xfrm>
+            <a:off x="164983" y="747497"/>
+            <a:ext cx="11862033" cy="923330"/>
+          </a:xfrm>
+          <a:prstGeom prst="rect">
+            <a:avLst/>
+          </a:prstGeom>
+          <a:noFill/>
+        </p:spPr>
+        <p:txBody>
+          <a:bodyPr wrap="square" rtlCol="0">
+            <a:spAutoFit/>
+          </a:bodyPr>
+          <a:lstStyle/>
+          <a:p>
+            <a:r>
+              <a:rPr lang="en-US" dirty="0"/>
+              <a:t>According to the definition of the file structure from page  5, we are looking first for the number of materials used by the object.</a:t>
+            </a:r>
+          </a:p>
+          <a:p>
+            <a:r>
+              <a:rPr lang="en-US" dirty="0"/>
+              <a:t>The file starts as:</a:t>
             </a:r>
           </a:p>
         </p:txBody>
       </p:sp>
       <p:pic>
         <p:nvPicPr>
-          <p:cNvPr id="8" name="Grafik 7">
-            <a:extLst>
-              <a:ext uri="{FF2B5EF4-FFF2-40B4-BE49-F238E27FC236}">
-                <a16:creationId xmlns:a16="http://schemas.microsoft.com/office/drawing/2014/main" id="{6D1C4BB9-7965-4E95-8603-BEE327F0D575}"/>
+          <p:cNvPr id="3" name="Grafik 2">
+            <a:extLst>
+              <a:ext uri="{FF2B5EF4-FFF2-40B4-BE49-F238E27FC236}">
+                <a16:creationId xmlns:a16="http://schemas.microsoft.com/office/drawing/2014/main" id="{15F6FB19-E8B7-431C-A5B0-4CCF51F4AD9A}"/>
               </a:ext>
             </a:extLst>
           </p:cNvPr>
@@ -3649,62 +4019,20 @@
         </p:blipFill>
         <p:spPr>
           <a:xfrm>
-            <a:off x="594978" y="1528133"/>
-            <a:ext cx="3743325" cy="542925"/>
+            <a:off x="282210" y="1832995"/>
+            <a:ext cx="9077325" cy="457200"/>
           </a:xfrm>
           <a:prstGeom prst="rect">
             <a:avLst/>
           </a:prstGeom>
         </p:spPr>
       </p:pic>
-      <p:cxnSp>
-        <p:nvCxnSpPr>
-          <p:cNvPr id="10" name="Gerade Verbindung mit Pfeil 9">
-            <a:extLst>
-              <a:ext uri="{FF2B5EF4-FFF2-40B4-BE49-F238E27FC236}">
-                <a16:creationId xmlns:a16="http://schemas.microsoft.com/office/drawing/2014/main" id="{43633585-7D28-4463-BD7C-F6E4CC6D1E25}"/>
-              </a:ext>
-            </a:extLst>
-          </p:cNvPr>
-          <p:cNvCxnSpPr>
-            <a:cxnSpLocks/>
-            <a:endCxn id="11" idx="1"/>
-          </p:cNvCxnSpPr>
-          <p:nvPr/>
-        </p:nvCxnSpPr>
-        <p:spPr>
-          <a:xfrm>
-            <a:off x="941097" y="1030007"/>
-            <a:ext cx="371463" cy="248295"/>
-          </a:xfrm>
-          <a:prstGeom prst="straightConnector1">
-            <a:avLst/>
-          </a:prstGeom>
-          <a:ln>
-            <a:tailEnd type="triangle"/>
-          </a:ln>
-        </p:spPr>
-        <p:style>
-          <a:lnRef idx="1">
-            <a:schemeClr val="accent1"/>
-          </a:lnRef>
-          <a:fillRef idx="0">
-            <a:schemeClr val="accent1"/>
-          </a:fillRef>
-          <a:effectRef idx="0">
-            <a:schemeClr val="accent1"/>
-          </a:effectRef>
-          <a:fontRef idx="minor">
-            <a:schemeClr val="tx1"/>
-          </a:fontRef>
-        </p:style>
-      </p:cxnSp>
-      <p:sp>
-        <p:nvSpPr>
-          <p:cNvPr id="11" name="Geschweifte Klammer rechts 10">
-            <a:extLst>
-              <a:ext uri="{FF2B5EF4-FFF2-40B4-BE49-F238E27FC236}">
-                <a16:creationId xmlns:a16="http://schemas.microsoft.com/office/drawing/2014/main" id="{7C78F01E-0999-4B6C-8877-896881F9AC56}"/>
+      <p:sp>
+        <p:nvSpPr>
+          <p:cNvPr id="6" name="Rechteck 5">
+            <a:extLst>
+              <a:ext uri="{FF2B5EF4-FFF2-40B4-BE49-F238E27FC236}">
+                <a16:creationId xmlns:a16="http://schemas.microsoft.com/office/drawing/2014/main" id="{38DE887F-E1C4-4718-A821-F0BFE4887763}"/>
               </a:ext>
             </a:extLst>
           </p:cNvPr>
@@ -3712,188 +4040,9 @@
           <p:nvPr/>
         </p:nvSpPr>
         <p:spPr>
-          <a:xfrm rot="16200000">
-            <a:off x="1087644" y="785636"/>
-            <a:ext cx="449830" cy="1435161"/>
-          </a:xfrm>
-          <a:prstGeom prst="rightBrace">
-            <a:avLst/>
-          </a:prstGeom>
-        </p:spPr>
-        <p:style>
-          <a:lnRef idx="1">
-            <a:schemeClr val="accent1"/>
-          </a:lnRef>
-          <a:fillRef idx="0">
-            <a:schemeClr val="accent1"/>
-          </a:fillRef>
-          <a:effectRef idx="0">
-            <a:schemeClr val="accent1"/>
-          </a:effectRef>
-          <a:fontRef idx="minor">
-            <a:schemeClr val="tx1"/>
-          </a:fontRef>
-        </p:style>
-        <p:txBody>
-          <a:bodyPr rtlCol="0" anchor="ctr"/>
-          <a:lstStyle/>
-          <a:p>
-            <a:pPr algn="ctr"/>
-            <a:endParaRPr lang="en-US"/>
-          </a:p>
-        </p:txBody>
-      </p:sp>
-      <p:cxnSp>
-        <p:nvCxnSpPr>
-          <p:cNvPr id="13" name="Gerade Verbindung mit Pfeil 12">
-            <a:extLst>
-              <a:ext uri="{FF2B5EF4-FFF2-40B4-BE49-F238E27FC236}">
-                <a16:creationId xmlns:a16="http://schemas.microsoft.com/office/drawing/2014/main" id="{A67DFFB2-944A-4055-BCC0-CF32BC2974E3}"/>
-              </a:ext>
-            </a:extLst>
-          </p:cNvPr>
-          <p:cNvCxnSpPr>
-            <a:cxnSpLocks/>
-            <a:endCxn id="14" idx="1"/>
-          </p:cNvCxnSpPr>
-          <p:nvPr/>
-        </p:nvCxnSpPr>
-        <p:spPr>
-          <a:xfrm>
-            <a:off x="2627027" y="1030006"/>
-            <a:ext cx="589714" cy="114736"/>
-          </a:xfrm>
-          <a:prstGeom prst="straightConnector1">
-            <a:avLst/>
-          </a:prstGeom>
-          <a:ln>
-            <a:tailEnd type="triangle"/>
-          </a:ln>
-        </p:spPr>
-        <p:style>
-          <a:lnRef idx="1">
-            <a:schemeClr val="accent1"/>
-          </a:lnRef>
-          <a:fillRef idx="0">
-            <a:schemeClr val="accent1"/>
-          </a:fillRef>
-          <a:effectRef idx="0">
-            <a:schemeClr val="accent1"/>
-          </a:effectRef>
-          <a:fontRef idx="minor">
-            <a:schemeClr val="tx1"/>
-          </a:fontRef>
-        </p:style>
-      </p:cxnSp>
-      <p:sp>
-        <p:nvSpPr>
-          <p:cNvPr id="14" name="Geschweifte Klammer rechts 13">
-            <a:extLst>
-              <a:ext uri="{FF2B5EF4-FFF2-40B4-BE49-F238E27FC236}">
-                <a16:creationId xmlns:a16="http://schemas.microsoft.com/office/drawing/2014/main" id="{2BAF9F59-6C0D-40F3-9701-63361C13861A}"/>
-              </a:ext>
-            </a:extLst>
-          </p:cNvPr>
-          <p:cNvSpPr/>
-          <p:nvPr/>
-        </p:nvSpPr>
-        <p:spPr>
-          <a:xfrm rot="16200000">
-            <a:off x="2991826" y="248092"/>
-            <a:ext cx="449829" cy="2243128"/>
-          </a:xfrm>
-          <a:prstGeom prst="rightBrace">
-            <a:avLst/>
-          </a:prstGeom>
-        </p:spPr>
-        <p:style>
-          <a:lnRef idx="1">
-            <a:schemeClr val="accent1"/>
-          </a:lnRef>
-          <a:fillRef idx="0">
-            <a:schemeClr val="accent1"/>
-          </a:fillRef>
-          <a:effectRef idx="0">
-            <a:schemeClr val="accent1"/>
-          </a:effectRef>
-          <a:fontRef idx="minor">
-            <a:schemeClr val="tx1"/>
-          </a:fontRef>
-        </p:style>
-        <p:txBody>
-          <a:bodyPr rtlCol="0" anchor="ctr"/>
-          <a:lstStyle/>
-          <a:p>
-            <a:pPr algn="ctr"/>
-            <a:endParaRPr lang="en-US"/>
-          </a:p>
-        </p:txBody>
-      </p:sp>
-      <p:sp>
-        <p:nvSpPr>
-          <p:cNvPr id="16" name="Textfeld 15">
-            <a:extLst>
-              <a:ext uri="{FF2B5EF4-FFF2-40B4-BE49-F238E27FC236}">
-                <a16:creationId xmlns:a16="http://schemas.microsoft.com/office/drawing/2014/main" id="{76B0E476-1338-45F5-B3B4-DC8DDE243884}"/>
-              </a:ext>
-            </a:extLst>
-          </p:cNvPr>
-          <p:cNvSpPr txBox="1"/>
-          <p:nvPr/>
-        </p:nvSpPr>
-        <p:spPr>
-          <a:xfrm>
-            <a:off x="4714613" y="1369656"/>
-            <a:ext cx="4411751" cy="646331"/>
-          </a:xfrm>
-          <a:prstGeom prst="rect">
-            <a:avLst/>
-          </a:prstGeom>
-          <a:noFill/>
-        </p:spPr>
-        <p:txBody>
-          <a:bodyPr wrap="square" rtlCol="0">
-            <a:spAutoFit/>
-          </a:bodyPr>
-          <a:lstStyle/>
-          <a:p>
-            <a:pPr marL="285750" indent="-285750">
-              <a:buFontTx/>
-              <a:buChar char="-"/>
-            </a:pPr>
-            <a:r>
-              <a:rPr lang="en-US" dirty="0"/>
-              <a:t>6 characters (including NULL termination)</a:t>
-            </a:r>
-          </a:p>
-          <a:p>
-            <a:pPr marL="285750" indent="-285750">
-              <a:buFontTx/>
-              <a:buChar char="-"/>
-            </a:pPr>
-            <a:r>
-              <a:rPr lang="en-US" dirty="0"/>
-              <a:t>The 5+1 characters are “ju-87”</a:t>
-            </a:r>
-          </a:p>
-        </p:txBody>
-      </p:sp>
-      <p:sp>
-        <p:nvSpPr>
-          <p:cNvPr id="12" name="Rechteck 11">
-            <a:extLst>
-              <a:ext uri="{FF2B5EF4-FFF2-40B4-BE49-F238E27FC236}">
-                <a16:creationId xmlns:a16="http://schemas.microsoft.com/office/drawing/2014/main" id="{E0AB06E3-3E57-4B35-AAD1-DD62D45190FB}"/>
-              </a:ext>
-            </a:extLst>
-          </p:cNvPr>
-          <p:cNvSpPr/>
-          <p:nvPr/>
-        </p:nvSpPr>
-        <p:spPr>
-          <a:xfrm>
-            <a:off x="2458255" y="2586491"/>
-            <a:ext cx="1724112" cy="293614"/>
+          <a:xfrm>
+            <a:off x="364566" y="2655317"/>
+            <a:ext cx="2097888" cy="293614"/>
           </a:xfrm>
           <a:prstGeom prst="rect">
             <a:avLst/>
@@ -3922,74 +4071,39 @@
             <a:pPr algn="ctr"/>
             <a:r>
               <a:rPr lang="en-US" sz="1000" dirty="0"/>
-              <a:t>No of triangles units (green)</a:t>
+              <a:t>No of  materials</a:t>
             </a:r>
             <a:br>
               <a:rPr lang="en-US" sz="1000" dirty="0"/>
             </a:br>
             <a:r>
               <a:rPr lang="en-US" sz="1000" dirty="0"/>
-              <a:t>&lt;signed short&gt;</a:t>
-            </a:r>
-          </a:p>
-        </p:txBody>
-      </p:sp>
-      <p:pic>
-        <p:nvPicPr>
-          <p:cNvPr id="2" name="Grafik 1">
-            <a:extLst>
-              <a:ext uri="{FF2B5EF4-FFF2-40B4-BE49-F238E27FC236}">
-                <a16:creationId xmlns:a16="http://schemas.microsoft.com/office/drawing/2014/main" id="{E60A98F1-D0AE-4FDD-8B65-1D5C27F20C88}"/>
-              </a:ext>
-            </a:extLst>
-          </p:cNvPr>
-          <p:cNvPicPr>
-            <a:picLocks noChangeAspect="1"/>
-          </p:cNvPicPr>
-          <p:nvPr/>
-        </p:nvPicPr>
-        <p:blipFill>
-          <a:blip r:embed="rId3"/>
-          <a:stretch>
-            <a:fillRect/>
-          </a:stretch>
-        </p:blipFill>
-        <p:spPr>
-          <a:xfrm>
-            <a:off x="594978" y="2634005"/>
-            <a:ext cx="1514475" cy="523875"/>
-          </a:xfrm>
-          <a:prstGeom prst="rect">
-            <a:avLst/>
-          </a:prstGeom>
-        </p:spPr>
-      </p:pic>
+              <a:t>&lt;signed int&gt;</a:t>
+            </a:r>
+          </a:p>
+        </p:txBody>
+      </p:sp>
       <p:cxnSp>
         <p:nvCxnSpPr>
-          <p:cNvPr id="9" name="Verbinder: gewinkelt 8">
-            <a:extLst>
-              <a:ext uri="{FF2B5EF4-FFF2-40B4-BE49-F238E27FC236}">
-                <a16:creationId xmlns:a16="http://schemas.microsoft.com/office/drawing/2014/main" id="{F4AB1162-E67D-43C6-91D1-F4D74C766DDA}"/>
+          <p:cNvPr id="8" name="Verbinder: gewinkelt 7">
+            <a:extLst>
+              <a:ext uri="{FF2B5EF4-FFF2-40B4-BE49-F238E27FC236}">
+                <a16:creationId xmlns:a16="http://schemas.microsoft.com/office/drawing/2014/main" id="{DB649E57-3D94-451D-98AB-5BB760682679}"/>
               </a:ext>
             </a:extLst>
           </p:cNvPr>
           <p:cNvCxnSpPr>
-            <a:stCxn id="8" idx="3"/>
-            <a:endCxn id="2" idx="1"/>
+            <a:endCxn id="6" idx="0"/>
           </p:cNvCxnSpPr>
           <p:nvPr/>
         </p:nvCxnSpPr>
         <p:spPr>
-          <a:xfrm flipH="1">
-            <a:off x="594978" y="1799596"/>
-            <a:ext cx="3743325" cy="1096347"/>
-          </a:xfrm>
-          <a:prstGeom prst="bentConnector5">
-            <a:avLst>
-              <a:gd name="adj1" fmla="val -6107"/>
-              <a:gd name="adj2" fmla="val 50434"/>
-              <a:gd name="adj3" fmla="val 106107"/>
-            </a:avLst>
+          <a:xfrm rot="5400000">
+            <a:off x="1337927" y="2307056"/>
+            <a:ext cx="423845" cy="272677"/>
+          </a:xfrm>
+          <a:prstGeom prst="bentConnector3">
+            <a:avLst/>
           </a:prstGeom>
           <a:ln>
             <a:tailEnd type="triangle"/>
@@ -4012,10 +4126,10 @@
       </p:cxnSp>
       <p:sp>
         <p:nvSpPr>
-          <p:cNvPr id="17" name="Textfeld 16">
-            <a:extLst>
-              <a:ext uri="{FF2B5EF4-FFF2-40B4-BE49-F238E27FC236}">
-                <a16:creationId xmlns:a16="http://schemas.microsoft.com/office/drawing/2014/main" id="{B6013647-CE24-472A-B698-9436668F6189}"/>
+          <p:cNvPr id="9" name="Textfeld 8">
+            <a:extLst>
+              <a:ext uri="{FF2B5EF4-FFF2-40B4-BE49-F238E27FC236}">
+                <a16:creationId xmlns:a16="http://schemas.microsoft.com/office/drawing/2014/main" id="{B7C7567B-7D12-4283-BF41-563F7F6340FD}"/>
               </a:ext>
             </a:extLst>
           </p:cNvPr>
@@ -4024,8 +4138,8 @@
         </p:nvSpPr>
         <p:spPr>
           <a:xfrm>
-            <a:off x="4791512" y="2634005"/>
-            <a:ext cx="4771938" cy="369332"/>
+            <a:off x="282210" y="3173314"/>
+            <a:ext cx="11862033" cy="369332"/>
           </a:xfrm>
           <a:prstGeom prst="rect">
             <a:avLst/>
@@ -4038,13 +4152,9 @@
           </a:bodyPr>
           <a:lstStyle/>
           <a:p>
-            <a:pPr marL="285750" indent="-285750">
-              <a:buFontTx/>
-              <a:buChar char="-"/>
-            </a:pPr>
             <a:r>
               <a:rPr lang="en-US" dirty="0"/>
-              <a:t>The “ju-87” object has 5706 triangles/faces </a:t>
+              <a:t>This means we have 2 materials we shall load into memory.</a:t>
             </a:r>
           </a:p>
         </p:txBody>
@@ -4702,8 +4812,8 @@
         </p:nvSpPr>
         <p:spPr>
           <a:xfrm>
-            <a:off x="381699" y="673216"/>
-            <a:ext cx="11585196" cy="5972962"/>
+            <a:off x="328454" y="879023"/>
+            <a:ext cx="11664891" cy="3625866"/>
           </a:xfrm>
           <a:prstGeom prst="rect">
             <a:avLst/>
@@ -4751,8 +4861,8 @@
         </p:nvSpPr>
         <p:spPr>
           <a:xfrm>
-            <a:off x="587229" y="939567"/>
-            <a:ext cx="2290195" cy="570451"/>
+            <a:off x="921759" y="913428"/>
+            <a:ext cx="8011487" cy="1626483"/>
           </a:xfrm>
           <a:prstGeom prst="rect">
             <a:avLst/>
@@ -4807,8 +4917,8 @@
         </p:nvSpPr>
         <p:spPr>
           <a:xfrm>
-            <a:off x="587229" y="2516697"/>
-            <a:ext cx="3238151" cy="570451"/>
+            <a:off x="921760" y="2778435"/>
+            <a:ext cx="8011486" cy="1626482"/>
           </a:xfrm>
           <a:prstGeom prst="rect">
             <a:avLst/>
@@ -4842,12 +4952,53 @@
           </a:p>
         </p:txBody>
       </p:sp>
-      <p:sp>
-        <p:nvSpPr>
-          <p:cNvPr id="8" name="Rechteck 7">
-            <a:extLst>
-              <a:ext uri="{FF2B5EF4-FFF2-40B4-BE49-F238E27FC236}">
-                <a16:creationId xmlns:a16="http://schemas.microsoft.com/office/drawing/2014/main" id="{6A66663B-8FB8-468D-B04F-8AE343277B09}"/>
+      <p:cxnSp>
+        <p:nvCxnSpPr>
+          <p:cNvPr id="24" name="Gerader Verbinder 23">
+            <a:extLst>
+              <a:ext uri="{FF2B5EF4-FFF2-40B4-BE49-F238E27FC236}">
+                <a16:creationId xmlns:a16="http://schemas.microsoft.com/office/drawing/2014/main" id="{8E993175-DEEA-43FA-9735-38FCA39CE0AD}"/>
+              </a:ext>
+            </a:extLst>
+          </p:cNvPr>
+          <p:cNvCxnSpPr>
+            <a:cxnSpLocks/>
+          </p:cNvCxnSpPr>
+          <p:nvPr/>
+        </p:nvCxnSpPr>
+        <p:spPr>
+          <a:xfrm>
+            <a:off x="1157680" y="2659187"/>
+            <a:ext cx="8011487" cy="0"/>
+          </a:xfrm>
+          <a:prstGeom prst="line">
+            <a:avLst/>
+          </a:prstGeom>
+          <a:ln w="15875">
+            <a:prstDash val="dash"/>
+          </a:ln>
+        </p:spPr>
+        <p:style>
+          <a:lnRef idx="1">
+            <a:schemeClr val="accent1"/>
+          </a:lnRef>
+          <a:fillRef idx="0">
+            <a:schemeClr val="accent1"/>
+          </a:fillRef>
+          <a:effectRef idx="0">
+            <a:schemeClr val="accent1"/>
+          </a:effectRef>
+          <a:fontRef idx="minor">
+            <a:schemeClr val="tx1"/>
+          </a:fontRef>
+        </p:style>
+      </p:cxnSp>
+      <p:sp>
+        <p:nvSpPr>
+          <p:cNvPr id="2" name="Geschweifte Klammer rechts 1">
+            <a:extLst>
+              <a:ext uri="{FF2B5EF4-FFF2-40B4-BE49-F238E27FC236}">
+                <a16:creationId xmlns:a16="http://schemas.microsoft.com/office/drawing/2014/main" id="{39CE3399-5D85-4AEC-BBE6-8542B431D843}"/>
               </a:ext>
             </a:extLst>
           </p:cNvPr>
@@ -4856,14 +5007,64 @@
         </p:nvSpPr>
         <p:spPr>
           <a:xfrm>
-            <a:off x="1655799" y="3162649"/>
-            <a:ext cx="855677" cy="318782"/>
+            <a:off x="8816843" y="879022"/>
+            <a:ext cx="1216390" cy="1780161"/>
+          </a:xfrm>
+          <a:prstGeom prst="rightBrace">
+            <a:avLst>
+              <a:gd name="adj1" fmla="val 9272"/>
+              <a:gd name="adj2" fmla="val 48121"/>
+            </a:avLst>
+          </a:prstGeom>
+        </p:spPr>
+        <p:style>
+          <a:lnRef idx="1">
+            <a:schemeClr val="accent1"/>
+          </a:lnRef>
+          <a:fillRef idx="0">
+            <a:schemeClr val="accent1"/>
+          </a:fillRef>
+          <a:effectRef idx="0">
+            <a:schemeClr val="accent1"/>
+          </a:effectRef>
+          <a:fontRef idx="minor">
+            <a:schemeClr val="tx1"/>
+          </a:fontRef>
+        </p:style>
+        <p:txBody>
+          <a:bodyPr rtlCol="0" anchor="ctr"/>
+          <a:lstStyle/>
+          <a:p>
+            <a:pPr algn="ctr"/>
+            <a:endParaRPr lang="en-US"/>
+          </a:p>
+        </p:txBody>
+      </p:sp>
+      <p:sp>
+        <p:nvSpPr>
+          <p:cNvPr id="3" name="Rechteck 2">
+            <a:extLst>
+              <a:ext uri="{FF2B5EF4-FFF2-40B4-BE49-F238E27FC236}">
+                <a16:creationId xmlns:a16="http://schemas.microsoft.com/office/drawing/2014/main" id="{6DD55104-D2A0-4DF1-BF15-9BFDD8C85F71}"/>
+              </a:ext>
+            </a:extLst>
+          </p:cNvPr>
+          <p:cNvSpPr/>
+          <p:nvPr/>
+        </p:nvSpPr>
+        <p:spPr>
+          <a:xfrm>
+            <a:off x="10156591" y="1461966"/>
+            <a:ext cx="1303090" cy="570445"/>
           </a:xfrm>
           <a:prstGeom prst="rect">
             <a:avLst/>
           </a:prstGeom>
           <a:solidFill>
-            <a:schemeClr val="accent2"/>
+            <a:schemeClr val="tx2">
+              <a:lumMod val="20000"/>
+              <a:lumOff val="80000"/>
+            </a:schemeClr>
           </a:solidFill>
         </p:spPr>
         <p:style>
@@ -4888,19 +5089,22 @@
           <a:p>
             <a:pPr algn="ctr"/>
             <a:r>
-              <a:rPr lang="en-US" sz="1200" dirty="0"/>
-              <a:t>MTL ID</a:t>
-            </a:r>
-            <a:endParaRPr lang="en-US" dirty="0"/>
-          </a:p>
-        </p:txBody>
-      </p:sp>
-      <p:sp>
-        <p:nvSpPr>
-          <p:cNvPr id="10" name="Rechteck 9">
-            <a:extLst>
-              <a:ext uri="{FF2B5EF4-FFF2-40B4-BE49-F238E27FC236}">
-                <a16:creationId xmlns:a16="http://schemas.microsoft.com/office/drawing/2014/main" id="{EEEA2C96-C866-4439-AF74-26B5FC161C2B}"/>
+              <a:rPr lang="en-US" dirty="0">
+                <a:solidFill>
+                  <a:schemeClr val="tx1"/>
+                </a:solidFill>
+              </a:rPr>
+              <a:t>Array of materials</a:t>
+            </a:r>
+          </a:p>
+        </p:txBody>
+      </p:sp>
+      <p:sp>
+        <p:nvSpPr>
+          <p:cNvPr id="32" name="Geschweifte Klammer rechts 31">
+            <a:extLst>
+              <a:ext uri="{FF2B5EF4-FFF2-40B4-BE49-F238E27FC236}">
+                <a16:creationId xmlns:a16="http://schemas.microsoft.com/office/drawing/2014/main" id="{5B618C4E-F882-41C7-8D94-4F38AE50F016}"/>
               </a:ext>
             </a:extLst>
           </p:cNvPr>
@@ -4909,14 +5113,64 @@
         </p:nvSpPr>
         <p:spPr>
           <a:xfrm>
-            <a:off x="1655798" y="3572031"/>
-            <a:ext cx="855677" cy="318782"/>
+            <a:off x="8933246" y="2659183"/>
+            <a:ext cx="1216390" cy="1780161"/>
+          </a:xfrm>
+          <a:prstGeom prst="rightBrace">
+            <a:avLst>
+              <a:gd name="adj1" fmla="val 9272"/>
+              <a:gd name="adj2" fmla="val 48121"/>
+            </a:avLst>
+          </a:prstGeom>
+        </p:spPr>
+        <p:style>
+          <a:lnRef idx="1">
+            <a:schemeClr val="accent1"/>
+          </a:lnRef>
+          <a:fillRef idx="0">
+            <a:schemeClr val="accent1"/>
+          </a:fillRef>
+          <a:effectRef idx="0">
+            <a:schemeClr val="accent1"/>
+          </a:effectRef>
+          <a:fontRef idx="minor">
+            <a:schemeClr val="tx1"/>
+          </a:fontRef>
+        </p:style>
+        <p:txBody>
+          <a:bodyPr rtlCol="0" anchor="ctr"/>
+          <a:lstStyle/>
+          <a:p>
+            <a:pPr algn="ctr"/>
+            <a:endParaRPr lang="en-US"/>
+          </a:p>
+        </p:txBody>
+      </p:sp>
+      <p:sp>
+        <p:nvSpPr>
+          <p:cNvPr id="33" name="Rechteck 32">
+            <a:extLst>
+              <a:ext uri="{FF2B5EF4-FFF2-40B4-BE49-F238E27FC236}">
+                <a16:creationId xmlns:a16="http://schemas.microsoft.com/office/drawing/2014/main" id="{C44B1BFC-C6C8-4686-AC66-299CD78BA642}"/>
+              </a:ext>
+            </a:extLst>
+          </p:cNvPr>
+          <p:cNvSpPr/>
+          <p:nvPr/>
+        </p:nvSpPr>
+        <p:spPr>
+          <a:xfrm>
+            <a:off x="10272994" y="3242127"/>
+            <a:ext cx="1303090" cy="570445"/>
           </a:xfrm>
           <a:prstGeom prst="rect">
             <a:avLst/>
           </a:prstGeom>
           <a:solidFill>
-            <a:schemeClr val="accent2"/>
+            <a:schemeClr val="tx2">
+              <a:lumMod val="20000"/>
+              <a:lumOff val="80000"/>
+            </a:schemeClr>
           </a:solidFill>
         </p:spPr>
         <p:style>
@@ -4941,417 +5195,12 @@
           <a:p>
             <a:pPr algn="ctr"/>
             <a:r>
-              <a:rPr lang="en-US" sz="1200" dirty="0"/>
-              <a:t>Items no.</a:t>
-            </a:r>
-            <a:endParaRPr lang="en-US" dirty="0"/>
-          </a:p>
-        </p:txBody>
-      </p:sp>
-      <p:pic>
-        <p:nvPicPr>
-          <p:cNvPr id="26" name="Grafik 25">
-            <a:extLst>
-              <a:ext uri="{FF2B5EF4-FFF2-40B4-BE49-F238E27FC236}">
-                <a16:creationId xmlns:a16="http://schemas.microsoft.com/office/drawing/2014/main" id="{08C943B3-7ADC-4880-BD79-D3C81A6EF778}"/>
-              </a:ext>
-            </a:extLst>
-          </p:cNvPr>
-          <p:cNvPicPr>
-            <a:picLocks noChangeAspect="1"/>
-          </p:cNvPicPr>
-          <p:nvPr/>
-        </p:nvPicPr>
-        <p:blipFill>
-          <a:blip r:embed="rId2"/>
-          <a:stretch>
-            <a:fillRect/>
-          </a:stretch>
-        </p:blipFill>
-        <p:spPr>
-          <a:xfrm>
-            <a:off x="3016023" y="3635903"/>
-            <a:ext cx="8794278" cy="915847"/>
-          </a:xfrm>
-          <a:prstGeom prst="rect">
-            <a:avLst/>
-          </a:prstGeom>
-        </p:spPr>
-      </p:pic>
-      <p:cxnSp>
-        <p:nvCxnSpPr>
-          <p:cNvPr id="30" name="Verbinder: gewinkelt 29">
-            <a:extLst>
-              <a:ext uri="{FF2B5EF4-FFF2-40B4-BE49-F238E27FC236}">
-                <a16:creationId xmlns:a16="http://schemas.microsoft.com/office/drawing/2014/main" id="{A5521047-7187-41CF-9B0D-373943608016}"/>
-              </a:ext>
-            </a:extLst>
-          </p:cNvPr>
-          <p:cNvCxnSpPr>
-            <a:stCxn id="26" idx="0"/>
-            <a:endCxn id="10" idx="3"/>
-          </p:cNvCxnSpPr>
-          <p:nvPr/>
-        </p:nvCxnSpPr>
-        <p:spPr>
-          <a:xfrm rot="16200000" flipH="1" flipV="1">
-            <a:off x="4914559" y="1232818"/>
-            <a:ext cx="95519" cy="4901687"/>
-          </a:xfrm>
-          <a:prstGeom prst="bentConnector4">
-            <a:avLst>
-              <a:gd name="adj1" fmla="val -239324"/>
-              <a:gd name="adj2" fmla="val 94853"/>
-            </a:avLst>
-          </a:prstGeom>
-          <a:ln w="57150">
-            <a:tailEnd type="diamond"/>
-          </a:ln>
-        </p:spPr>
-        <p:style>
-          <a:lnRef idx="1">
-            <a:schemeClr val="accent1"/>
-          </a:lnRef>
-          <a:fillRef idx="0">
-            <a:schemeClr val="accent1"/>
-          </a:fillRef>
-          <a:effectRef idx="0">
-            <a:schemeClr val="accent1"/>
-          </a:effectRef>
-          <a:fontRef idx="minor">
-            <a:schemeClr val="tx1"/>
-          </a:fontRef>
-        </p:style>
-      </p:cxnSp>
-      <p:sp>
-        <p:nvSpPr>
-          <p:cNvPr id="31" name="Textfeld 30">
-            <a:extLst>
-              <a:ext uri="{FF2B5EF4-FFF2-40B4-BE49-F238E27FC236}">
-                <a16:creationId xmlns:a16="http://schemas.microsoft.com/office/drawing/2014/main" id="{4FC20E23-DB10-46A5-8704-327C00E1D396}"/>
-              </a:ext>
-            </a:extLst>
-          </p:cNvPr>
-          <p:cNvSpPr txBox="1"/>
-          <p:nvPr/>
-        </p:nvSpPr>
-        <p:spPr>
-          <a:xfrm>
-            <a:off x="5214634" y="3101425"/>
-            <a:ext cx="449050" cy="276999"/>
-          </a:xfrm>
-          <a:prstGeom prst="rect">
-            <a:avLst/>
-          </a:prstGeom>
-          <a:noFill/>
-        </p:spPr>
-        <p:txBody>
-          <a:bodyPr wrap="square" rtlCol="0">
-            <a:spAutoFit/>
-          </a:bodyPr>
-          <a:lstStyle/>
-          <a:p>
-            <a:r>
-              <a:rPr lang="en-US" sz="1200" dirty="0"/>
-              <a:t>1..n</a:t>
-            </a:r>
-          </a:p>
-        </p:txBody>
-      </p:sp>
-      <p:cxnSp>
-        <p:nvCxnSpPr>
-          <p:cNvPr id="38" name="Gerader Verbinder 37">
-            <a:extLst>
-              <a:ext uri="{FF2B5EF4-FFF2-40B4-BE49-F238E27FC236}">
-                <a16:creationId xmlns:a16="http://schemas.microsoft.com/office/drawing/2014/main" id="{16094B2A-C809-443B-A70B-CA73B0768F1B}"/>
-              </a:ext>
-            </a:extLst>
-          </p:cNvPr>
-          <p:cNvCxnSpPr>
-            <a:cxnSpLocks/>
-          </p:cNvCxnSpPr>
-          <p:nvPr/>
-        </p:nvCxnSpPr>
-        <p:spPr>
-          <a:xfrm>
-            <a:off x="1309196" y="3322040"/>
-            <a:ext cx="0" cy="2798842"/>
-          </a:xfrm>
-          <a:prstGeom prst="line">
-            <a:avLst/>
-          </a:prstGeom>
-          <a:ln w="15875">
-            <a:prstDash val="sysDash"/>
-            <a:headEnd type="arrow"/>
-            <a:tailEnd type="arrow"/>
-          </a:ln>
-        </p:spPr>
-        <p:style>
-          <a:lnRef idx="1">
-            <a:schemeClr val="accent1"/>
-          </a:lnRef>
-          <a:fillRef idx="0">
-            <a:schemeClr val="accent1"/>
-          </a:fillRef>
-          <a:effectRef idx="0">
-            <a:schemeClr val="accent1"/>
-          </a:effectRef>
-          <a:fontRef idx="minor">
-            <a:schemeClr val="tx1"/>
-          </a:fontRef>
-        </p:style>
-      </p:cxnSp>
-      <p:cxnSp>
-        <p:nvCxnSpPr>
-          <p:cNvPr id="41" name="Gerader Verbinder 40">
-            <a:extLst>
-              <a:ext uri="{FF2B5EF4-FFF2-40B4-BE49-F238E27FC236}">
-                <a16:creationId xmlns:a16="http://schemas.microsoft.com/office/drawing/2014/main" id="{53D61B3C-3F3F-483B-B701-A0D0BCA1AAD9}"/>
-              </a:ext>
-            </a:extLst>
-          </p:cNvPr>
-          <p:cNvCxnSpPr/>
-          <p:nvPr/>
-        </p:nvCxnSpPr>
-        <p:spPr>
-          <a:xfrm>
-            <a:off x="1732326" y="4721461"/>
-            <a:ext cx="9800311" cy="0"/>
-          </a:xfrm>
-          <a:prstGeom prst="line">
-            <a:avLst/>
-          </a:prstGeom>
-          <a:ln w="15875">
-            <a:prstDash val="dash"/>
-          </a:ln>
-        </p:spPr>
-        <p:style>
-          <a:lnRef idx="1">
-            <a:schemeClr val="accent1"/>
-          </a:lnRef>
-          <a:fillRef idx="0">
-            <a:schemeClr val="accent1"/>
-          </a:fillRef>
-          <a:effectRef idx="0">
-            <a:schemeClr val="accent1"/>
-          </a:effectRef>
-          <a:fontRef idx="minor">
-            <a:schemeClr val="tx1"/>
-          </a:fontRef>
-        </p:style>
-      </p:cxnSp>
-      <p:sp>
-        <p:nvSpPr>
-          <p:cNvPr id="42" name="Rechteck 41">
-            <a:extLst>
-              <a:ext uri="{FF2B5EF4-FFF2-40B4-BE49-F238E27FC236}">
-                <a16:creationId xmlns:a16="http://schemas.microsoft.com/office/drawing/2014/main" id="{8AAB518B-BD05-4F70-A07B-3909D6CFDC28}"/>
-              </a:ext>
-            </a:extLst>
-          </p:cNvPr>
-          <p:cNvSpPr/>
-          <p:nvPr/>
-        </p:nvSpPr>
-        <p:spPr>
-          <a:xfrm>
-            <a:off x="1655798" y="4834247"/>
-            <a:ext cx="855677" cy="318782"/>
-          </a:xfrm>
-          <a:prstGeom prst="rect">
-            <a:avLst/>
-          </a:prstGeom>
-          <a:solidFill>
-            <a:schemeClr val="accent2"/>
-          </a:solidFill>
-        </p:spPr>
-        <p:style>
-          <a:lnRef idx="2">
-            <a:schemeClr val="accent1">
-              <a:shade val="50000"/>
-            </a:schemeClr>
-          </a:lnRef>
-          <a:fillRef idx="1">
-            <a:schemeClr val="accent1"/>
-          </a:fillRef>
-          <a:effectRef idx="0">
-            <a:schemeClr val="accent1"/>
-          </a:effectRef>
-          <a:fontRef idx="minor">
-            <a:schemeClr val="lt1"/>
-          </a:fontRef>
-        </p:style>
-        <p:txBody>
-          <a:bodyPr rtlCol="0" anchor="ctr"/>
-          <a:lstStyle/>
-          <a:p>
-            <a:pPr algn="ctr"/>
-            <a:r>
-              <a:rPr lang="en-US" sz="1200" dirty="0"/>
-              <a:t>MTL ID</a:t>
-            </a:r>
-            <a:endParaRPr lang="en-US" dirty="0"/>
-          </a:p>
-        </p:txBody>
-      </p:sp>
-      <p:sp>
-        <p:nvSpPr>
-          <p:cNvPr id="43" name="Rechteck 42">
-            <a:extLst>
-              <a:ext uri="{FF2B5EF4-FFF2-40B4-BE49-F238E27FC236}">
-                <a16:creationId xmlns:a16="http://schemas.microsoft.com/office/drawing/2014/main" id="{CF0A5DDD-FB6D-4255-A72E-A3C4BA9D014C}"/>
-              </a:ext>
-            </a:extLst>
-          </p:cNvPr>
-          <p:cNvSpPr/>
-          <p:nvPr/>
-        </p:nvSpPr>
-        <p:spPr>
-          <a:xfrm>
-            <a:off x="1655797" y="5271910"/>
-            <a:ext cx="855677" cy="318782"/>
-          </a:xfrm>
-          <a:prstGeom prst="rect">
-            <a:avLst/>
-          </a:prstGeom>
-          <a:solidFill>
-            <a:schemeClr val="accent2"/>
-          </a:solidFill>
-        </p:spPr>
-        <p:style>
-          <a:lnRef idx="2">
-            <a:schemeClr val="accent1">
-              <a:shade val="50000"/>
-            </a:schemeClr>
-          </a:lnRef>
-          <a:fillRef idx="1">
-            <a:schemeClr val="accent1"/>
-          </a:fillRef>
-          <a:effectRef idx="0">
-            <a:schemeClr val="accent1"/>
-          </a:effectRef>
-          <a:fontRef idx="minor">
-            <a:schemeClr val="lt1"/>
-          </a:fontRef>
-        </p:style>
-        <p:txBody>
-          <a:bodyPr rtlCol="0" anchor="ctr"/>
-          <a:lstStyle/>
-          <a:p>
-            <a:pPr algn="ctr"/>
-            <a:r>
-              <a:rPr lang="en-US" sz="1200" dirty="0"/>
-              <a:t>Items no.</a:t>
-            </a:r>
-            <a:endParaRPr lang="en-US" dirty="0"/>
-          </a:p>
-        </p:txBody>
-      </p:sp>
-      <p:pic>
-        <p:nvPicPr>
-          <p:cNvPr id="44" name="Grafik 43">
-            <a:extLst>
-              <a:ext uri="{FF2B5EF4-FFF2-40B4-BE49-F238E27FC236}">
-                <a16:creationId xmlns:a16="http://schemas.microsoft.com/office/drawing/2014/main" id="{C62E6582-1F8C-4FF5-AB43-59780FF00136}"/>
-              </a:ext>
-            </a:extLst>
-          </p:cNvPr>
-          <p:cNvPicPr>
-            <a:picLocks noChangeAspect="1"/>
-          </p:cNvPicPr>
-          <p:nvPr/>
-        </p:nvPicPr>
-        <p:blipFill>
-          <a:blip r:embed="rId2"/>
-          <a:stretch>
-            <a:fillRect/>
-          </a:stretch>
-        </p:blipFill>
-        <p:spPr>
-          <a:xfrm>
-            <a:off x="3016024" y="5431301"/>
-            <a:ext cx="8794278" cy="915847"/>
-          </a:xfrm>
-          <a:prstGeom prst="rect">
-            <a:avLst/>
-          </a:prstGeom>
-        </p:spPr>
-      </p:pic>
-      <p:cxnSp>
-        <p:nvCxnSpPr>
-          <p:cNvPr id="45" name="Verbinder: gewinkelt 44">
-            <a:extLst>
-              <a:ext uri="{FF2B5EF4-FFF2-40B4-BE49-F238E27FC236}">
-                <a16:creationId xmlns:a16="http://schemas.microsoft.com/office/drawing/2014/main" id="{CD5C32F4-2995-412A-8D55-33E5FE270CE5}"/>
-              </a:ext>
-            </a:extLst>
-          </p:cNvPr>
-          <p:cNvCxnSpPr>
-            <a:stCxn id="44" idx="0"/>
-            <a:endCxn id="43" idx="3"/>
-          </p:cNvCxnSpPr>
-          <p:nvPr/>
-        </p:nvCxnSpPr>
-        <p:spPr>
-          <a:xfrm rot="16200000" flipV="1">
-            <a:off x="4962319" y="2980456"/>
-            <a:ext cx="12700" cy="4901689"/>
-          </a:xfrm>
-          <a:prstGeom prst="bentConnector4">
-            <a:avLst>
-              <a:gd name="adj1" fmla="val 2020394"/>
-              <a:gd name="adj2" fmla="val 94853"/>
-            </a:avLst>
-          </a:prstGeom>
-          <a:ln w="57150">
-            <a:tailEnd type="diamond"/>
-          </a:ln>
-        </p:spPr>
-        <p:style>
-          <a:lnRef idx="1">
-            <a:schemeClr val="accent1"/>
-          </a:lnRef>
-          <a:fillRef idx="0">
-            <a:schemeClr val="accent1"/>
-          </a:fillRef>
-          <a:effectRef idx="0">
-            <a:schemeClr val="accent1"/>
-          </a:effectRef>
-          <a:fontRef idx="minor">
-            <a:schemeClr val="tx1"/>
-          </a:fontRef>
-        </p:style>
-      </p:cxnSp>
-      <p:sp>
-        <p:nvSpPr>
-          <p:cNvPr id="46" name="Textfeld 45">
-            <a:extLst>
-              <a:ext uri="{FF2B5EF4-FFF2-40B4-BE49-F238E27FC236}">
-                <a16:creationId xmlns:a16="http://schemas.microsoft.com/office/drawing/2014/main" id="{3ADC857C-54F0-41E2-99AB-9BB86B8A7039}"/>
-              </a:ext>
-            </a:extLst>
-          </p:cNvPr>
-          <p:cNvSpPr txBox="1"/>
-          <p:nvPr/>
-        </p:nvSpPr>
-        <p:spPr>
-          <a:xfrm>
-            <a:off x="5214634" y="4855272"/>
-            <a:ext cx="449050" cy="276999"/>
-          </a:xfrm>
-          <a:prstGeom prst="rect">
-            <a:avLst/>
-          </a:prstGeom>
-          <a:noFill/>
-        </p:spPr>
-        <p:txBody>
-          <a:bodyPr wrap="square" rtlCol="0">
-            <a:spAutoFit/>
-          </a:bodyPr>
-          <a:lstStyle/>
-          <a:p>
-            <a:r>
-              <a:rPr lang="en-US" sz="1200" dirty="0"/>
-              <a:t>1..n</a:t>
+              <a:rPr lang="en-US" dirty="0">
+                <a:solidFill>
+                  <a:schemeClr val="tx1"/>
+                </a:solidFill>
+              </a:rPr>
+              <a:t>Array of vertices</a:t>
             </a:r>
           </a:p>
         </p:txBody>
@@ -5370,6 +5219,1365 @@
 </file>
 
 <file path=ppt/slides/slide6.xml><?xml version="1.0" encoding="utf-8"?>
+<p:sld xmlns:a="http://schemas.openxmlformats.org/drawingml/2006/main" xmlns:r="http://schemas.openxmlformats.org/officeDocument/2006/relationships" xmlns:p="http://schemas.openxmlformats.org/presentationml/2006/main">
+  <p:cSld>
+    <p:spTree>
+      <p:nvGrpSpPr>
+        <p:cNvPr id="1" name=""/>
+        <p:cNvGrpSpPr/>
+        <p:nvPr/>
+      </p:nvGrpSpPr>
+      <p:grpSpPr>
+        <a:xfrm>
+          <a:off x="0" y="0"/>
+          <a:ext cx="0" cy="0"/>
+          <a:chOff x="0" y="0"/>
+          <a:chExt cx="0" cy="0"/>
+        </a:xfrm>
+      </p:grpSpPr>
+      <p:sp>
+        <p:nvSpPr>
+          <p:cNvPr id="4" name="Textfeld 3">
+            <a:extLst>
+              <a:ext uri="{FF2B5EF4-FFF2-40B4-BE49-F238E27FC236}">
+                <a16:creationId xmlns:a16="http://schemas.microsoft.com/office/drawing/2014/main" id="{90F74C81-8D27-4FAC-8376-9107FD4E0009}"/>
+              </a:ext>
+            </a:extLst>
+          </p:cNvPr>
+          <p:cNvSpPr txBox="1"/>
+          <p:nvPr/>
+        </p:nvSpPr>
+        <p:spPr>
+          <a:xfrm>
+            <a:off x="243281" y="226503"/>
+            <a:ext cx="11862033" cy="369332"/>
+          </a:xfrm>
+          <a:prstGeom prst="rect">
+            <a:avLst/>
+          </a:prstGeom>
+          <a:noFill/>
+        </p:spPr>
+        <p:txBody>
+          <a:bodyPr wrap="square" rtlCol="0">
+            <a:spAutoFit/>
+          </a:bodyPr>
+          <a:lstStyle/>
+          <a:p>
+            <a:r>
+              <a:rPr lang="en-US" dirty="0"/>
+              <a:t>Internal file structure: more details</a:t>
+            </a:r>
+          </a:p>
+        </p:txBody>
+      </p:sp>
+      <p:sp>
+        <p:nvSpPr>
+          <p:cNvPr id="5" name="Rechteck 4">
+            <a:extLst>
+              <a:ext uri="{FF2B5EF4-FFF2-40B4-BE49-F238E27FC236}">
+                <a16:creationId xmlns:a16="http://schemas.microsoft.com/office/drawing/2014/main" id="{DDBEEB5E-FCAD-46D7-BE27-333B8DA3D47C}"/>
+              </a:ext>
+            </a:extLst>
+          </p:cNvPr>
+          <p:cNvSpPr/>
+          <p:nvPr/>
+        </p:nvSpPr>
+        <p:spPr>
+          <a:xfrm>
+            <a:off x="302004" y="595835"/>
+            <a:ext cx="11664891" cy="6050343"/>
+          </a:xfrm>
+          <a:prstGeom prst="rect">
+            <a:avLst/>
+          </a:prstGeom>
+          <a:solidFill>
+            <a:schemeClr val="bg2"/>
+          </a:solidFill>
+        </p:spPr>
+        <p:style>
+          <a:lnRef idx="2">
+            <a:schemeClr val="accent1">
+              <a:shade val="50000"/>
+            </a:schemeClr>
+          </a:lnRef>
+          <a:fillRef idx="1">
+            <a:schemeClr val="accent1"/>
+          </a:fillRef>
+          <a:effectRef idx="0">
+            <a:schemeClr val="accent1"/>
+          </a:effectRef>
+          <a:fontRef idx="minor">
+            <a:schemeClr val="lt1"/>
+          </a:fontRef>
+        </p:style>
+        <p:txBody>
+          <a:bodyPr rtlCol="0" anchor="ctr"/>
+          <a:lstStyle/>
+          <a:p>
+            <a:pPr algn="ctr"/>
+            <a:endParaRPr lang="en-US"/>
+          </a:p>
+        </p:txBody>
+      </p:sp>
+      <p:sp>
+        <p:nvSpPr>
+          <p:cNvPr id="6" name="Rechteck 5">
+            <a:extLst>
+              <a:ext uri="{FF2B5EF4-FFF2-40B4-BE49-F238E27FC236}">
+                <a16:creationId xmlns:a16="http://schemas.microsoft.com/office/drawing/2014/main" id="{9A863AFF-68AA-4DD6-B2F7-F8AD9C9714C1}"/>
+              </a:ext>
+            </a:extLst>
+          </p:cNvPr>
+          <p:cNvSpPr/>
+          <p:nvPr/>
+        </p:nvSpPr>
+        <p:spPr>
+          <a:xfrm>
+            <a:off x="510699" y="659705"/>
+            <a:ext cx="2290195" cy="570451"/>
+          </a:xfrm>
+          <a:prstGeom prst="rect">
+            <a:avLst/>
+          </a:prstGeom>
+        </p:spPr>
+        <p:style>
+          <a:lnRef idx="2">
+            <a:schemeClr val="accent1">
+              <a:shade val="50000"/>
+            </a:schemeClr>
+          </a:lnRef>
+          <a:fillRef idx="1">
+            <a:schemeClr val="accent1"/>
+          </a:fillRef>
+          <a:effectRef idx="0">
+            <a:schemeClr val="accent1"/>
+          </a:effectRef>
+          <a:fontRef idx="minor">
+            <a:schemeClr val="lt1"/>
+          </a:fontRef>
+        </p:style>
+        <p:txBody>
+          <a:bodyPr rtlCol="0" anchor="ctr"/>
+          <a:lstStyle/>
+          <a:p>
+            <a:pPr algn="ctr"/>
+            <a:r>
+              <a:rPr lang="en-US" dirty="0"/>
+              <a:t>MTL Information</a:t>
+            </a:r>
+            <a:br>
+              <a:rPr lang="en-US" dirty="0"/>
+            </a:br>
+            <a:r>
+              <a:rPr lang="en-US" dirty="0"/>
+              <a:t>Array of Material(s)</a:t>
+            </a:r>
+          </a:p>
+        </p:txBody>
+      </p:sp>
+      <p:sp>
+        <p:nvSpPr>
+          <p:cNvPr id="7" name="Rechteck 6">
+            <a:extLst>
+              <a:ext uri="{FF2B5EF4-FFF2-40B4-BE49-F238E27FC236}">
+                <a16:creationId xmlns:a16="http://schemas.microsoft.com/office/drawing/2014/main" id="{B2BFE4B0-3D87-4026-B5D3-35B770B7D65C}"/>
+              </a:ext>
+            </a:extLst>
+          </p:cNvPr>
+          <p:cNvSpPr/>
+          <p:nvPr/>
+        </p:nvSpPr>
+        <p:spPr>
+          <a:xfrm>
+            <a:off x="1309196" y="2501598"/>
+            <a:ext cx="3238151" cy="570451"/>
+          </a:xfrm>
+          <a:prstGeom prst="rect">
+            <a:avLst/>
+          </a:prstGeom>
+        </p:spPr>
+        <p:style>
+          <a:lnRef idx="2">
+            <a:schemeClr val="accent1">
+              <a:shade val="50000"/>
+            </a:schemeClr>
+          </a:lnRef>
+          <a:fillRef idx="1">
+            <a:schemeClr val="accent1"/>
+          </a:fillRef>
+          <a:effectRef idx="0">
+            <a:schemeClr val="accent1"/>
+          </a:effectRef>
+          <a:fontRef idx="minor">
+            <a:schemeClr val="lt1"/>
+          </a:fontRef>
+        </p:style>
+        <p:txBody>
+          <a:bodyPr rtlCol="0" anchor="ctr"/>
+          <a:lstStyle/>
+          <a:p>
+            <a:pPr algn="ctr"/>
+            <a:r>
+              <a:rPr lang="en-US" dirty="0"/>
+              <a:t>Array of Face(s) (triangles)</a:t>
+            </a:r>
+          </a:p>
+        </p:txBody>
+      </p:sp>
+      <p:sp>
+        <p:nvSpPr>
+          <p:cNvPr id="8" name="Rechteck 7">
+            <a:extLst>
+              <a:ext uri="{FF2B5EF4-FFF2-40B4-BE49-F238E27FC236}">
+                <a16:creationId xmlns:a16="http://schemas.microsoft.com/office/drawing/2014/main" id="{6A66663B-8FB8-468D-B04F-8AE343277B09}"/>
+              </a:ext>
+            </a:extLst>
+          </p:cNvPr>
+          <p:cNvSpPr/>
+          <p:nvPr/>
+        </p:nvSpPr>
+        <p:spPr>
+          <a:xfrm>
+            <a:off x="1655799" y="3162649"/>
+            <a:ext cx="855677" cy="318782"/>
+          </a:xfrm>
+          <a:prstGeom prst="rect">
+            <a:avLst/>
+          </a:prstGeom>
+          <a:solidFill>
+            <a:schemeClr val="accent2"/>
+          </a:solidFill>
+        </p:spPr>
+        <p:style>
+          <a:lnRef idx="2">
+            <a:schemeClr val="accent1">
+              <a:shade val="50000"/>
+            </a:schemeClr>
+          </a:lnRef>
+          <a:fillRef idx="1">
+            <a:schemeClr val="accent1"/>
+          </a:fillRef>
+          <a:effectRef idx="0">
+            <a:schemeClr val="accent1"/>
+          </a:effectRef>
+          <a:fontRef idx="minor">
+            <a:schemeClr val="lt1"/>
+          </a:fontRef>
+        </p:style>
+        <p:txBody>
+          <a:bodyPr rtlCol="0" anchor="ctr"/>
+          <a:lstStyle/>
+          <a:p>
+            <a:pPr algn="ctr"/>
+            <a:r>
+              <a:rPr lang="en-US" sz="1200" dirty="0"/>
+              <a:t>MTL ID</a:t>
+            </a:r>
+            <a:endParaRPr lang="en-US" dirty="0"/>
+          </a:p>
+        </p:txBody>
+      </p:sp>
+      <p:sp>
+        <p:nvSpPr>
+          <p:cNvPr id="10" name="Rechteck 9">
+            <a:extLst>
+              <a:ext uri="{FF2B5EF4-FFF2-40B4-BE49-F238E27FC236}">
+                <a16:creationId xmlns:a16="http://schemas.microsoft.com/office/drawing/2014/main" id="{EEEA2C96-C866-4439-AF74-26B5FC161C2B}"/>
+              </a:ext>
+            </a:extLst>
+          </p:cNvPr>
+          <p:cNvSpPr/>
+          <p:nvPr/>
+        </p:nvSpPr>
+        <p:spPr>
+          <a:xfrm>
+            <a:off x="1655798" y="3572031"/>
+            <a:ext cx="855677" cy="318782"/>
+          </a:xfrm>
+          <a:prstGeom prst="rect">
+            <a:avLst/>
+          </a:prstGeom>
+          <a:solidFill>
+            <a:schemeClr val="accent2"/>
+          </a:solidFill>
+        </p:spPr>
+        <p:style>
+          <a:lnRef idx="2">
+            <a:schemeClr val="accent1">
+              <a:shade val="50000"/>
+            </a:schemeClr>
+          </a:lnRef>
+          <a:fillRef idx="1">
+            <a:schemeClr val="accent1"/>
+          </a:fillRef>
+          <a:effectRef idx="0">
+            <a:schemeClr val="accent1"/>
+          </a:effectRef>
+          <a:fontRef idx="minor">
+            <a:schemeClr val="lt1"/>
+          </a:fontRef>
+        </p:style>
+        <p:txBody>
+          <a:bodyPr rtlCol="0" anchor="ctr"/>
+          <a:lstStyle/>
+          <a:p>
+            <a:pPr algn="ctr"/>
+            <a:r>
+              <a:rPr lang="en-US" sz="1200" dirty="0"/>
+              <a:t>Items no.</a:t>
+            </a:r>
+            <a:endParaRPr lang="en-US" dirty="0"/>
+          </a:p>
+        </p:txBody>
+      </p:sp>
+      <p:pic>
+        <p:nvPicPr>
+          <p:cNvPr id="26" name="Grafik 25">
+            <a:extLst>
+              <a:ext uri="{FF2B5EF4-FFF2-40B4-BE49-F238E27FC236}">
+                <a16:creationId xmlns:a16="http://schemas.microsoft.com/office/drawing/2014/main" id="{08C943B3-7ADC-4880-BD79-D3C81A6EF778}"/>
+              </a:ext>
+            </a:extLst>
+          </p:cNvPr>
+          <p:cNvPicPr>
+            <a:picLocks noChangeAspect="1"/>
+          </p:cNvPicPr>
+          <p:nvPr/>
+        </p:nvPicPr>
+        <p:blipFill>
+          <a:blip r:embed="rId2"/>
+          <a:stretch>
+            <a:fillRect/>
+          </a:stretch>
+        </p:blipFill>
+        <p:spPr>
+          <a:xfrm>
+            <a:off x="3016023" y="3635903"/>
+            <a:ext cx="8794278" cy="915847"/>
+          </a:xfrm>
+          <a:prstGeom prst="rect">
+            <a:avLst/>
+          </a:prstGeom>
+        </p:spPr>
+      </p:pic>
+      <p:cxnSp>
+        <p:nvCxnSpPr>
+          <p:cNvPr id="30" name="Verbinder: gewinkelt 29">
+            <a:extLst>
+              <a:ext uri="{FF2B5EF4-FFF2-40B4-BE49-F238E27FC236}">
+                <a16:creationId xmlns:a16="http://schemas.microsoft.com/office/drawing/2014/main" id="{A5521047-7187-41CF-9B0D-373943608016}"/>
+              </a:ext>
+            </a:extLst>
+          </p:cNvPr>
+          <p:cNvCxnSpPr>
+            <a:stCxn id="26" idx="0"/>
+            <a:endCxn id="10" idx="3"/>
+          </p:cNvCxnSpPr>
+          <p:nvPr/>
+        </p:nvCxnSpPr>
+        <p:spPr>
+          <a:xfrm rot="16200000" flipH="1" flipV="1">
+            <a:off x="4914559" y="1232818"/>
+            <a:ext cx="95519" cy="4901687"/>
+          </a:xfrm>
+          <a:prstGeom prst="bentConnector4">
+            <a:avLst>
+              <a:gd name="adj1" fmla="val -239324"/>
+              <a:gd name="adj2" fmla="val 94853"/>
+            </a:avLst>
+          </a:prstGeom>
+          <a:ln w="57150">
+            <a:tailEnd type="diamond"/>
+          </a:ln>
+        </p:spPr>
+        <p:style>
+          <a:lnRef idx="1">
+            <a:schemeClr val="accent1"/>
+          </a:lnRef>
+          <a:fillRef idx="0">
+            <a:schemeClr val="accent1"/>
+          </a:fillRef>
+          <a:effectRef idx="0">
+            <a:schemeClr val="accent1"/>
+          </a:effectRef>
+          <a:fontRef idx="minor">
+            <a:schemeClr val="tx1"/>
+          </a:fontRef>
+        </p:style>
+      </p:cxnSp>
+      <p:sp>
+        <p:nvSpPr>
+          <p:cNvPr id="31" name="Textfeld 30">
+            <a:extLst>
+              <a:ext uri="{FF2B5EF4-FFF2-40B4-BE49-F238E27FC236}">
+                <a16:creationId xmlns:a16="http://schemas.microsoft.com/office/drawing/2014/main" id="{4FC20E23-DB10-46A5-8704-327C00E1D396}"/>
+              </a:ext>
+            </a:extLst>
+          </p:cNvPr>
+          <p:cNvSpPr txBox="1"/>
+          <p:nvPr/>
+        </p:nvSpPr>
+        <p:spPr>
+          <a:xfrm>
+            <a:off x="5214634" y="3101425"/>
+            <a:ext cx="449050" cy="276999"/>
+          </a:xfrm>
+          <a:prstGeom prst="rect">
+            <a:avLst/>
+          </a:prstGeom>
+          <a:noFill/>
+        </p:spPr>
+        <p:txBody>
+          <a:bodyPr wrap="square" rtlCol="0">
+            <a:spAutoFit/>
+          </a:bodyPr>
+          <a:lstStyle/>
+          <a:p>
+            <a:r>
+              <a:rPr lang="en-US" sz="1200" dirty="0"/>
+              <a:t>1..n</a:t>
+            </a:r>
+          </a:p>
+        </p:txBody>
+      </p:sp>
+      <p:cxnSp>
+        <p:nvCxnSpPr>
+          <p:cNvPr id="38" name="Gerader Verbinder 37">
+            <a:extLst>
+              <a:ext uri="{FF2B5EF4-FFF2-40B4-BE49-F238E27FC236}">
+                <a16:creationId xmlns:a16="http://schemas.microsoft.com/office/drawing/2014/main" id="{16094B2A-C809-443B-A70B-CA73B0768F1B}"/>
+              </a:ext>
+            </a:extLst>
+          </p:cNvPr>
+          <p:cNvCxnSpPr>
+            <a:cxnSpLocks/>
+          </p:cNvCxnSpPr>
+          <p:nvPr/>
+        </p:nvCxnSpPr>
+        <p:spPr>
+          <a:xfrm>
+            <a:off x="1309196" y="3322040"/>
+            <a:ext cx="0" cy="2798842"/>
+          </a:xfrm>
+          <a:prstGeom prst="line">
+            <a:avLst/>
+          </a:prstGeom>
+          <a:ln w="15875">
+            <a:prstDash val="sysDash"/>
+            <a:headEnd type="arrow"/>
+            <a:tailEnd type="arrow"/>
+          </a:ln>
+        </p:spPr>
+        <p:style>
+          <a:lnRef idx="1">
+            <a:schemeClr val="accent1"/>
+          </a:lnRef>
+          <a:fillRef idx="0">
+            <a:schemeClr val="accent1"/>
+          </a:fillRef>
+          <a:effectRef idx="0">
+            <a:schemeClr val="accent1"/>
+          </a:effectRef>
+          <a:fontRef idx="minor">
+            <a:schemeClr val="tx1"/>
+          </a:fontRef>
+        </p:style>
+      </p:cxnSp>
+      <p:cxnSp>
+        <p:nvCxnSpPr>
+          <p:cNvPr id="41" name="Gerader Verbinder 40">
+            <a:extLst>
+              <a:ext uri="{FF2B5EF4-FFF2-40B4-BE49-F238E27FC236}">
+                <a16:creationId xmlns:a16="http://schemas.microsoft.com/office/drawing/2014/main" id="{53D61B3C-3F3F-483B-B701-A0D0BCA1AAD9}"/>
+              </a:ext>
+            </a:extLst>
+          </p:cNvPr>
+          <p:cNvCxnSpPr/>
+          <p:nvPr/>
+        </p:nvCxnSpPr>
+        <p:spPr>
+          <a:xfrm>
+            <a:off x="1732326" y="4721461"/>
+            <a:ext cx="9800311" cy="0"/>
+          </a:xfrm>
+          <a:prstGeom prst="line">
+            <a:avLst/>
+          </a:prstGeom>
+          <a:ln w="15875">
+            <a:prstDash val="dash"/>
+          </a:ln>
+        </p:spPr>
+        <p:style>
+          <a:lnRef idx="1">
+            <a:schemeClr val="accent1"/>
+          </a:lnRef>
+          <a:fillRef idx="0">
+            <a:schemeClr val="accent1"/>
+          </a:fillRef>
+          <a:effectRef idx="0">
+            <a:schemeClr val="accent1"/>
+          </a:effectRef>
+          <a:fontRef idx="minor">
+            <a:schemeClr val="tx1"/>
+          </a:fontRef>
+        </p:style>
+      </p:cxnSp>
+      <p:sp>
+        <p:nvSpPr>
+          <p:cNvPr id="42" name="Rechteck 41">
+            <a:extLst>
+              <a:ext uri="{FF2B5EF4-FFF2-40B4-BE49-F238E27FC236}">
+                <a16:creationId xmlns:a16="http://schemas.microsoft.com/office/drawing/2014/main" id="{8AAB518B-BD05-4F70-A07B-3909D6CFDC28}"/>
+              </a:ext>
+            </a:extLst>
+          </p:cNvPr>
+          <p:cNvSpPr/>
+          <p:nvPr/>
+        </p:nvSpPr>
+        <p:spPr>
+          <a:xfrm>
+            <a:off x="1655798" y="4834247"/>
+            <a:ext cx="855677" cy="318782"/>
+          </a:xfrm>
+          <a:prstGeom prst="rect">
+            <a:avLst/>
+          </a:prstGeom>
+          <a:solidFill>
+            <a:schemeClr val="accent2"/>
+          </a:solidFill>
+        </p:spPr>
+        <p:style>
+          <a:lnRef idx="2">
+            <a:schemeClr val="accent1">
+              <a:shade val="50000"/>
+            </a:schemeClr>
+          </a:lnRef>
+          <a:fillRef idx="1">
+            <a:schemeClr val="accent1"/>
+          </a:fillRef>
+          <a:effectRef idx="0">
+            <a:schemeClr val="accent1"/>
+          </a:effectRef>
+          <a:fontRef idx="minor">
+            <a:schemeClr val="lt1"/>
+          </a:fontRef>
+        </p:style>
+        <p:txBody>
+          <a:bodyPr rtlCol="0" anchor="ctr"/>
+          <a:lstStyle/>
+          <a:p>
+            <a:pPr algn="ctr"/>
+            <a:r>
+              <a:rPr lang="en-US" sz="1200" dirty="0"/>
+              <a:t>MTL ID</a:t>
+            </a:r>
+            <a:endParaRPr lang="en-US" dirty="0"/>
+          </a:p>
+        </p:txBody>
+      </p:sp>
+      <p:sp>
+        <p:nvSpPr>
+          <p:cNvPr id="43" name="Rechteck 42">
+            <a:extLst>
+              <a:ext uri="{FF2B5EF4-FFF2-40B4-BE49-F238E27FC236}">
+                <a16:creationId xmlns:a16="http://schemas.microsoft.com/office/drawing/2014/main" id="{CF0A5DDD-FB6D-4255-A72E-A3C4BA9D014C}"/>
+              </a:ext>
+            </a:extLst>
+          </p:cNvPr>
+          <p:cNvSpPr/>
+          <p:nvPr/>
+        </p:nvSpPr>
+        <p:spPr>
+          <a:xfrm>
+            <a:off x="1655797" y="5271910"/>
+            <a:ext cx="855677" cy="318782"/>
+          </a:xfrm>
+          <a:prstGeom prst="rect">
+            <a:avLst/>
+          </a:prstGeom>
+          <a:solidFill>
+            <a:schemeClr val="accent2"/>
+          </a:solidFill>
+        </p:spPr>
+        <p:style>
+          <a:lnRef idx="2">
+            <a:schemeClr val="accent1">
+              <a:shade val="50000"/>
+            </a:schemeClr>
+          </a:lnRef>
+          <a:fillRef idx="1">
+            <a:schemeClr val="accent1"/>
+          </a:fillRef>
+          <a:effectRef idx="0">
+            <a:schemeClr val="accent1"/>
+          </a:effectRef>
+          <a:fontRef idx="minor">
+            <a:schemeClr val="lt1"/>
+          </a:fontRef>
+        </p:style>
+        <p:txBody>
+          <a:bodyPr rtlCol="0" anchor="ctr"/>
+          <a:lstStyle/>
+          <a:p>
+            <a:pPr algn="ctr"/>
+            <a:r>
+              <a:rPr lang="en-US" sz="1200" dirty="0"/>
+              <a:t>Items no.</a:t>
+            </a:r>
+            <a:endParaRPr lang="en-US" dirty="0"/>
+          </a:p>
+        </p:txBody>
+      </p:sp>
+      <p:pic>
+        <p:nvPicPr>
+          <p:cNvPr id="44" name="Grafik 43">
+            <a:extLst>
+              <a:ext uri="{FF2B5EF4-FFF2-40B4-BE49-F238E27FC236}">
+                <a16:creationId xmlns:a16="http://schemas.microsoft.com/office/drawing/2014/main" id="{C62E6582-1F8C-4FF5-AB43-59780FF00136}"/>
+              </a:ext>
+            </a:extLst>
+          </p:cNvPr>
+          <p:cNvPicPr>
+            <a:picLocks noChangeAspect="1"/>
+          </p:cNvPicPr>
+          <p:nvPr/>
+        </p:nvPicPr>
+        <p:blipFill>
+          <a:blip r:embed="rId2"/>
+          <a:stretch>
+            <a:fillRect/>
+          </a:stretch>
+        </p:blipFill>
+        <p:spPr>
+          <a:xfrm>
+            <a:off x="3016024" y="5431301"/>
+            <a:ext cx="8794278" cy="915847"/>
+          </a:xfrm>
+          <a:prstGeom prst="rect">
+            <a:avLst/>
+          </a:prstGeom>
+        </p:spPr>
+      </p:pic>
+      <p:cxnSp>
+        <p:nvCxnSpPr>
+          <p:cNvPr id="45" name="Verbinder: gewinkelt 44">
+            <a:extLst>
+              <a:ext uri="{FF2B5EF4-FFF2-40B4-BE49-F238E27FC236}">
+                <a16:creationId xmlns:a16="http://schemas.microsoft.com/office/drawing/2014/main" id="{CD5C32F4-2995-412A-8D55-33E5FE270CE5}"/>
+              </a:ext>
+            </a:extLst>
+          </p:cNvPr>
+          <p:cNvCxnSpPr>
+            <a:stCxn id="44" idx="0"/>
+            <a:endCxn id="43" idx="3"/>
+          </p:cNvCxnSpPr>
+          <p:nvPr/>
+        </p:nvCxnSpPr>
+        <p:spPr>
+          <a:xfrm rot="16200000" flipV="1">
+            <a:off x="4962319" y="2980456"/>
+            <a:ext cx="12700" cy="4901689"/>
+          </a:xfrm>
+          <a:prstGeom prst="bentConnector4">
+            <a:avLst>
+              <a:gd name="adj1" fmla="val 2020394"/>
+              <a:gd name="adj2" fmla="val 94853"/>
+            </a:avLst>
+          </a:prstGeom>
+          <a:ln w="57150">
+            <a:tailEnd type="diamond"/>
+          </a:ln>
+        </p:spPr>
+        <p:style>
+          <a:lnRef idx="1">
+            <a:schemeClr val="accent1"/>
+          </a:lnRef>
+          <a:fillRef idx="0">
+            <a:schemeClr val="accent1"/>
+          </a:fillRef>
+          <a:effectRef idx="0">
+            <a:schemeClr val="accent1"/>
+          </a:effectRef>
+          <a:fontRef idx="minor">
+            <a:schemeClr val="tx1"/>
+          </a:fontRef>
+        </p:style>
+      </p:cxnSp>
+      <p:sp>
+        <p:nvSpPr>
+          <p:cNvPr id="46" name="Textfeld 45">
+            <a:extLst>
+              <a:ext uri="{FF2B5EF4-FFF2-40B4-BE49-F238E27FC236}">
+                <a16:creationId xmlns:a16="http://schemas.microsoft.com/office/drawing/2014/main" id="{3ADC857C-54F0-41E2-99AB-9BB86B8A7039}"/>
+              </a:ext>
+            </a:extLst>
+          </p:cNvPr>
+          <p:cNvSpPr txBox="1"/>
+          <p:nvPr/>
+        </p:nvSpPr>
+        <p:spPr>
+          <a:xfrm>
+            <a:off x="5214634" y="4855272"/>
+            <a:ext cx="449050" cy="276999"/>
+          </a:xfrm>
+          <a:prstGeom prst="rect">
+            <a:avLst/>
+          </a:prstGeom>
+          <a:noFill/>
+        </p:spPr>
+        <p:txBody>
+          <a:bodyPr wrap="square" rtlCol="0">
+            <a:spAutoFit/>
+          </a:bodyPr>
+          <a:lstStyle/>
+          <a:p>
+            <a:r>
+              <a:rPr lang="en-US" sz="1200" dirty="0"/>
+              <a:t>1..n</a:t>
+            </a:r>
+          </a:p>
+        </p:txBody>
+      </p:sp>
+      <p:sp>
+        <p:nvSpPr>
+          <p:cNvPr id="18" name="Rechteck 17">
+            <a:extLst>
+              <a:ext uri="{FF2B5EF4-FFF2-40B4-BE49-F238E27FC236}">
+                <a16:creationId xmlns:a16="http://schemas.microsoft.com/office/drawing/2014/main" id="{0829C3EE-5802-4A0A-85D0-F4ADA84A4618}"/>
+              </a:ext>
+            </a:extLst>
+          </p:cNvPr>
+          <p:cNvSpPr/>
+          <p:nvPr/>
+        </p:nvSpPr>
+        <p:spPr>
+          <a:xfrm>
+            <a:off x="1237021" y="1296300"/>
+            <a:ext cx="2097888" cy="293614"/>
+          </a:xfrm>
+          <a:prstGeom prst="rect">
+            <a:avLst/>
+          </a:prstGeom>
+        </p:spPr>
+        <p:style>
+          <a:lnRef idx="2">
+            <a:schemeClr val="accent1">
+              <a:shade val="50000"/>
+            </a:schemeClr>
+          </a:lnRef>
+          <a:fillRef idx="1">
+            <a:schemeClr val="accent1"/>
+          </a:fillRef>
+          <a:effectRef idx="0">
+            <a:schemeClr val="accent1"/>
+          </a:effectRef>
+          <a:fontRef idx="minor">
+            <a:schemeClr val="lt1"/>
+          </a:fontRef>
+        </p:style>
+        <p:txBody>
+          <a:bodyPr rtlCol="0" anchor="ctr"/>
+          <a:lstStyle/>
+          <a:p>
+            <a:pPr algn="ctr"/>
+            <a:r>
+              <a:rPr lang="en-US" sz="1000" dirty="0"/>
+              <a:t>No of  materials</a:t>
+            </a:r>
+            <a:br>
+              <a:rPr lang="en-US" sz="1000" dirty="0"/>
+            </a:br>
+            <a:r>
+              <a:rPr lang="en-US" sz="1000" dirty="0"/>
+              <a:t>&lt;signed int&gt;</a:t>
+            </a:r>
+          </a:p>
+        </p:txBody>
+      </p:sp>
+      <p:grpSp>
+        <p:nvGrpSpPr>
+          <p:cNvPr id="19" name="Gruppieren 18">
+            <a:extLst>
+              <a:ext uri="{FF2B5EF4-FFF2-40B4-BE49-F238E27FC236}">
+                <a16:creationId xmlns:a16="http://schemas.microsoft.com/office/drawing/2014/main" id="{DC09AC49-AF1F-4162-9575-06DA5950E4D0}"/>
+              </a:ext>
+            </a:extLst>
+          </p:cNvPr>
+          <p:cNvGrpSpPr/>
+          <p:nvPr/>
+        </p:nvGrpSpPr>
+        <p:grpSpPr>
+          <a:xfrm>
+            <a:off x="2285965" y="1678002"/>
+            <a:ext cx="4411751" cy="249831"/>
+            <a:chOff x="803187" y="1173480"/>
+            <a:chExt cx="4411751" cy="249831"/>
+          </a:xfrm>
+        </p:grpSpPr>
+        <p:sp>
+          <p:nvSpPr>
+            <p:cNvPr id="20" name="Rechteck 19">
+              <a:extLst>
+                <a:ext uri="{FF2B5EF4-FFF2-40B4-BE49-F238E27FC236}">
+                  <a16:creationId xmlns:a16="http://schemas.microsoft.com/office/drawing/2014/main" id="{210A81BE-C9E6-48DA-A520-183D593BE998}"/>
+                </a:ext>
+              </a:extLst>
+            </p:cNvPr>
+            <p:cNvSpPr/>
+            <p:nvPr/>
+          </p:nvSpPr>
+          <p:spPr>
+            <a:xfrm>
+              <a:off x="803187" y="1173480"/>
+              <a:ext cx="4411751" cy="249831"/>
+            </a:xfrm>
+            <a:prstGeom prst="rect">
+              <a:avLst/>
+            </a:prstGeom>
+          </p:spPr>
+          <p:style>
+            <a:lnRef idx="2">
+              <a:schemeClr val="accent1">
+                <a:shade val="50000"/>
+              </a:schemeClr>
+            </a:lnRef>
+            <a:fillRef idx="1">
+              <a:schemeClr val="accent1"/>
+            </a:fillRef>
+            <a:effectRef idx="0">
+              <a:schemeClr val="accent1"/>
+            </a:effectRef>
+            <a:fontRef idx="minor">
+              <a:schemeClr val="lt1"/>
+            </a:fontRef>
+          </p:style>
+          <p:txBody>
+            <a:bodyPr rtlCol="0" anchor="ctr"/>
+            <a:lstStyle/>
+            <a:p>
+              <a:pPr algn="ctr"/>
+              <a:r>
+                <a:rPr lang="en-US" sz="1000" dirty="0"/>
+                <a:t>Material name</a:t>
+              </a:r>
+            </a:p>
+            <a:p>
+              <a:pPr algn="ctr"/>
+              <a:r>
+                <a:rPr lang="en-US" sz="1000" dirty="0"/>
+                <a:t>&lt;array of signed chars&gt;</a:t>
+              </a:r>
+            </a:p>
+          </p:txBody>
+        </p:sp>
+        <p:sp>
+          <p:nvSpPr>
+            <p:cNvPr id="21" name="Rechteck 20">
+              <a:extLst>
+                <a:ext uri="{FF2B5EF4-FFF2-40B4-BE49-F238E27FC236}">
+                  <a16:creationId xmlns:a16="http://schemas.microsoft.com/office/drawing/2014/main" id="{95E70207-6FED-4AD1-BEFB-038C2C7CB695}"/>
+                </a:ext>
+              </a:extLst>
+            </p:cNvPr>
+            <p:cNvSpPr/>
+            <p:nvPr/>
+          </p:nvSpPr>
+          <p:spPr>
+            <a:xfrm>
+              <a:off x="803187" y="1173480"/>
+              <a:ext cx="692238" cy="249831"/>
+            </a:xfrm>
+            <a:prstGeom prst="rect">
+              <a:avLst/>
+            </a:prstGeom>
+            <a:solidFill>
+              <a:schemeClr val="accent2"/>
+            </a:solidFill>
+          </p:spPr>
+          <p:style>
+            <a:lnRef idx="2">
+              <a:schemeClr val="accent1">
+                <a:shade val="50000"/>
+              </a:schemeClr>
+            </a:lnRef>
+            <a:fillRef idx="1">
+              <a:schemeClr val="accent1"/>
+            </a:fillRef>
+            <a:effectRef idx="0">
+              <a:schemeClr val="accent1"/>
+            </a:effectRef>
+            <a:fontRef idx="minor">
+              <a:schemeClr val="lt1"/>
+            </a:fontRef>
+          </p:style>
+          <p:txBody>
+            <a:bodyPr rtlCol="0" anchor="ctr"/>
+            <a:lstStyle/>
+            <a:p>
+              <a:pPr algn="ctr"/>
+              <a:r>
+                <a:rPr lang="en-US" sz="800" dirty="0"/>
+                <a:t>No of chars</a:t>
+              </a:r>
+              <a:br>
+                <a:rPr lang="en-US" sz="800" dirty="0"/>
+              </a:br>
+              <a:r>
+                <a:rPr lang="en-US" sz="800" dirty="0"/>
+                <a:t>&lt;short&gt;</a:t>
+              </a:r>
+            </a:p>
+          </p:txBody>
+        </p:sp>
+      </p:grpSp>
+      <p:sp>
+        <p:nvSpPr>
+          <p:cNvPr id="22" name="Rechteck 21">
+            <a:extLst>
+              <a:ext uri="{FF2B5EF4-FFF2-40B4-BE49-F238E27FC236}">
+                <a16:creationId xmlns:a16="http://schemas.microsoft.com/office/drawing/2014/main" id="{3775EB0A-4598-42F2-92CE-5C6823ACC1A6}"/>
+              </a:ext>
+            </a:extLst>
+          </p:cNvPr>
+          <p:cNvSpPr/>
+          <p:nvPr/>
+        </p:nvSpPr>
+        <p:spPr>
+          <a:xfrm>
+            <a:off x="2285965" y="2015921"/>
+            <a:ext cx="1396999" cy="293614"/>
+          </a:xfrm>
+          <a:prstGeom prst="rect">
+            <a:avLst/>
+          </a:prstGeom>
+          <a:solidFill>
+            <a:schemeClr val="accent2"/>
+          </a:solidFill>
+        </p:spPr>
+        <p:style>
+          <a:lnRef idx="2">
+            <a:schemeClr val="accent1">
+              <a:shade val="50000"/>
+            </a:schemeClr>
+          </a:lnRef>
+          <a:fillRef idx="1">
+            <a:schemeClr val="accent1"/>
+          </a:fillRef>
+          <a:effectRef idx="0">
+            <a:schemeClr val="accent1"/>
+          </a:effectRef>
+          <a:fontRef idx="minor">
+            <a:schemeClr val="lt1"/>
+          </a:fontRef>
+        </p:style>
+        <p:txBody>
+          <a:bodyPr rot="0" spcFirstLastPara="0" vertOverflow="overflow" horzOverflow="overflow" vert="horz" wrap="square" lIns="91440" tIns="45720" rIns="91440" bIns="45720" numCol="1" spcCol="0" rtlCol="0" fromWordArt="0" anchor="ctr" anchorCtr="0" forceAA="0" compatLnSpc="1">
+            <a:prstTxWarp prst="textNoShape">
+              <a:avLst/>
+            </a:prstTxWarp>
+            <a:noAutofit/>
+          </a:bodyPr>
+          <a:lstStyle/>
+          <a:p>
+            <a:pPr algn="ctr"/>
+            <a:r>
+              <a:rPr lang="en-US" sz="1000" dirty="0"/>
+              <a:t>“is </a:t>
+            </a:r>
+            <a:r>
+              <a:rPr lang="en-US" sz="1000" b="1" dirty="0"/>
+              <a:t>KA</a:t>
+            </a:r>
+            <a:r>
+              <a:rPr lang="en-US" sz="1000" dirty="0"/>
+              <a:t> ?” Bool 0 or 1</a:t>
+            </a:r>
+            <a:br>
+              <a:rPr lang="en-US" sz="1000" dirty="0"/>
+            </a:br>
+            <a:r>
+              <a:rPr lang="en-US" sz="1000" dirty="0"/>
+              <a:t>&lt;byte&gt;</a:t>
+            </a:r>
+          </a:p>
+        </p:txBody>
+      </p:sp>
+      <p:sp>
+        <p:nvSpPr>
+          <p:cNvPr id="23" name="Rechteck 22">
+            <a:extLst>
+              <a:ext uri="{FF2B5EF4-FFF2-40B4-BE49-F238E27FC236}">
+                <a16:creationId xmlns:a16="http://schemas.microsoft.com/office/drawing/2014/main" id="{AE3880BB-40C8-4370-AC6A-E1C00D204D24}"/>
+              </a:ext>
+            </a:extLst>
+          </p:cNvPr>
+          <p:cNvSpPr/>
+          <p:nvPr/>
+        </p:nvSpPr>
+        <p:spPr>
+          <a:xfrm>
+            <a:off x="3682964" y="2015921"/>
+            <a:ext cx="1139914" cy="293614"/>
+          </a:xfrm>
+          <a:prstGeom prst="rect">
+            <a:avLst/>
+          </a:prstGeom>
+          <a:solidFill>
+            <a:schemeClr val="accent6">
+              <a:lumMod val="60000"/>
+              <a:lumOff val="40000"/>
+            </a:schemeClr>
+          </a:solidFill>
+        </p:spPr>
+        <p:style>
+          <a:lnRef idx="2">
+            <a:schemeClr val="accent1">
+              <a:shade val="50000"/>
+            </a:schemeClr>
+          </a:lnRef>
+          <a:fillRef idx="1">
+            <a:schemeClr val="accent1"/>
+          </a:fillRef>
+          <a:effectRef idx="0">
+            <a:schemeClr val="accent1"/>
+          </a:effectRef>
+          <a:fontRef idx="minor">
+            <a:schemeClr val="lt1"/>
+          </a:fontRef>
+        </p:style>
+        <p:txBody>
+          <a:bodyPr rtlCol="0" anchor="ctr"/>
+          <a:lstStyle/>
+          <a:p>
+            <a:pPr algn="ctr"/>
+            <a:r>
+              <a:rPr lang="en-US" sz="1000" b="1" dirty="0"/>
+              <a:t>X,Y,Z </a:t>
+            </a:r>
+            <a:r>
+              <a:rPr lang="en-US" sz="1000" dirty="0"/>
+              <a:t>coordinates</a:t>
+            </a:r>
+          </a:p>
+          <a:p>
+            <a:pPr algn="ctr"/>
+            <a:r>
+              <a:rPr lang="en-US" sz="1000" dirty="0"/>
+              <a:t>Array of float [3]</a:t>
+            </a:r>
+          </a:p>
+        </p:txBody>
+      </p:sp>
+      <p:cxnSp>
+        <p:nvCxnSpPr>
+          <p:cNvPr id="24" name="Gerader Verbinder 23">
+            <a:extLst>
+              <a:ext uri="{FF2B5EF4-FFF2-40B4-BE49-F238E27FC236}">
+                <a16:creationId xmlns:a16="http://schemas.microsoft.com/office/drawing/2014/main" id="{8E993175-DEEA-43FA-9735-38FCA39CE0AD}"/>
+              </a:ext>
+            </a:extLst>
+          </p:cNvPr>
+          <p:cNvCxnSpPr>
+            <a:cxnSpLocks/>
+          </p:cNvCxnSpPr>
+          <p:nvPr/>
+        </p:nvCxnSpPr>
+        <p:spPr>
+          <a:xfrm>
+            <a:off x="1409350" y="2382350"/>
+            <a:ext cx="10251347" cy="0"/>
+          </a:xfrm>
+          <a:prstGeom prst="line">
+            <a:avLst/>
+          </a:prstGeom>
+          <a:ln w="15875">
+            <a:prstDash val="dash"/>
+          </a:ln>
+        </p:spPr>
+        <p:style>
+          <a:lnRef idx="1">
+            <a:schemeClr val="accent1"/>
+          </a:lnRef>
+          <a:fillRef idx="0">
+            <a:schemeClr val="accent1"/>
+          </a:fillRef>
+          <a:effectRef idx="0">
+            <a:schemeClr val="accent1"/>
+          </a:effectRef>
+          <a:fontRef idx="minor">
+            <a:schemeClr val="tx1"/>
+          </a:fontRef>
+        </p:style>
+      </p:cxnSp>
+      <p:cxnSp>
+        <p:nvCxnSpPr>
+          <p:cNvPr id="27" name="Gerader Verbinder 26">
+            <a:extLst>
+              <a:ext uri="{FF2B5EF4-FFF2-40B4-BE49-F238E27FC236}">
+                <a16:creationId xmlns:a16="http://schemas.microsoft.com/office/drawing/2014/main" id="{2906040C-7BD6-43AE-84A2-D38B605EFBE6}"/>
+              </a:ext>
+            </a:extLst>
+          </p:cNvPr>
+          <p:cNvCxnSpPr>
+            <a:cxnSpLocks/>
+          </p:cNvCxnSpPr>
+          <p:nvPr/>
+        </p:nvCxnSpPr>
+        <p:spPr>
+          <a:xfrm>
+            <a:off x="1343615" y="1685248"/>
+            <a:ext cx="0" cy="697102"/>
+          </a:xfrm>
+          <a:prstGeom prst="line">
+            <a:avLst/>
+          </a:prstGeom>
+          <a:ln w="15875">
+            <a:prstDash val="sysDash"/>
+            <a:headEnd type="arrow"/>
+            <a:tailEnd type="arrow"/>
+          </a:ln>
+        </p:spPr>
+        <p:style>
+          <a:lnRef idx="1">
+            <a:schemeClr val="accent1"/>
+          </a:lnRef>
+          <a:fillRef idx="0">
+            <a:schemeClr val="accent1"/>
+          </a:fillRef>
+          <a:effectRef idx="0">
+            <a:schemeClr val="accent1"/>
+          </a:effectRef>
+          <a:fontRef idx="minor">
+            <a:schemeClr val="tx1"/>
+          </a:fontRef>
+        </p:style>
+      </p:cxnSp>
+      <p:sp>
+        <p:nvSpPr>
+          <p:cNvPr id="2" name="Geschweifte Klammer rechts 1">
+            <a:extLst>
+              <a:ext uri="{FF2B5EF4-FFF2-40B4-BE49-F238E27FC236}">
+                <a16:creationId xmlns:a16="http://schemas.microsoft.com/office/drawing/2014/main" id="{39CE3399-5D85-4AEC-BBE6-8542B431D843}"/>
+              </a:ext>
+            </a:extLst>
+          </p:cNvPr>
+          <p:cNvSpPr/>
+          <p:nvPr/>
+        </p:nvSpPr>
+        <p:spPr>
+          <a:xfrm>
+            <a:off x="9068513" y="602185"/>
+            <a:ext cx="1216390" cy="1780161"/>
+          </a:xfrm>
+          <a:prstGeom prst="rightBrace">
+            <a:avLst>
+              <a:gd name="adj1" fmla="val 9272"/>
+              <a:gd name="adj2" fmla="val 48121"/>
+            </a:avLst>
+          </a:prstGeom>
+        </p:spPr>
+        <p:style>
+          <a:lnRef idx="1">
+            <a:schemeClr val="accent1"/>
+          </a:lnRef>
+          <a:fillRef idx="0">
+            <a:schemeClr val="accent1"/>
+          </a:fillRef>
+          <a:effectRef idx="0">
+            <a:schemeClr val="accent1"/>
+          </a:effectRef>
+          <a:fontRef idx="minor">
+            <a:schemeClr val="tx1"/>
+          </a:fontRef>
+        </p:style>
+        <p:txBody>
+          <a:bodyPr rtlCol="0" anchor="ctr"/>
+          <a:lstStyle/>
+          <a:p>
+            <a:pPr algn="ctr"/>
+            <a:endParaRPr lang="en-US"/>
+          </a:p>
+        </p:txBody>
+      </p:sp>
+      <p:sp>
+        <p:nvSpPr>
+          <p:cNvPr id="3" name="Rechteck 2">
+            <a:extLst>
+              <a:ext uri="{FF2B5EF4-FFF2-40B4-BE49-F238E27FC236}">
+                <a16:creationId xmlns:a16="http://schemas.microsoft.com/office/drawing/2014/main" id="{6DD55104-D2A0-4DF1-BF15-9BFDD8C85F71}"/>
+              </a:ext>
+            </a:extLst>
+          </p:cNvPr>
+          <p:cNvSpPr/>
+          <p:nvPr/>
+        </p:nvSpPr>
+        <p:spPr>
+          <a:xfrm>
+            <a:off x="10408261" y="1185129"/>
+            <a:ext cx="1303090" cy="570445"/>
+          </a:xfrm>
+          <a:prstGeom prst="rect">
+            <a:avLst/>
+          </a:prstGeom>
+          <a:solidFill>
+            <a:schemeClr val="tx2">
+              <a:lumMod val="20000"/>
+              <a:lumOff val="80000"/>
+            </a:schemeClr>
+          </a:solidFill>
+        </p:spPr>
+        <p:style>
+          <a:lnRef idx="2">
+            <a:schemeClr val="accent1">
+              <a:shade val="50000"/>
+            </a:schemeClr>
+          </a:lnRef>
+          <a:fillRef idx="1">
+            <a:schemeClr val="accent1"/>
+          </a:fillRef>
+          <a:effectRef idx="0">
+            <a:schemeClr val="accent1"/>
+          </a:effectRef>
+          <a:fontRef idx="minor">
+            <a:schemeClr val="lt1"/>
+          </a:fontRef>
+        </p:style>
+        <p:txBody>
+          <a:bodyPr rtlCol="0" anchor="ctr"/>
+          <a:lstStyle/>
+          <a:p>
+            <a:pPr algn="ctr"/>
+            <a:r>
+              <a:rPr lang="en-US" dirty="0">
+                <a:solidFill>
+                  <a:schemeClr val="tx1"/>
+                </a:solidFill>
+              </a:rPr>
+              <a:t>Array of materials</a:t>
+            </a:r>
+          </a:p>
+        </p:txBody>
+      </p:sp>
+      <p:sp>
+        <p:nvSpPr>
+          <p:cNvPr id="28" name="Geschweifte Klammer rechts 27">
+            <a:extLst>
+              <a:ext uri="{FF2B5EF4-FFF2-40B4-BE49-F238E27FC236}">
+                <a16:creationId xmlns:a16="http://schemas.microsoft.com/office/drawing/2014/main" id="{46E4E3DE-5360-4063-90D9-9D46DCF8107B}"/>
+              </a:ext>
+            </a:extLst>
+          </p:cNvPr>
+          <p:cNvSpPr/>
+          <p:nvPr/>
+        </p:nvSpPr>
+        <p:spPr>
+          <a:xfrm rot="10800000">
+            <a:off x="721708" y="2382343"/>
+            <a:ext cx="449051" cy="3964801"/>
+          </a:xfrm>
+          <a:prstGeom prst="rightBrace">
+            <a:avLst>
+              <a:gd name="adj1" fmla="val 9272"/>
+              <a:gd name="adj2" fmla="val 48121"/>
+            </a:avLst>
+          </a:prstGeom>
+        </p:spPr>
+        <p:style>
+          <a:lnRef idx="1">
+            <a:schemeClr val="accent1"/>
+          </a:lnRef>
+          <a:fillRef idx="0">
+            <a:schemeClr val="accent1"/>
+          </a:fillRef>
+          <a:effectRef idx="0">
+            <a:schemeClr val="accent1"/>
+          </a:effectRef>
+          <a:fontRef idx="minor">
+            <a:schemeClr val="tx1"/>
+          </a:fontRef>
+        </p:style>
+        <p:txBody>
+          <a:bodyPr rtlCol="0" anchor="ctr"/>
+          <a:lstStyle/>
+          <a:p>
+            <a:pPr algn="ctr"/>
+            <a:endParaRPr lang="en-US"/>
+          </a:p>
+        </p:txBody>
+      </p:sp>
+      <p:sp>
+        <p:nvSpPr>
+          <p:cNvPr id="29" name="Rechteck 28">
+            <a:extLst>
+              <a:ext uri="{FF2B5EF4-FFF2-40B4-BE49-F238E27FC236}">
+                <a16:creationId xmlns:a16="http://schemas.microsoft.com/office/drawing/2014/main" id="{B79D04D6-4E11-4C3E-80B3-EDBA8E7A5D4E}"/>
+              </a:ext>
+            </a:extLst>
+          </p:cNvPr>
+          <p:cNvSpPr/>
+          <p:nvPr/>
+        </p:nvSpPr>
+        <p:spPr>
+          <a:xfrm rot="16200000">
+            <a:off x="-71421" y="4067447"/>
+            <a:ext cx="1303090" cy="570445"/>
+          </a:xfrm>
+          <a:prstGeom prst="rect">
+            <a:avLst/>
+          </a:prstGeom>
+          <a:solidFill>
+            <a:schemeClr val="tx2">
+              <a:lumMod val="20000"/>
+              <a:lumOff val="80000"/>
+            </a:schemeClr>
+          </a:solidFill>
+        </p:spPr>
+        <p:style>
+          <a:lnRef idx="2">
+            <a:schemeClr val="accent1">
+              <a:shade val="50000"/>
+            </a:schemeClr>
+          </a:lnRef>
+          <a:fillRef idx="1">
+            <a:schemeClr val="accent1"/>
+          </a:fillRef>
+          <a:effectRef idx="0">
+            <a:schemeClr val="accent1"/>
+          </a:effectRef>
+          <a:fontRef idx="minor">
+            <a:schemeClr val="lt1"/>
+          </a:fontRef>
+        </p:style>
+        <p:txBody>
+          <a:bodyPr rtlCol="0" anchor="ctr"/>
+          <a:lstStyle/>
+          <a:p>
+            <a:pPr algn="ctr"/>
+            <a:r>
+              <a:rPr lang="en-US" dirty="0">
+                <a:solidFill>
+                  <a:schemeClr val="tx1"/>
+                </a:solidFill>
+              </a:rPr>
+              <a:t>Array of vertices</a:t>
+            </a:r>
+          </a:p>
+        </p:txBody>
+      </p:sp>
+    </p:spTree>
+    <p:extLst>
+      <p:ext uri="{BB962C8B-B14F-4D97-AF65-F5344CB8AC3E}">
+        <p14:creationId xmlns:p14="http://schemas.microsoft.com/office/powerpoint/2010/main" val="900851267"/>
+      </p:ext>
+    </p:extLst>
+  </p:cSld>
+  <p:clrMapOvr>
+    <a:masterClrMapping/>
+  </p:clrMapOvr>
+</p:sld>
+</file>
+
+<file path=ppt/slides/slide7.xml><?xml version="1.0" encoding="utf-8"?>
 <p:sld xmlns:a="http://schemas.openxmlformats.org/drawingml/2006/main" xmlns:r="http://schemas.openxmlformats.org/officeDocument/2006/relationships" xmlns:p="http://schemas.openxmlformats.org/presentationml/2006/main">
   <p:cSld>
     <p:spTree>
@@ -7407,7 +8615,7 @@
 </p:sld>
 </file>
 
-<file path=ppt/slides/slide7.xml><?xml version="1.0" encoding="utf-8"?>
+<file path=ppt/slides/slide8.xml><?xml version="1.0" encoding="utf-8"?>
 <p:sld xmlns:a="http://schemas.openxmlformats.org/drawingml/2006/main" xmlns:r="http://schemas.openxmlformats.org/officeDocument/2006/relationships" xmlns:p="http://schemas.openxmlformats.org/presentationml/2006/main">
   <p:cSld>
     <p:spTree>
@@ -8149,353 +9357,6 @@
     <p:extLst>
       <p:ext uri="{BB962C8B-B14F-4D97-AF65-F5344CB8AC3E}">
         <p14:creationId xmlns:p14="http://schemas.microsoft.com/office/powerpoint/2010/main" val="3991119877"/>
-      </p:ext>
-    </p:extLst>
-  </p:cSld>
-  <p:clrMapOvr>
-    <a:masterClrMapping/>
-  </p:clrMapOvr>
-</p:sld>
-</file>
-
-<file path=ppt/slides/slide8.xml><?xml version="1.0" encoding="utf-8"?>
-<p:sld xmlns:a="http://schemas.openxmlformats.org/drawingml/2006/main" xmlns:r="http://schemas.openxmlformats.org/officeDocument/2006/relationships" xmlns:p="http://schemas.openxmlformats.org/presentationml/2006/main">
-  <p:cSld>
-    <p:spTree>
-      <p:nvGrpSpPr>
-        <p:cNvPr id="1" name=""/>
-        <p:cNvGrpSpPr/>
-        <p:nvPr/>
-      </p:nvGrpSpPr>
-      <p:grpSpPr>
-        <a:xfrm>
-          <a:off x="0" y="0"/>
-          <a:ext cx="0" cy="0"/>
-          <a:chOff x="0" y="0"/>
-          <a:chExt cx="0" cy="0"/>
-        </a:xfrm>
-      </p:grpSpPr>
-      <p:sp>
-        <p:nvSpPr>
-          <p:cNvPr id="4" name="Textfeld 3">
-            <a:extLst>
-              <a:ext uri="{FF2B5EF4-FFF2-40B4-BE49-F238E27FC236}">
-                <a16:creationId xmlns:a16="http://schemas.microsoft.com/office/drawing/2014/main" id="{1E6CB427-E49A-4BF4-9E5E-CD11C40C3810}"/>
-              </a:ext>
-            </a:extLst>
-          </p:cNvPr>
-          <p:cNvSpPr txBox="1"/>
-          <p:nvPr/>
-        </p:nvSpPr>
-        <p:spPr>
-          <a:xfrm>
-            <a:off x="243281" y="226503"/>
-            <a:ext cx="11862033" cy="369332"/>
-          </a:xfrm>
-          <a:prstGeom prst="rect">
-            <a:avLst/>
-          </a:prstGeom>
-          <a:noFill/>
-        </p:spPr>
-        <p:txBody>
-          <a:bodyPr wrap="square" rtlCol="0">
-            <a:spAutoFit/>
-          </a:bodyPr>
-          <a:lstStyle/>
-          <a:p>
-            <a:r>
-              <a:rPr lang="en-US" dirty="0"/>
-              <a:t>Known limitations: MTL structure</a:t>
-            </a:r>
-          </a:p>
-        </p:txBody>
-      </p:sp>
-      <p:sp>
-        <p:nvSpPr>
-          <p:cNvPr id="23" name="Textfeld 22">
-            <a:extLst>
-              <a:ext uri="{FF2B5EF4-FFF2-40B4-BE49-F238E27FC236}">
-                <a16:creationId xmlns:a16="http://schemas.microsoft.com/office/drawing/2014/main" id="{D4EEA3AA-84FE-4E76-B685-386FFC9EF8BD}"/>
-              </a:ext>
-            </a:extLst>
-          </p:cNvPr>
-          <p:cNvSpPr txBox="1"/>
-          <p:nvPr/>
-        </p:nvSpPr>
-        <p:spPr>
-          <a:xfrm>
-            <a:off x="243281" y="595836"/>
-            <a:ext cx="11862033" cy="3000821"/>
-          </a:xfrm>
-          <a:prstGeom prst="rect">
-            <a:avLst/>
-          </a:prstGeom>
-          <a:noFill/>
-        </p:spPr>
-        <p:txBody>
-          <a:bodyPr wrap="square" rtlCol="0">
-            <a:spAutoFit/>
-          </a:bodyPr>
-          <a:lstStyle/>
-          <a:p>
-            <a:pPr marL="342900" indent="-342900">
-              <a:buFont typeface="+mj-lt"/>
-              <a:buAutoNum type="arabicPeriod"/>
-            </a:pPr>
-            <a:r>
-              <a:rPr lang="en-US" dirty="0" err="1"/>
-              <a:t>Map_ka</a:t>
-            </a:r>
-            <a:r>
-              <a:rPr lang="en-US" dirty="0"/>
-              <a:t>, </a:t>
-            </a:r>
-            <a:r>
-              <a:rPr lang="en-US" dirty="0" err="1"/>
-              <a:t>map_kd</a:t>
-            </a:r>
-            <a:r>
-              <a:rPr lang="en-US" dirty="0"/>
-              <a:t> are supported without “options”:</a:t>
-            </a:r>
-            <a:br>
-              <a:rPr lang="en-US" dirty="0"/>
-            </a:br>
-            <a:endParaRPr lang="en-US" dirty="0"/>
-          </a:p>
-          <a:p>
-            <a:pPr marL="800100" lvl="1" indent="-342900">
-              <a:buFont typeface="Arial" panose="020B0604020202020204" pitchFamily="34" charset="0"/>
-              <a:buChar char="•"/>
-            </a:pPr>
-            <a:r>
-              <a:rPr lang="en-US" dirty="0">
-                <a:highlight>
-                  <a:srgbClr val="00FF00"/>
-                </a:highlight>
-              </a:rPr>
-              <a:t>OK</a:t>
-            </a:r>
-            <a:r>
-              <a:rPr lang="en-US" dirty="0"/>
-              <a:t> =&gt; “</a:t>
-            </a:r>
-            <a:r>
-              <a:rPr lang="en-US" i="1" dirty="0" err="1">
-                <a:solidFill>
-                  <a:schemeClr val="accent6"/>
-                </a:solidFill>
-              </a:rPr>
-              <a:t>map_Ka</a:t>
-            </a:r>
-            <a:r>
-              <a:rPr lang="en-US" i="1" dirty="0">
-                <a:solidFill>
-                  <a:schemeClr val="accent6"/>
-                </a:solidFill>
-              </a:rPr>
-              <a:t> mapfile.png</a:t>
-            </a:r>
-            <a:r>
-              <a:rPr lang="en-US" dirty="0"/>
-              <a:t>”</a:t>
-            </a:r>
-          </a:p>
-          <a:p>
-            <a:pPr marL="800100" lvl="1" indent="-342900">
-              <a:buFont typeface="Arial" panose="020B0604020202020204" pitchFamily="34" charset="0"/>
-              <a:buChar char="•"/>
-            </a:pPr>
-            <a:r>
-              <a:rPr lang="en-US" dirty="0">
-                <a:highlight>
-                  <a:srgbClr val="FF0000"/>
-                </a:highlight>
-              </a:rPr>
-              <a:t>NOK</a:t>
-            </a:r>
-            <a:r>
-              <a:rPr lang="en-US" dirty="0"/>
-              <a:t> =&gt; “</a:t>
-            </a:r>
-            <a:r>
-              <a:rPr lang="en-US" i="1" dirty="0" err="1">
-                <a:solidFill>
-                  <a:srgbClr val="FF0000"/>
-                </a:solidFill>
-              </a:rPr>
-              <a:t>map_Ka</a:t>
-            </a:r>
-            <a:r>
-              <a:rPr lang="en-US" i="1" dirty="0">
-                <a:solidFill>
-                  <a:srgbClr val="FF0000"/>
-                </a:solidFill>
-              </a:rPr>
-              <a:t> -s 1 1 1 -o 0 0 0 -mm 0 1 </a:t>
-            </a:r>
-            <a:r>
-              <a:rPr lang="en-US" i="1" dirty="0" err="1">
-                <a:solidFill>
-                  <a:srgbClr val="FF0000"/>
-                </a:solidFill>
-              </a:rPr>
-              <a:t>chrome.mpc</a:t>
-            </a:r>
-            <a:r>
-              <a:rPr lang="en-US" dirty="0"/>
-              <a:t>” (</a:t>
-            </a:r>
-            <a:r>
-              <a:rPr lang="en-US" u="sng" dirty="0"/>
-              <a:t>program will crash</a:t>
-            </a:r>
-            <a:r>
-              <a:rPr lang="en-US" dirty="0"/>
-              <a:t>!)</a:t>
-            </a:r>
-          </a:p>
-          <a:p>
-            <a:pPr marL="800100" lvl="1" indent="-342900">
-              <a:buFont typeface="Arial" panose="020B0604020202020204" pitchFamily="34" charset="0"/>
-              <a:buChar char="•"/>
-            </a:pPr>
-            <a:r>
-              <a:rPr lang="en-US" dirty="0"/>
-              <a:t>Options that are not supported (according to </a:t>
-            </a:r>
-            <a:r>
-              <a:rPr lang="en-US" dirty="0">
-                <a:hlinkClick r:id="rId2"/>
-              </a:rPr>
-              <a:t>http://paulbourke.net/dataformats/mtl/</a:t>
-            </a:r>
-            <a:r>
-              <a:rPr lang="en-US" dirty="0"/>
-              <a:t> )</a:t>
-            </a:r>
-          </a:p>
-          <a:p>
-            <a:pPr marL="1257300" lvl="2" indent="-342900">
-              <a:buFont typeface="Courier New" panose="02070309020205020404" pitchFamily="49" charset="0"/>
-              <a:buChar char="o"/>
-            </a:pPr>
-            <a:r>
-              <a:rPr lang="en-US" sz="1100" dirty="0"/>
-              <a:t>-</a:t>
-            </a:r>
-            <a:r>
-              <a:rPr lang="en-US" sz="1100" dirty="0" err="1"/>
-              <a:t>blendu</a:t>
-            </a:r>
-            <a:r>
-              <a:rPr lang="en-US" sz="1100" dirty="0"/>
-              <a:t> on | off</a:t>
-            </a:r>
-          </a:p>
-          <a:p>
-            <a:pPr marL="1257300" lvl="2" indent="-342900">
-              <a:buFont typeface="Courier New" panose="02070309020205020404" pitchFamily="49" charset="0"/>
-              <a:buChar char="o"/>
-            </a:pPr>
-            <a:r>
-              <a:rPr lang="en-US" sz="1100" dirty="0"/>
-              <a:t>-</a:t>
-            </a:r>
-            <a:r>
-              <a:rPr lang="en-US" sz="1100" dirty="0" err="1"/>
-              <a:t>blendv</a:t>
-            </a:r>
-            <a:r>
-              <a:rPr lang="en-US" sz="1100" dirty="0"/>
-              <a:t> on | off</a:t>
-            </a:r>
-          </a:p>
-          <a:p>
-            <a:pPr marL="1257300" lvl="2" indent="-342900">
-              <a:buFont typeface="Courier New" panose="02070309020205020404" pitchFamily="49" charset="0"/>
-              <a:buChar char="o"/>
-            </a:pPr>
-            <a:r>
-              <a:rPr lang="en-US" sz="1100" dirty="0"/>
-              <a:t>-cc on | off</a:t>
-            </a:r>
-          </a:p>
-          <a:p>
-            <a:pPr marL="1257300" lvl="2" indent="-342900">
-              <a:buFont typeface="Courier New" panose="02070309020205020404" pitchFamily="49" charset="0"/>
-              <a:buChar char="o"/>
-            </a:pPr>
-            <a:r>
-              <a:rPr lang="en-US" sz="1100" dirty="0"/>
-              <a:t>-clamp on | off</a:t>
-            </a:r>
-          </a:p>
-          <a:p>
-            <a:pPr marL="1257300" lvl="2" indent="-342900">
-              <a:buFont typeface="Courier New" panose="02070309020205020404" pitchFamily="49" charset="0"/>
-              <a:buChar char="o"/>
-            </a:pPr>
-            <a:r>
-              <a:rPr lang="en-US" sz="1100" dirty="0"/>
-              <a:t>-mm base gain</a:t>
-            </a:r>
-          </a:p>
-          <a:p>
-            <a:pPr marL="1257300" lvl="2" indent="-342900">
-              <a:buFont typeface="Courier New" panose="02070309020205020404" pitchFamily="49" charset="0"/>
-              <a:buChar char="o"/>
-            </a:pPr>
-            <a:r>
-              <a:rPr lang="en-US" sz="1100" dirty="0"/>
-              <a:t>-o u v w</a:t>
-            </a:r>
-          </a:p>
-          <a:p>
-            <a:pPr marL="1257300" lvl="2" indent="-342900">
-              <a:buFont typeface="Courier New" panose="02070309020205020404" pitchFamily="49" charset="0"/>
-              <a:buChar char="o"/>
-            </a:pPr>
-            <a:r>
-              <a:rPr lang="en-US" sz="1100" dirty="0"/>
-              <a:t>-s u v w</a:t>
-            </a:r>
-          </a:p>
-          <a:p>
-            <a:pPr marL="1257300" lvl="2" indent="-342900">
-              <a:buFont typeface="Courier New" panose="02070309020205020404" pitchFamily="49" charset="0"/>
-              <a:buChar char="o"/>
-            </a:pPr>
-            <a:r>
-              <a:rPr lang="en-US" sz="1100" dirty="0"/>
-              <a:t>-t u v w</a:t>
-            </a:r>
-          </a:p>
-          <a:p>
-            <a:pPr marL="1257300" lvl="2" indent="-342900">
-              <a:buFont typeface="Courier New" panose="02070309020205020404" pitchFamily="49" charset="0"/>
-              <a:buChar char="o"/>
-            </a:pPr>
-            <a:r>
-              <a:rPr lang="en-US" sz="1100" dirty="0"/>
-              <a:t>-</a:t>
-            </a:r>
-            <a:r>
-              <a:rPr lang="en-US" sz="1100" dirty="0" err="1"/>
-              <a:t>texres</a:t>
-            </a:r>
-            <a:r>
-              <a:rPr lang="en-US" sz="1100" dirty="0"/>
-              <a:t> value</a:t>
-            </a:r>
-            <a:endParaRPr lang="en-US" dirty="0"/>
-          </a:p>
-        </p:txBody>
-      </p:sp>
-    </p:spTree>
-    <p:extLst>
-      <p:ext uri="{BB962C8B-B14F-4D97-AF65-F5344CB8AC3E}">
-        <p14:creationId xmlns:p14="http://schemas.microsoft.com/office/powerpoint/2010/main" val="1691624654"/>
       </p:ext>
     </p:extLst>
   </p:cSld>
@@ -9988,7 +10849,7 @@
           <a:p>
             <a:r>
               <a:rPr lang="en-US" dirty="0"/>
-              <a:t>See page 7</a:t>
+              <a:t>See page 8</a:t>
             </a:r>
           </a:p>
         </p:txBody>

</xml_diff>

<commit_message>
Add support for Map_Ks and Map_Ke
</commit_message>
<xml_diff>
--- a/docs/OBJ to binary structure_20210611_V1.1.pptx
+++ b/docs/OBJ to binary structure_20210611_V1.1.pptx
@@ -273,7 +273,7 @@
           <a:p>
             <a:fld id="{B2678478-075C-4254-9D50-CE1E7AF0251E}" type="datetimeFigureOut">
               <a:rPr lang="en-US" smtClean="0"/>
-              <a:t>8/29/2021</a:t>
+              <a:t>9/19/2021</a:t>
             </a:fld>
             <a:endParaRPr lang="en-US"/>
           </a:p>
@@ -473,7 +473,7 @@
           <a:p>
             <a:fld id="{B2678478-075C-4254-9D50-CE1E7AF0251E}" type="datetimeFigureOut">
               <a:rPr lang="en-US" smtClean="0"/>
-              <a:t>8/29/2021</a:t>
+              <a:t>9/19/2021</a:t>
             </a:fld>
             <a:endParaRPr lang="en-US"/>
           </a:p>
@@ -683,7 +683,7 @@
           <a:p>
             <a:fld id="{B2678478-075C-4254-9D50-CE1E7AF0251E}" type="datetimeFigureOut">
               <a:rPr lang="en-US" smtClean="0"/>
-              <a:t>8/29/2021</a:t>
+              <a:t>9/19/2021</a:t>
             </a:fld>
             <a:endParaRPr lang="en-US"/>
           </a:p>
@@ -883,7 +883,7 @@
           <a:p>
             <a:fld id="{B2678478-075C-4254-9D50-CE1E7AF0251E}" type="datetimeFigureOut">
               <a:rPr lang="en-US" smtClean="0"/>
-              <a:t>8/29/2021</a:t>
+              <a:t>9/19/2021</a:t>
             </a:fld>
             <a:endParaRPr lang="en-US"/>
           </a:p>
@@ -1159,7 +1159,7 @@
           <a:p>
             <a:fld id="{B2678478-075C-4254-9D50-CE1E7AF0251E}" type="datetimeFigureOut">
               <a:rPr lang="en-US" smtClean="0"/>
-              <a:t>8/29/2021</a:t>
+              <a:t>9/19/2021</a:t>
             </a:fld>
             <a:endParaRPr lang="en-US"/>
           </a:p>
@@ -1427,7 +1427,7 @@
           <a:p>
             <a:fld id="{B2678478-075C-4254-9D50-CE1E7AF0251E}" type="datetimeFigureOut">
               <a:rPr lang="en-US" smtClean="0"/>
-              <a:t>8/29/2021</a:t>
+              <a:t>9/19/2021</a:t>
             </a:fld>
             <a:endParaRPr lang="en-US"/>
           </a:p>
@@ -1842,7 +1842,7 @@
           <a:p>
             <a:fld id="{B2678478-075C-4254-9D50-CE1E7AF0251E}" type="datetimeFigureOut">
               <a:rPr lang="en-US" smtClean="0"/>
-              <a:t>8/29/2021</a:t>
+              <a:t>9/19/2021</a:t>
             </a:fld>
             <a:endParaRPr lang="en-US"/>
           </a:p>
@@ -1984,7 +1984,7 @@
           <a:p>
             <a:fld id="{B2678478-075C-4254-9D50-CE1E7AF0251E}" type="datetimeFigureOut">
               <a:rPr lang="en-US" smtClean="0"/>
-              <a:t>8/29/2021</a:t>
+              <a:t>9/19/2021</a:t>
             </a:fld>
             <a:endParaRPr lang="en-US"/>
           </a:p>
@@ -2097,7 +2097,7 @@
           <a:p>
             <a:fld id="{B2678478-075C-4254-9D50-CE1E7AF0251E}" type="datetimeFigureOut">
               <a:rPr lang="en-US" smtClean="0"/>
-              <a:t>8/29/2021</a:t>
+              <a:t>9/19/2021</a:t>
             </a:fld>
             <a:endParaRPr lang="en-US"/>
           </a:p>
@@ -2410,7 +2410,7 @@
           <a:p>
             <a:fld id="{B2678478-075C-4254-9D50-CE1E7AF0251E}" type="datetimeFigureOut">
               <a:rPr lang="en-US" smtClean="0"/>
-              <a:t>8/29/2021</a:t>
+              <a:t>9/19/2021</a:t>
             </a:fld>
             <a:endParaRPr lang="en-US"/>
           </a:p>
@@ -2699,7 +2699,7 @@
           <a:p>
             <a:fld id="{B2678478-075C-4254-9D50-CE1E7AF0251E}" type="datetimeFigureOut">
               <a:rPr lang="en-US" smtClean="0"/>
-              <a:t>8/29/2021</a:t>
+              <a:t>9/19/2021</a:t>
             </a:fld>
             <a:endParaRPr lang="en-US"/>
           </a:p>
@@ -2942,7 +2942,7 @@
           <a:p>
             <a:fld id="{B2678478-075C-4254-9D50-CE1E7AF0251E}" type="datetimeFigureOut">
               <a:rPr lang="en-US" smtClean="0"/>
-              <a:t>8/29/2021</a:t>
+              <a:t>9/19/2021</a:t>
             </a:fld>
             <a:endParaRPr lang="en-US"/>
           </a:p>
@@ -3418,7 +3418,7 @@
           <a:p>
             <a:r>
               <a:rPr lang="en-US" dirty="0"/>
-              <a:t>V1.1</a:t>
+              <a:t>V1.2</a:t>
             </a:r>
           </a:p>
           <a:p>
@@ -3513,7 +3513,7 @@
         <p:spPr>
           <a:xfrm>
             <a:off x="243281" y="595836"/>
-            <a:ext cx="11862033" cy="1754326"/>
+            <a:ext cx="11862033" cy="4062651"/>
           </a:xfrm>
           <a:prstGeom prst="rect">
             <a:avLst/>
@@ -3534,6 +3534,149 @@
               <a:rPr lang="en-US" dirty="0"/>
               <a:t>MTL parser (continue)</a:t>
             </a:r>
+          </a:p>
+          <a:p>
+            <a:pPr marL="800100" lvl="1" indent="-342900">
+              <a:buFont typeface="Arial" panose="020B0604020202020204" pitchFamily="34" charset="0"/>
+              <a:buChar char="•"/>
+            </a:pPr>
+            <a:r>
+              <a:rPr lang="en-US" dirty="0"/>
+              <a:t>Illum = “specifies the illumination model to use in the material” (</a:t>
+            </a:r>
+            <a:r>
+              <a:rPr lang="en-US" sz="1050" dirty="0"/>
+              <a:t>hint: search for “</a:t>
+            </a:r>
+            <a:r>
+              <a:rPr lang="en-US" sz="1050" i="1" dirty="0"/>
+              <a:t>The illumination models are:</a:t>
+            </a:r>
+            <a:r>
+              <a:rPr lang="en-US" sz="1050" dirty="0"/>
+              <a:t>” </a:t>
+            </a:r>
+            <a:r>
+              <a:rPr lang="en-US" sz="1050" dirty="0">
+                <a:hlinkClick r:id="rId2"/>
+              </a:rPr>
+              <a:t>http://paulbourke.net/dataformats/mtl/</a:t>
+            </a:r>
+            <a:r>
+              <a:rPr lang="en-US" dirty="0"/>
+              <a:t>)</a:t>
+            </a:r>
+          </a:p>
+          <a:p>
+            <a:pPr marL="1257300" lvl="2" indent="-342900">
+              <a:buFont typeface="Arial" panose="020B0604020202020204" pitchFamily="34" charset="0"/>
+              <a:buChar char="•"/>
+            </a:pPr>
+            <a:r>
+              <a:rPr lang="en-US" sz="1200" dirty="0"/>
+              <a:t>0		Color on and Ambient off</a:t>
+            </a:r>
+          </a:p>
+          <a:p>
+            <a:pPr marL="1257300" lvl="2" indent="-342900">
+              <a:buFont typeface="Arial" panose="020B0604020202020204" pitchFamily="34" charset="0"/>
+              <a:buChar char="•"/>
+            </a:pPr>
+            <a:r>
+              <a:rPr lang="en-US" sz="1200" dirty="0"/>
+              <a:t>1		Color on and Ambient on</a:t>
+            </a:r>
+          </a:p>
+          <a:p>
+            <a:pPr marL="1257300" lvl="2" indent="-342900">
+              <a:buFont typeface="Arial" panose="020B0604020202020204" pitchFamily="34" charset="0"/>
+              <a:buChar char="•"/>
+            </a:pPr>
+            <a:r>
+              <a:rPr lang="en-US" sz="1200" dirty="0"/>
+              <a:t>2		Highlight on</a:t>
+            </a:r>
+          </a:p>
+          <a:p>
+            <a:pPr marL="1257300" lvl="2" indent="-342900">
+              <a:buFont typeface="Arial" panose="020B0604020202020204" pitchFamily="34" charset="0"/>
+              <a:buChar char="•"/>
+            </a:pPr>
+            <a:r>
+              <a:rPr lang="en-US" sz="1200" dirty="0"/>
+              <a:t>3		Reflection on and Ray trace on</a:t>
+            </a:r>
+          </a:p>
+          <a:p>
+            <a:pPr marL="1257300" lvl="2" indent="-342900">
+              <a:buFont typeface="Arial" panose="020B0604020202020204" pitchFamily="34" charset="0"/>
+              <a:buChar char="•"/>
+            </a:pPr>
+            <a:r>
+              <a:rPr lang="en-US" sz="1200" dirty="0"/>
+              <a:t>4		Transparency: Glass on; Reflection: Ray trace on</a:t>
+            </a:r>
+          </a:p>
+          <a:p>
+            <a:pPr marL="1257300" lvl="2" indent="-342900">
+              <a:buFont typeface="Arial" panose="020B0604020202020204" pitchFamily="34" charset="0"/>
+              <a:buChar char="•"/>
+            </a:pPr>
+            <a:r>
+              <a:rPr lang="en-US" sz="1200" dirty="0"/>
+              <a:t> 5		Reflection: Fresnel on and Ray trace on</a:t>
+            </a:r>
+          </a:p>
+          <a:p>
+            <a:pPr marL="1257300" lvl="2" indent="-342900">
+              <a:buFont typeface="Arial" panose="020B0604020202020204" pitchFamily="34" charset="0"/>
+              <a:buChar char="•"/>
+            </a:pPr>
+            <a:r>
+              <a:rPr lang="en-US" sz="1200" dirty="0"/>
+              <a:t> 6		Transparency: Refraction on; Reflection: Fresnel off and Ray trace on</a:t>
+            </a:r>
+          </a:p>
+          <a:p>
+            <a:pPr marL="1257300" lvl="2" indent="-342900">
+              <a:buFont typeface="Arial" panose="020B0604020202020204" pitchFamily="34" charset="0"/>
+              <a:buChar char="•"/>
+            </a:pPr>
+            <a:r>
+              <a:rPr lang="en-US" sz="1200" dirty="0"/>
+              <a:t> 7		Transparency: Refraction on; Reflection: Fresnel on and Ray trace on</a:t>
+            </a:r>
+          </a:p>
+          <a:p>
+            <a:pPr marL="1257300" lvl="2" indent="-342900">
+              <a:buFont typeface="Arial" panose="020B0604020202020204" pitchFamily="34" charset="0"/>
+              <a:buChar char="•"/>
+            </a:pPr>
+            <a:r>
+              <a:rPr lang="en-US" sz="1200" dirty="0"/>
+              <a:t> 8		Reflection on and Ray trace off</a:t>
+            </a:r>
+          </a:p>
+          <a:p>
+            <a:pPr marL="1257300" lvl="2" indent="-342900">
+              <a:buFont typeface="Arial" panose="020B0604020202020204" pitchFamily="34" charset="0"/>
+              <a:buChar char="•"/>
+            </a:pPr>
+            <a:r>
+              <a:rPr lang="en-US" sz="1200" dirty="0"/>
+              <a:t> 9		Transparency: Glass on; Reflection: Ray trace off</a:t>
+            </a:r>
+          </a:p>
+          <a:p>
+            <a:pPr marL="1257300" lvl="2" indent="-342900">
+              <a:buFont typeface="Arial" panose="020B0604020202020204" pitchFamily="34" charset="0"/>
+              <a:buChar char="•"/>
+            </a:pPr>
+            <a:r>
+              <a:rPr lang="en-US" sz="1200" dirty="0"/>
+              <a:t> 10		Casts shadows onto invisible surfaces</a:t>
+            </a:r>
+            <a:endParaRPr lang="en-US" dirty="0"/>
           </a:p>
           <a:p>
             <a:pPr marL="800100" lvl="1" indent="-342900">
@@ -4414,7 +4557,7 @@
           <p:nvPr>
             <p:extLst>
               <p:ext uri="{D42A27DB-BD31-4B8C-83A1-F6EECF244321}">
-                <p14:modId xmlns:p14="http://schemas.microsoft.com/office/powerpoint/2010/main" val="87759324"/>
+                <p14:modId xmlns:p14="http://schemas.microsoft.com/office/powerpoint/2010/main" val="1628814321"/>
               </p:ext>
             </p:extLst>
           </p:nvPr>
@@ -4550,7 +4693,10 @@
                     <a:bodyPr/>
                     <a:lstStyle/>
                     <a:p>
-                      <a:endParaRPr lang="en-US"/>
+                      <a:r>
+                        <a:rPr lang="en-US" dirty="0"/>
+                        <a:t>1.2</a:t>
+                      </a:r>
                     </a:p>
                   </a:txBody>
                   <a:tcPr/>
@@ -4560,7 +4706,18 @@
                     <a:bodyPr/>
                     <a:lstStyle/>
                     <a:p>
-                      <a:endParaRPr lang="en-US" dirty="0"/>
+                      <a:r>
+                        <a:rPr lang="en-US" dirty="0"/>
+                        <a:t>Update MTL structure with the support for the </a:t>
+                      </a:r>
+                      <a:r>
+                        <a:rPr lang="en-US" dirty="0" err="1"/>
+                        <a:t>Map_Ke</a:t>
+                      </a:r>
+                      <a:r>
+                        <a:rPr lang="en-US" dirty="0"/>
+                        <a:t> parameter</a:t>
+                      </a:r>
                     </a:p>
                   </a:txBody>
                   <a:tcPr/>
@@ -8564,7 +8721,7 @@
         </p:nvGrpSpPr>
         <p:grpSpPr>
           <a:xfrm>
-            <a:off x="1551377" y="4519431"/>
+            <a:off x="1544440" y="4854869"/>
             <a:ext cx="4411751" cy="249831"/>
             <a:chOff x="803187" y="1173480"/>
             <a:chExt cx="4411751" cy="249831"/>
@@ -8704,7 +8861,7 @@
         </p:nvGrpSpPr>
         <p:grpSpPr>
           <a:xfrm>
-            <a:off x="1551377" y="4857354"/>
+            <a:off x="1544440" y="5192792"/>
             <a:ext cx="4411751" cy="249831"/>
             <a:chOff x="803187" y="1173480"/>
             <a:chExt cx="4411751" cy="249831"/>
@@ -8916,6 +9073,146 @@
           </a:p>
         </p:txBody>
       </p:sp>
+      <p:grpSp>
+        <p:nvGrpSpPr>
+          <p:cNvPr id="39" name="Gruppieren 38">
+            <a:extLst>
+              <a:ext uri="{FF2B5EF4-FFF2-40B4-BE49-F238E27FC236}">
+                <a16:creationId xmlns:a16="http://schemas.microsoft.com/office/drawing/2014/main" id="{5258662B-C186-446A-9F06-8D18368A2F7C}"/>
+              </a:ext>
+            </a:extLst>
+          </p:cNvPr>
+          <p:cNvGrpSpPr/>
+          <p:nvPr/>
+        </p:nvGrpSpPr>
+        <p:grpSpPr>
+          <a:xfrm>
+            <a:off x="1551039" y="4522026"/>
+            <a:ext cx="4411751" cy="249831"/>
+            <a:chOff x="803187" y="1173480"/>
+            <a:chExt cx="4411751" cy="249831"/>
+          </a:xfrm>
+        </p:grpSpPr>
+        <p:sp>
+          <p:nvSpPr>
+            <p:cNvPr id="40" name="Rechteck 39">
+              <a:extLst>
+                <a:ext uri="{FF2B5EF4-FFF2-40B4-BE49-F238E27FC236}">
+                  <a16:creationId xmlns:a16="http://schemas.microsoft.com/office/drawing/2014/main" id="{7F5DCBE8-78B0-49B7-BF50-FA332A36B818}"/>
+                </a:ext>
+              </a:extLst>
+            </p:cNvPr>
+            <p:cNvSpPr/>
+            <p:nvPr/>
+          </p:nvSpPr>
+          <p:spPr>
+            <a:xfrm>
+              <a:off x="803187" y="1173480"/>
+              <a:ext cx="4411751" cy="249831"/>
+            </a:xfrm>
+            <a:prstGeom prst="rect">
+              <a:avLst/>
+            </a:prstGeom>
+          </p:spPr>
+          <p:style>
+            <a:lnRef idx="2">
+              <a:schemeClr val="accent1">
+                <a:shade val="50000"/>
+              </a:schemeClr>
+            </a:lnRef>
+            <a:fillRef idx="1">
+              <a:schemeClr val="accent1"/>
+            </a:fillRef>
+            <a:effectRef idx="0">
+              <a:schemeClr val="accent1"/>
+            </a:effectRef>
+            <a:fontRef idx="minor">
+              <a:schemeClr val="lt1"/>
+            </a:fontRef>
+          </p:style>
+          <p:txBody>
+            <a:bodyPr rtlCol="0" anchor="ctr"/>
+            <a:lstStyle/>
+            <a:p>
+              <a:pPr algn="ctr"/>
+              <a:r>
+                <a:rPr lang="en-US" sz="1000" dirty="0" err="1"/>
+                <a:t>Map_ke</a:t>
+              </a:r>
+              <a:r>
+                <a:rPr lang="en-US" sz="1000" dirty="0"/>
+                <a:t> file name</a:t>
+              </a:r>
+            </a:p>
+            <a:p>
+              <a:pPr algn="ctr"/>
+              <a:r>
+                <a:rPr lang="en-US" sz="1000" dirty="0"/>
+                <a:t>&lt;array of signed chars&gt;</a:t>
+              </a:r>
+            </a:p>
+          </p:txBody>
+        </p:sp>
+        <p:sp>
+          <p:nvSpPr>
+            <p:cNvPr id="44" name="Rechteck 43">
+              <a:extLst>
+                <a:ext uri="{FF2B5EF4-FFF2-40B4-BE49-F238E27FC236}">
+                  <a16:creationId xmlns:a16="http://schemas.microsoft.com/office/drawing/2014/main" id="{6956BEC7-5DC1-4303-BB3E-225CB3EE84DC}"/>
+                </a:ext>
+              </a:extLst>
+            </p:cNvPr>
+            <p:cNvSpPr/>
+            <p:nvPr/>
+          </p:nvSpPr>
+          <p:spPr>
+            <a:xfrm>
+              <a:off x="803187" y="1173480"/>
+              <a:ext cx="692238" cy="249831"/>
+            </a:xfrm>
+            <a:prstGeom prst="rect">
+              <a:avLst/>
+            </a:prstGeom>
+            <a:solidFill>
+              <a:schemeClr val="accent2"/>
+            </a:solidFill>
+          </p:spPr>
+          <p:style>
+            <a:lnRef idx="2">
+              <a:schemeClr val="accent1">
+                <a:shade val="50000"/>
+              </a:schemeClr>
+            </a:lnRef>
+            <a:fillRef idx="1">
+              <a:schemeClr val="accent1"/>
+            </a:fillRef>
+            <a:effectRef idx="0">
+              <a:schemeClr val="accent1"/>
+            </a:effectRef>
+            <a:fontRef idx="minor">
+              <a:schemeClr val="lt1"/>
+            </a:fontRef>
+          </p:style>
+          <p:txBody>
+            <a:bodyPr rtlCol="0" anchor="ctr"/>
+            <a:lstStyle/>
+            <a:p>
+              <a:pPr algn="ctr"/>
+              <a:r>
+                <a:rPr lang="en-US" sz="800" dirty="0"/>
+                <a:t>No of chars</a:t>
+              </a:r>
+              <a:br>
+                <a:rPr lang="en-US" sz="800" dirty="0"/>
+              </a:br>
+              <a:r>
+                <a:rPr lang="en-US" sz="800" dirty="0"/>
+                <a:t>&lt;short&gt;</a:t>
+              </a:r>
+            </a:p>
+          </p:txBody>
+        </p:sp>
+      </p:grpSp>
     </p:spTree>
     <p:extLst>
       <p:ext uri="{BB962C8B-B14F-4D97-AF65-F5344CB8AC3E}">
@@ -10600,7 +10897,7 @@
         <p:spPr>
           <a:xfrm>
             <a:off x="243281" y="595836"/>
-            <a:ext cx="11862033" cy="6278642"/>
+            <a:ext cx="11862033" cy="5632311"/>
           </a:xfrm>
           <a:prstGeom prst="rect">
             <a:avLst/>
@@ -10932,38 +11229,36 @@
               <a:buChar char="•"/>
             </a:pPr>
             <a:r>
-              <a:rPr lang="en-US" dirty="0"/>
-              <a:t>Illum = “specifies the illumination model to use in the material</a:t>
-            </a:r>
-            <a:r>
-              <a:rPr lang="en-US"/>
-              <a:t>” (</a:t>
-            </a:r>
-            <a:r>
-              <a:rPr lang="en-US" sz="1050"/>
-              <a:t>hint: </a:t>
-            </a:r>
-            <a:r>
-              <a:rPr lang="en-US" sz="1050" dirty="0"/>
-              <a:t>search for “</a:t>
-            </a:r>
-            <a:r>
-              <a:rPr lang="en-US" sz="1050" i="1" dirty="0"/>
-              <a:t>The illumination models are:</a:t>
-            </a:r>
-            <a:r>
-              <a:rPr lang="en-US" sz="1050" dirty="0"/>
-              <a:t>” </a:t>
-            </a:r>
-            <a:r>
-              <a:rPr lang="en-US" sz="1050" dirty="0">
-                <a:hlinkClick r:id="rId2"/>
+              <a:rPr lang="en-US" dirty="0" err="1">
+                <a:highlight>
+                  <a:srgbClr val="FFFF00"/>
+                </a:highlight>
               </a:rPr>
-              <a:t>http://paulbourke.net/dataformats/mtl/</a:t>
-            </a:r>
-            <a:r>
-              <a:rPr lang="en-US" dirty="0"/>
-              <a:t>)</a:t>
+              <a:t>Ke</a:t>
+            </a:r>
+            <a:r>
+              <a:rPr lang="en-US" dirty="0">
+                <a:highlight>
+                  <a:srgbClr val="FFFF00"/>
+                </a:highlight>
+              </a:rPr>
+              <a:t>= “emissive  </a:t>
+            </a:r>
+            <a:r>
+              <a:rPr lang="en-US" dirty="0" err="1">
+                <a:highlight>
+                  <a:srgbClr val="FFFF00"/>
+                </a:highlight>
+              </a:rPr>
+              <a:t>coeficient</a:t>
+            </a:r>
+            <a:r>
+              <a:rPr lang="en-US" dirty="0">
+                <a:highlight>
+                  <a:srgbClr val="FFFF00"/>
+                </a:highlight>
+              </a:rPr>
+              <a:t>”</a:t>
             </a:r>
           </a:p>
           <a:p>
@@ -10972,8 +11267,12 @@
               <a:buChar char="•"/>
             </a:pPr>
             <a:r>
-              <a:rPr lang="en-US" sz="1200" dirty="0"/>
-              <a:t>0		Color on and Ambient off</a:t>
+              <a:rPr lang="en-US" dirty="0">
+                <a:highlight>
+                  <a:srgbClr val="FFFF00"/>
+                </a:highlight>
+              </a:rPr>
+              <a:t>It goes together with ambient, diffuse and specular and represents the amount of light emitted by the material. If you also have a defined emission color the material will irradiate light.</a:t>
             </a:r>
           </a:p>
           <a:p>
@@ -10982,99 +11281,99 @@
               <a:buChar char="•"/>
             </a:pPr>
             <a:r>
-              <a:rPr lang="en-US" sz="1200" dirty="0"/>
-              <a:t>1		Color on and Ambient on</a:t>
-            </a:r>
-          </a:p>
-          <a:p>
-            <a:pPr marL="1257300" lvl="2" indent="-342900">
+              <a:rPr lang="en-US" dirty="0" err="1">
+                <a:highlight>
+                  <a:srgbClr val="FFFF00"/>
+                </a:highlight>
+              </a:rPr>
+              <a:t>map_Ke</a:t>
+            </a:r>
+            <a:r>
+              <a:rPr lang="en-US" dirty="0">
+                <a:highlight>
+                  <a:srgbClr val="FFFF00"/>
+                </a:highlight>
+              </a:rPr>
+              <a:t> (</a:t>
+            </a:r>
+            <a:r>
+              <a:rPr lang="en-US" dirty="0">
+                <a:solidFill>
+                  <a:srgbClr val="FF0000"/>
+                </a:solidFill>
+                <a:highlight>
+                  <a:srgbClr val="FFFF00"/>
+                </a:highlight>
+              </a:rPr>
+              <a:t>!! see “</a:t>
+            </a:r>
+            <a:r>
+              <a:rPr lang="en-US" i="1" dirty="0">
+                <a:solidFill>
+                  <a:srgbClr val="00B0F0"/>
+                </a:solidFill>
+                <a:highlight>
+                  <a:srgbClr val="FFFF00"/>
+                </a:highlight>
+              </a:rPr>
+              <a:t>2. MTL structure</a:t>
+            </a:r>
+            <a:r>
+              <a:rPr lang="en-US" dirty="0">
+                <a:solidFill>
+                  <a:srgbClr val="FF0000"/>
+                </a:solidFill>
+                <a:highlight>
+                  <a:srgbClr val="FFFF00"/>
+                </a:highlight>
+              </a:rPr>
+              <a:t>” for limitations !!</a:t>
+            </a:r>
+            <a:r>
+              <a:rPr lang="en-US" dirty="0">
+                <a:highlight>
+                  <a:srgbClr val="FFFF00"/>
+                </a:highlight>
+              </a:rPr>
+              <a:t>)</a:t>
+            </a:r>
+          </a:p>
+          <a:p>
+            <a:pPr marL="1714500" lvl="3" indent="-342900">
               <a:buFont typeface="Arial" panose="020B0604020202020204" pitchFamily="34" charset="0"/>
               <a:buChar char="•"/>
             </a:pPr>
             <a:r>
-              <a:rPr lang="en-US" sz="1200" dirty="0"/>
-              <a:t>2		Highlight on</a:t>
-            </a:r>
-          </a:p>
-          <a:p>
-            <a:pPr marL="1257300" lvl="2" indent="-342900">
+              <a:rPr lang="en-US" dirty="0">
+                <a:highlight>
+                  <a:srgbClr val="FFFF00"/>
+                </a:highlight>
+              </a:rPr>
+              <a:t>diffuse reflectivity of the material (value is multiplied by the "</a:t>
+            </a:r>
+            <a:r>
+              <a:rPr lang="en-US" dirty="0" err="1">
+                <a:highlight>
+                  <a:srgbClr val="FFFF00"/>
+                </a:highlight>
+              </a:rPr>
+              <a:t>Ke</a:t>
+            </a:r>
+            <a:r>
+              <a:rPr lang="en-US" dirty="0">
+                <a:highlight>
+                  <a:srgbClr val="FFFF00"/>
+                </a:highlight>
+              </a:rPr>
+              <a:t>" value)</a:t>
+            </a:r>
+          </a:p>
+          <a:p>
+            <a:pPr marL="800100" lvl="1" indent="-342900">
               <a:buFont typeface="Arial" panose="020B0604020202020204" pitchFamily="34" charset="0"/>
               <a:buChar char="•"/>
             </a:pPr>
-            <a:r>
-              <a:rPr lang="en-US" sz="1200" dirty="0"/>
-              <a:t>3		Reflection on and Ray trace on</a:t>
-            </a:r>
-          </a:p>
-          <a:p>
-            <a:pPr marL="1257300" lvl="2" indent="-342900">
-              <a:buFont typeface="Arial" panose="020B0604020202020204" pitchFamily="34" charset="0"/>
-              <a:buChar char="•"/>
-            </a:pPr>
-            <a:r>
-              <a:rPr lang="en-US" sz="1200" dirty="0"/>
-              <a:t>4		Transparency: Glass on; Reflection: Ray trace on</a:t>
-            </a:r>
-          </a:p>
-          <a:p>
-            <a:pPr marL="1257300" lvl="2" indent="-342900">
-              <a:buFont typeface="Arial" panose="020B0604020202020204" pitchFamily="34" charset="0"/>
-              <a:buChar char="•"/>
-            </a:pPr>
-            <a:r>
-              <a:rPr lang="en-US" sz="1200" dirty="0"/>
-              <a:t> 5		Reflection: Fresnel on and Ray trace on</a:t>
-            </a:r>
-          </a:p>
-          <a:p>
-            <a:pPr marL="1257300" lvl="2" indent="-342900">
-              <a:buFont typeface="Arial" panose="020B0604020202020204" pitchFamily="34" charset="0"/>
-              <a:buChar char="•"/>
-            </a:pPr>
-            <a:r>
-              <a:rPr lang="en-US" sz="1200" dirty="0"/>
-              <a:t> 6		Transparency: Refraction on; Reflection: Fresnel off and Ray trace on</a:t>
-            </a:r>
-          </a:p>
-          <a:p>
-            <a:pPr marL="1257300" lvl="2" indent="-342900">
-              <a:buFont typeface="Arial" panose="020B0604020202020204" pitchFamily="34" charset="0"/>
-              <a:buChar char="•"/>
-            </a:pPr>
-            <a:r>
-              <a:rPr lang="en-US" sz="1200" dirty="0"/>
-              <a:t> 7		Transparency: Refraction on; Reflection: Fresnel on and Ray trace on</a:t>
-            </a:r>
-          </a:p>
-          <a:p>
-            <a:pPr marL="1257300" lvl="2" indent="-342900">
-              <a:buFont typeface="Arial" panose="020B0604020202020204" pitchFamily="34" charset="0"/>
-              <a:buChar char="•"/>
-            </a:pPr>
-            <a:r>
-              <a:rPr lang="en-US" sz="1200" dirty="0"/>
-              <a:t> 8		Reflection on and Ray trace off</a:t>
-            </a:r>
-          </a:p>
-          <a:p>
-            <a:pPr marL="1257300" lvl="2" indent="-342900">
-              <a:buFont typeface="Arial" panose="020B0604020202020204" pitchFamily="34" charset="0"/>
-              <a:buChar char="•"/>
-            </a:pPr>
-            <a:r>
-              <a:rPr lang="en-US" sz="1200" dirty="0"/>
-              <a:t> 9		Transparency: Glass on; Reflection: Ray trace off</a:t>
-            </a:r>
-          </a:p>
-          <a:p>
-            <a:pPr marL="1257300" lvl="2" indent="-342900">
-              <a:buFont typeface="Arial" panose="020B0604020202020204" pitchFamily="34" charset="0"/>
-              <a:buChar char="•"/>
-            </a:pPr>
-            <a:r>
-              <a:rPr lang="en-US" sz="1200" dirty="0"/>
-              <a:t> 10		Casts shadows onto invisible surfaces</a:t>
-            </a:r>
+            <a:endParaRPr lang="en-US" dirty="0"/>
           </a:p>
         </p:txBody>
       </p:sp>

</xml_diff>

<commit_message>
add support for map_Bump including the param '-bm'. See project Issue#13
</commit_message>
<xml_diff>
--- a/docs/OBJ to binary structure_20210611_V1.1.pptx
+++ b/docs/OBJ to binary structure_20210611_V1.1.pptx
@@ -9,15 +9,16 @@
     <p:sldId id="262" r:id="rId3"/>
     <p:sldId id="264" r:id="rId4"/>
     <p:sldId id="258" r:id="rId5"/>
-    <p:sldId id="260" r:id="rId6"/>
-    <p:sldId id="267" r:id="rId7"/>
-    <p:sldId id="261" r:id="rId8"/>
-    <p:sldId id="257" r:id="rId9"/>
-    <p:sldId id="263" r:id="rId10"/>
-    <p:sldId id="269" r:id="rId11"/>
-    <p:sldId id="268" r:id="rId12"/>
-    <p:sldId id="266" r:id="rId13"/>
-    <p:sldId id="259" r:id="rId14"/>
+    <p:sldId id="270" r:id="rId6"/>
+    <p:sldId id="260" r:id="rId7"/>
+    <p:sldId id="267" r:id="rId8"/>
+    <p:sldId id="261" r:id="rId9"/>
+    <p:sldId id="257" r:id="rId10"/>
+    <p:sldId id="263" r:id="rId11"/>
+    <p:sldId id="269" r:id="rId12"/>
+    <p:sldId id="268" r:id="rId13"/>
+    <p:sldId id="266" r:id="rId14"/>
+    <p:sldId id="259" r:id="rId15"/>
   </p:sldIdLst>
   <p:sldSz cx="12192000" cy="6858000"/>
   <p:notesSz cx="6858000" cy="9144000"/>
@@ -273,7 +274,7 @@
           <a:p>
             <a:fld id="{B2678478-075C-4254-9D50-CE1E7AF0251E}" type="datetimeFigureOut">
               <a:rPr lang="en-US" smtClean="0"/>
-              <a:t>9/19/2021</a:t>
+              <a:t>10/10/2021</a:t>
             </a:fld>
             <a:endParaRPr lang="en-US"/>
           </a:p>
@@ -473,7 +474,7 @@
           <a:p>
             <a:fld id="{B2678478-075C-4254-9D50-CE1E7AF0251E}" type="datetimeFigureOut">
               <a:rPr lang="en-US" smtClean="0"/>
-              <a:t>9/19/2021</a:t>
+              <a:t>10/10/2021</a:t>
             </a:fld>
             <a:endParaRPr lang="en-US"/>
           </a:p>
@@ -683,7 +684,7 @@
           <a:p>
             <a:fld id="{B2678478-075C-4254-9D50-CE1E7AF0251E}" type="datetimeFigureOut">
               <a:rPr lang="en-US" smtClean="0"/>
-              <a:t>9/19/2021</a:t>
+              <a:t>10/10/2021</a:t>
             </a:fld>
             <a:endParaRPr lang="en-US"/>
           </a:p>
@@ -883,7 +884,7 @@
           <a:p>
             <a:fld id="{B2678478-075C-4254-9D50-CE1E7AF0251E}" type="datetimeFigureOut">
               <a:rPr lang="en-US" smtClean="0"/>
-              <a:t>9/19/2021</a:t>
+              <a:t>10/10/2021</a:t>
             </a:fld>
             <a:endParaRPr lang="en-US"/>
           </a:p>
@@ -1159,7 +1160,7 @@
           <a:p>
             <a:fld id="{B2678478-075C-4254-9D50-CE1E7AF0251E}" type="datetimeFigureOut">
               <a:rPr lang="en-US" smtClean="0"/>
-              <a:t>9/19/2021</a:t>
+              <a:t>10/10/2021</a:t>
             </a:fld>
             <a:endParaRPr lang="en-US"/>
           </a:p>
@@ -1427,7 +1428,7 @@
           <a:p>
             <a:fld id="{B2678478-075C-4254-9D50-CE1E7AF0251E}" type="datetimeFigureOut">
               <a:rPr lang="en-US" smtClean="0"/>
-              <a:t>9/19/2021</a:t>
+              <a:t>10/10/2021</a:t>
             </a:fld>
             <a:endParaRPr lang="en-US"/>
           </a:p>
@@ -1842,7 +1843,7 @@
           <a:p>
             <a:fld id="{B2678478-075C-4254-9D50-CE1E7AF0251E}" type="datetimeFigureOut">
               <a:rPr lang="en-US" smtClean="0"/>
-              <a:t>9/19/2021</a:t>
+              <a:t>10/10/2021</a:t>
             </a:fld>
             <a:endParaRPr lang="en-US"/>
           </a:p>
@@ -1984,7 +1985,7 @@
           <a:p>
             <a:fld id="{B2678478-075C-4254-9D50-CE1E7AF0251E}" type="datetimeFigureOut">
               <a:rPr lang="en-US" smtClean="0"/>
-              <a:t>9/19/2021</a:t>
+              <a:t>10/10/2021</a:t>
             </a:fld>
             <a:endParaRPr lang="en-US"/>
           </a:p>
@@ -2097,7 +2098,7 @@
           <a:p>
             <a:fld id="{B2678478-075C-4254-9D50-CE1E7AF0251E}" type="datetimeFigureOut">
               <a:rPr lang="en-US" smtClean="0"/>
-              <a:t>9/19/2021</a:t>
+              <a:t>10/10/2021</a:t>
             </a:fld>
             <a:endParaRPr lang="en-US"/>
           </a:p>
@@ -2410,7 +2411,7 @@
           <a:p>
             <a:fld id="{B2678478-075C-4254-9D50-CE1E7AF0251E}" type="datetimeFigureOut">
               <a:rPr lang="en-US" smtClean="0"/>
-              <a:t>9/19/2021</a:t>
+              <a:t>10/10/2021</a:t>
             </a:fld>
             <a:endParaRPr lang="en-US"/>
           </a:p>
@@ -2699,7 +2700,7 @@
           <a:p>
             <a:fld id="{B2678478-075C-4254-9D50-CE1E7AF0251E}" type="datetimeFigureOut">
               <a:rPr lang="en-US" smtClean="0"/>
-              <a:t>9/19/2021</a:t>
+              <a:t>10/10/2021</a:t>
             </a:fld>
             <a:endParaRPr lang="en-US"/>
           </a:p>
@@ -2942,7 +2943,7 @@
           <a:p>
             <a:fld id="{B2678478-075C-4254-9D50-CE1E7AF0251E}" type="datetimeFigureOut">
               <a:rPr lang="en-US" smtClean="0"/>
-              <a:t>9/19/2021</a:t>
+              <a:t>10/10/2021</a:t>
             </a:fld>
             <a:endParaRPr lang="en-US"/>
           </a:p>
@@ -3513,7 +3514,7 @@
         <p:spPr>
           <a:xfrm>
             <a:off x="243281" y="595836"/>
-            <a:ext cx="11862033" cy="4062651"/>
+            <a:ext cx="11862033" cy="6740307"/>
           </a:xfrm>
           <a:prstGeom prst="rect">
             <a:avLst/>
@@ -3532,7 +3533,7 @@
             </a:pPr>
             <a:r>
               <a:rPr lang="en-US" dirty="0"/>
-              <a:t>MTL parser (continue)</a:t>
+              <a:t>MTL parser</a:t>
             </a:r>
           </a:p>
           <a:p>
@@ -3542,29 +3543,7 @@
             </a:pPr>
             <a:r>
               <a:rPr lang="en-US" dirty="0"/>
-              <a:t>Illum = “specifies the illumination model to use in the material” (</a:t>
-            </a:r>
-            <a:r>
-              <a:rPr lang="en-US" sz="1050" dirty="0"/>
-              <a:t>hint: search for “</a:t>
-            </a:r>
-            <a:r>
-              <a:rPr lang="en-US" sz="1050" i="1" dirty="0"/>
-              <a:t>The illumination models are:</a:t>
-            </a:r>
-            <a:r>
-              <a:rPr lang="en-US" sz="1050" dirty="0"/>
-              <a:t>” </a:t>
-            </a:r>
-            <a:r>
-              <a:rPr lang="en-US" sz="1050" dirty="0">
-                <a:hlinkClick r:id="rId2"/>
-              </a:rPr>
-              <a:t>http://paulbourke.net/dataformats/mtl/</a:t>
-            </a:r>
-            <a:r>
-              <a:rPr lang="en-US" dirty="0"/>
-              <a:t>)</a:t>
+              <a:t>Ka = “ambient reflectivity” (material ambient is multiplied by the texture value)</a:t>
             </a:r>
           </a:p>
           <a:p>
@@ -3573,8 +3552,96 @@
               <a:buChar char="•"/>
             </a:pPr>
             <a:r>
-              <a:rPr lang="en-US" sz="1200" dirty="0"/>
-              <a:t>0		Color on and Ambient off</a:t>
+              <a:rPr lang="en-US" dirty="0"/>
+              <a:t>Only “</a:t>
+            </a:r>
+            <a:r>
+              <a:rPr lang="en-US" b="1" dirty="0">
+                <a:solidFill>
+                  <a:schemeClr val="accent1"/>
+                </a:solidFill>
+              </a:rPr>
+              <a:t>Ka</a:t>
+            </a:r>
+            <a:r>
+              <a:rPr lang="en-US" dirty="0">
+                <a:solidFill>
+                  <a:schemeClr val="accent1"/>
+                </a:solidFill>
+              </a:rPr>
+              <a:t> r g b</a:t>
+            </a:r>
+            <a:r>
+              <a:rPr lang="en-US" dirty="0"/>
+              <a:t>” is supported. Same for “</a:t>
+            </a:r>
+            <a:r>
+              <a:rPr lang="en-US" b="1" dirty="0" err="1">
+                <a:solidFill>
+                  <a:schemeClr val="accent1"/>
+                </a:solidFill>
+              </a:rPr>
+              <a:t>Kd</a:t>
+            </a:r>
+            <a:r>
+              <a:rPr lang="en-US" dirty="0"/>
+              <a:t>” and “</a:t>
+            </a:r>
+            <a:r>
+              <a:rPr lang="en-US" b="1" dirty="0">
+                <a:solidFill>
+                  <a:schemeClr val="accent1"/>
+                </a:solidFill>
+              </a:rPr>
+              <a:t>Ks</a:t>
+            </a:r>
+            <a:r>
+              <a:rPr lang="en-US" dirty="0"/>
+              <a:t>”</a:t>
+            </a:r>
+          </a:p>
+          <a:p>
+            <a:pPr marL="1714500" lvl="3" indent="-342900">
+              <a:buFont typeface="Arial" panose="020B0604020202020204" pitchFamily="34" charset="0"/>
+              <a:buChar char="•"/>
+            </a:pPr>
+            <a:r>
+              <a:rPr lang="en-US" dirty="0"/>
+              <a:t>Not supporting “</a:t>
+            </a:r>
+            <a:r>
+              <a:rPr lang="es-ES" dirty="0">
+                <a:solidFill>
+                  <a:srgbClr val="FF0000"/>
+                </a:solidFill>
+              </a:rPr>
+              <a:t>Ka spectral file.rfl factor</a:t>
+            </a:r>
+            <a:r>
+              <a:rPr lang="es-ES" dirty="0"/>
+              <a:t>” </a:t>
+            </a:r>
+          </a:p>
+          <a:p>
+            <a:pPr marL="1714500" lvl="3" indent="-342900">
+              <a:buFont typeface="Arial" panose="020B0604020202020204" pitchFamily="34" charset="0"/>
+              <a:buChar char="•"/>
+            </a:pPr>
+            <a:r>
+              <a:rPr lang="en-US" dirty="0"/>
+              <a:t>Not supporting “</a:t>
+            </a:r>
+            <a:r>
+              <a:rPr lang="es-ES" dirty="0">
+                <a:solidFill>
+                  <a:srgbClr val="FF0000"/>
+                </a:solidFill>
+              </a:rPr>
+              <a:t>Ka xyz x y z</a:t>
+            </a:r>
+            <a:r>
+              <a:rPr lang="en-US" dirty="0"/>
+              <a:t>”</a:t>
             </a:r>
           </a:p>
           <a:p>
@@ -3583,119 +3650,12 @@
               <a:buChar char="•"/>
             </a:pPr>
             <a:r>
-              <a:rPr lang="en-US" sz="1200" dirty="0"/>
-              <a:t>1		Color on and Ambient on</a:t>
-            </a:r>
-          </a:p>
-          <a:p>
-            <a:pPr marL="1257300" lvl="2" indent="-342900">
-              <a:buFont typeface="Arial" panose="020B0604020202020204" pitchFamily="34" charset="0"/>
-              <a:buChar char="•"/>
-            </a:pPr>
-            <a:r>
-              <a:rPr lang="en-US" sz="1200" dirty="0"/>
-              <a:t>2		Highlight on</a:t>
-            </a:r>
-          </a:p>
-          <a:p>
-            <a:pPr marL="1257300" lvl="2" indent="-342900">
-              <a:buFont typeface="Arial" panose="020B0604020202020204" pitchFamily="34" charset="0"/>
-              <a:buChar char="•"/>
-            </a:pPr>
-            <a:r>
-              <a:rPr lang="en-US" sz="1200" dirty="0"/>
-              <a:t>3		Reflection on and Ray trace on</a:t>
-            </a:r>
-          </a:p>
-          <a:p>
-            <a:pPr marL="1257300" lvl="2" indent="-342900">
-              <a:buFont typeface="Arial" panose="020B0604020202020204" pitchFamily="34" charset="0"/>
-              <a:buChar char="•"/>
-            </a:pPr>
-            <a:r>
-              <a:rPr lang="en-US" sz="1200" dirty="0"/>
-              <a:t>4		Transparency: Glass on; Reflection: Ray trace on</a:t>
-            </a:r>
-          </a:p>
-          <a:p>
-            <a:pPr marL="1257300" lvl="2" indent="-342900">
-              <a:buFont typeface="Arial" panose="020B0604020202020204" pitchFamily="34" charset="0"/>
-              <a:buChar char="•"/>
-            </a:pPr>
-            <a:r>
-              <a:rPr lang="en-US" sz="1200" dirty="0"/>
-              <a:t> 5		Reflection: Fresnel on and Ray trace on</a:t>
-            </a:r>
-          </a:p>
-          <a:p>
-            <a:pPr marL="1257300" lvl="2" indent="-342900">
-              <a:buFont typeface="Arial" panose="020B0604020202020204" pitchFamily="34" charset="0"/>
-              <a:buChar char="•"/>
-            </a:pPr>
-            <a:r>
-              <a:rPr lang="en-US" sz="1200" dirty="0"/>
-              <a:t> 6		Transparency: Refraction on; Reflection: Fresnel off and Ray trace on</a:t>
-            </a:r>
-          </a:p>
-          <a:p>
-            <a:pPr marL="1257300" lvl="2" indent="-342900">
-              <a:buFont typeface="Arial" panose="020B0604020202020204" pitchFamily="34" charset="0"/>
-              <a:buChar char="•"/>
-            </a:pPr>
-            <a:r>
-              <a:rPr lang="en-US" sz="1200" dirty="0"/>
-              <a:t> 7		Transparency: Refraction on; Reflection: Fresnel on and Ray trace on</a:t>
-            </a:r>
-          </a:p>
-          <a:p>
-            <a:pPr marL="1257300" lvl="2" indent="-342900">
-              <a:buFont typeface="Arial" panose="020B0604020202020204" pitchFamily="34" charset="0"/>
-              <a:buChar char="•"/>
-            </a:pPr>
-            <a:r>
-              <a:rPr lang="en-US" sz="1200" dirty="0"/>
-              <a:t> 8		Reflection on and Ray trace off</a:t>
-            </a:r>
-          </a:p>
-          <a:p>
-            <a:pPr marL="1257300" lvl="2" indent="-342900">
-              <a:buFont typeface="Arial" panose="020B0604020202020204" pitchFamily="34" charset="0"/>
-              <a:buChar char="•"/>
-            </a:pPr>
-            <a:r>
-              <a:rPr lang="en-US" sz="1200" dirty="0"/>
-              <a:t> 9		Transparency: Glass on; Reflection: Ray trace off</a:t>
-            </a:r>
-          </a:p>
-          <a:p>
-            <a:pPr marL="1257300" lvl="2" indent="-342900">
-              <a:buFont typeface="Arial" panose="020B0604020202020204" pitchFamily="34" charset="0"/>
-              <a:buChar char="•"/>
-            </a:pPr>
-            <a:r>
-              <a:rPr lang="en-US" sz="1200" dirty="0"/>
-              <a:t> 10		Casts shadows onto invisible surfaces</a:t>
-            </a:r>
-            <a:endParaRPr lang="en-US" dirty="0"/>
-          </a:p>
-          <a:p>
-            <a:pPr marL="800100" lvl="1" indent="-342900">
-              <a:buFont typeface="Arial" panose="020B0604020202020204" pitchFamily="34" charset="0"/>
-              <a:buChar char="•"/>
-            </a:pPr>
+              <a:rPr lang="en-US" dirty="0" err="1"/>
+              <a:t>map_Ka</a:t>
+            </a:r>
             <a:r>
               <a:rPr lang="en-US" dirty="0"/>
-              <a:t>d factor = “the amount this material dissolves into the background.  A  factor of 1.0 is fully opaque.  This is the default when a new material is created.  A factor of 0.0 is fully dissolved (completely transparent).”</a:t>
-            </a:r>
-          </a:p>
-          <a:p>
-            <a:pPr marL="800100" lvl="1" indent="-342900">
-              <a:buFont typeface="Arial" panose="020B0604020202020204" pitchFamily="34" charset="0"/>
-              <a:buChar char="•"/>
-            </a:pPr>
-            <a:r>
-              <a:rPr lang="en-US" dirty="0"/>
-              <a:t>Sharpness = </a:t>
+              <a:t> (</a:t>
             </a:r>
             <a:r>
               <a:rPr lang="en-US" dirty="0">
@@ -3703,7 +3663,45 @@
                   <a:srgbClr val="FF0000"/>
                 </a:solidFill>
               </a:rPr>
-              <a:t>not supported</a:t>
+              <a:t>!! see “</a:t>
+            </a:r>
+            <a:r>
+              <a:rPr lang="en-US" i="1" dirty="0">
+                <a:solidFill>
+                  <a:srgbClr val="00B0F0"/>
+                </a:solidFill>
+              </a:rPr>
+              <a:t>2. MTL structure</a:t>
+            </a:r>
+            <a:r>
+              <a:rPr lang="en-US" dirty="0">
+                <a:solidFill>
+                  <a:srgbClr val="FF0000"/>
+                </a:solidFill>
+              </a:rPr>
+              <a:t>” for limitations !!</a:t>
+            </a:r>
+            <a:r>
+              <a:rPr lang="en-US" dirty="0"/>
+              <a:t>)</a:t>
+            </a:r>
+          </a:p>
+          <a:p>
+            <a:pPr marL="1714500" lvl="3" indent="-342900">
+              <a:buFont typeface="Arial" panose="020B0604020202020204" pitchFamily="34" charset="0"/>
+              <a:buChar char="•"/>
+            </a:pPr>
+            <a:r>
+              <a:rPr lang="en-US" dirty="0"/>
+              <a:t>Specifies that a color texture file or a color procedural texture file is applied to the ambient reflectivity of the material.  During rendering, the "</a:t>
+            </a:r>
+            <a:r>
+              <a:rPr lang="en-US" dirty="0" err="1"/>
+              <a:t>map_Ka</a:t>
+            </a:r>
+            <a:r>
+              <a:rPr lang="en-US" dirty="0"/>
+              <a:t>" value is multiplied by the "Ka" value.</a:t>
             </a:r>
           </a:p>
           <a:p>
@@ -3713,7 +3711,59 @@
             </a:pPr>
             <a:r>
               <a:rPr lang="en-US" dirty="0"/>
-              <a:t>Ns = specular exponent for the current material. Values = 0..1000</a:t>
+              <a:t>Ks = “specular reflectivity”</a:t>
+            </a:r>
+          </a:p>
+          <a:p>
+            <a:pPr marL="1257300" lvl="2" indent="-342900">
+              <a:buFont typeface="Arial" panose="020B0604020202020204" pitchFamily="34" charset="0"/>
+              <a:buChar char="•"/>
+            </a:pPr>
+            <a:r>
+              <a:rPr lang="en-US" dirty="0" err="1"/>
+              <a:t>map_Ks</a:t>
+            </a:r>
+            <a:r>
+              <a:rPr lang="en-US" dirty="0"/>
+              <a:t> (</a:t>
+            </a:r>
+            <a:r>
+              <a:rPr lang="en-US" dirty="0">
+                <a:solidFill>
+                  <a:srgbClr val="FF0000"/>
+                </a:solidFill>
+              </a:rPr>
+              <a:t>!! see “</a:t>
+            </a:r>
+            <a:r>
+              <a:rPr lang="en-US" i="1" dirty="0">
+                <a:solidFill>
+                  <a:srgbClr val="00B0F0"/>
+                </a:solidFill>
+              </a:rPr>
+              <a:t>2. MTL structure</a:t>
+            </a:r>
+            <a:r>
+              <a:rPr lang="en-US" dirty="0">
+                <a:solidFill>
+                  <a:srgbClr val="FF0000"/>
+                </a:solidFill>
+              </a:rPr>
+              <a:t>” for limitations !!</a:t>
+            </a:r>
+            <a:r>
+              <a:rPr lang="en-US" dirty="0"/>
+              <a:t>)</a:t>
+            </a:r>
+          </a:p>
+          <a:p>
+            <a:pPr marL="1714500" lvl="3" indent="-342900">
+              <a:buFont typeface="Arial" panose="020B0604020202020204" pitchFamily="34" charset="0"/>
+              <a:buChar char="•"/>
+            </a:pPr>
+            <a:r>
+              <a:rPr lang="en-US" dirty="0"/>
+              <a:t>specular reflectivity of the material (value is multiplied by the "Ks" value)</a:t>
             </a:r>
           </a:p>
           <a:p>
@@ -3722,16 +3772,303 @@
               <a:buChar char="•"/>
             </a:pPr>
             <a:r>
+              <a:rPr lang="en-US" dirty="0" err="1"/>
+              <a:t>Kd</a:t>
+            </a:r>
+            <a:r>
               <a:rPr lang="en-US" dirty="0"/>
-              <a:t>Ni =  Specifies the optical density for the surface. Values = 0.001..10 (usually values are &gt;1.0)</a:t>
-            </a:r>
+              <a:t> = “diffuse reflectivity”</a:t>
+            </a:r>
+          </a:p>
+          <a:p>
+            <a:pPr marL="1257300" lvl="2" indent="-342900">
+              <a:buFont typeface="Arial" panose="020B0604020202020204" pitchFamily="34" charset="0"/>
+              <a:buChar char="•"/>
+            </a:pPr>
+            <a:r>
+              <a:rPr lang="en-US" dirty="0" err="1"/>
+              <a:t>map_Kd</a:t>
+            </a:r>
+            <a:r>
+              <a:rPr lang="en-US" dirty="0"/>
+              <a:t> (</a:t>
+            </a:r>
+            <a:r>
+              <a:rPr lang="en-US" dirty="0">
+                <a:solidFill>
+                  <a:srgbClr val="FF0000"/>
+                </a:solidFill>
+              </a:rPr>
+              <a:t>!! see “</a:t>
+            </a:r>
+            <a:r>
+              <a:rPr lang="en-US" i="1" dirty="0">
+                <a:solidFill>
+                  <a:srgbClr val="00B0F0"/>
+                </a:solidFill>
+              </a:rPr>
+              <a:t>2. MTL structure</a:t>
+            </a:r>
+            <a:r>
+              <a:rPr lang="en-US" dirty="0">
+                <a:solidFill>
+                  <a:srgbClr val="FF0000"/>
+                </a:solidFill>
+              </a:rPr>
+              <a:t>” for limitations !!</a:t>
+            </a:r>
+            <a:r>
+              <a:rPr lang="en-US" dirty="0"/>
+              <a:t>)</a:t>
+            </a:r>
+          </a:p>
+          <a:p>
+            <a:pPr marL="1714500" lvl="3" indent="-342900">
+              <a:buFont typeface="Arial" panose="020B0604020202020204" pitchFamily="34" charset="0"/>
+              <a:buChar char="•"/>
+            </a:pPr>
+            <a:r>
+              <a:rPr lang="en-US" dirty="0"/>
+              <a:t>diffuse reflectivity of the material (value is multiplied by the "</a:t>
+            </a:r>
+            <a:r>
+              <a:rPr lang="en-US" dirty="0" err="1"/>
+              <a:t>Kd</a:t>
+            </a:r>
+            <a:r>
+              <a:rPr lang="en-US" dirty="0"/>
+              <a:t>" value)</a:t>
+            </a:r>
+          </a:p>
+          <a:p>
+            <a:pPr marL="800100" lvl="1" indent="-342900">
+              <a:buFont typeface="Arial" panose="020B0604020202020204" pitchFamily="34" charset="0"/>
+              <a:buChar char="•"/>
+            </a:pPr>
+            <a:r>
+              <a:rPr lang="en-US" dirty="0" err="1">
+                <a:highlight>
+                  <a:srgbClr val="FFFF00"/>
+                </a:highlight>
+              </a:rPr>
+              <a:t>Ke</a:t>
+            </a:r>
+            <a:r>
+              <a:rPr lang="en-US" dirty="0">
+                <a:highlight>
+                  <a:srgbClr val="FFFF00"/>
+                </a:highlight>
+              </a:rPr>
+              <a:t>= “emissive  </a:t>
+            </a:r>
+            <a:r>
+              <a:rPr lang="en-US" dirty="0" err="1">
+                <a:highlight>
+                  <a:srgbClr val="FFFF00"/>
+                </a:highlight>
+              </a:rPr>
+              <a:t>coeficient</a:t>
+            </a:r>
+            <a:r>
+              <a:rPr lang="en-US" dirty="0">
+                <a:highlight>
+                  <a:srgbClr val="FFFF00"/>
+                </a:highlight>
+              </a:rPr>
+              <a:t>”</a:t>
+            </a:r>
+          </a:p>
+          <a:p>
+            <a:pPr marL="1257300" lvl="2" indent="-342900">
+              <a:buFont typeface="Arial" panose="020B0604020202020204" pitchFamily="34" charset="0"/>
+              <a:buChar char="•"/>
+            </a:pPr>
+            <a:r>
+              <a:rPr lang="en-US" dirty="0">
+                <a:highlight>
+                  <a:srgbClr val="FFFF00"/>
+                </a:highlight>
+              </a:rPr>
+              <a:t>It goes together with ambient, diffuse and specular and represents the amount of light emitted by the material. If you also have a defined emission color the material will irradiate light.</a:t>
+            </a:r>
+          </a:p>
+          <a:p>
+            <a:pPr marL="1257300" lvl="2" indent="-342900">
+              <a:buFont typeface="Arial" panose="020B0604020202020204" pitchFamily="34" charset="0"/>
+              <a:buChar char="•"/>
+            </a:pPr>
+            <a:r>
+              <a:rPr lang="en-US" dirty="0" err="1">
+                <a:highlight>
+                  <a:srgbClr val="FFFF00"/>
+                </a:highlight>
+              </a:rPr>
+              <a:t>map_Ke</a:t>
+            </a:r>
+            <a:r>
+              <a:rPr lang="en-US" dirty="0">
+                <a:highlight>
+                  <a:srgbClr val="FFFF00"/>
+                </a:highlight>
+              </a:rPr>
+              <a:t> (</a:t>
+            </a:r>
+            <a:r>
+              <a:rPr lang="en-US" dirty="0">
+                <a:solidFill>
+                  <a:srgbClr val="FF0000"/>
+                </a:solidFill>
+                <a:highlight>
+                  <a:srgbClr val="FFFF00"/>
+                </a:highlight>
+              </a:rPr>
+              <a:t>!! see “</a:t>
+            </a:r>
+            <a:r>
+              <a:rPr lang="en-US" i="1" dirty="0">
+                <a:solidFill>
+                  <a:srgbClr val="00B0F0"/>
+                </a:solidFill>
+                <a:highlight>
+                  <a:srgbClr val="FFFF00"/>
+                </a:highlight>
+              </a:rPr>
+              <a:t>2. MTL structure</a:t>
+            </a:r>
+            <a:r>
+              <a:rPr lang="en-US" dirty="0">
+                <a:solidFill>
+                  <a:srgbClr val="FF0000"/>
+                </a:solidFill>
+                <a:highlight>
+                  <a:srgbClr val="FFFF00"/>
+                </a:highlight>
+              </a:rPr>
+              <a:t>” for limitations !!</a:t>
+            </a:r>
+            <a:r>
+              <a:rPr lang="en-US" dirty="0">
+                <a:highlight>
+                  <a:srgbClr val="FFFF00"/>
+                </a:highlight>
+              </a:rPr>
+              <a:t>)</a:t>
+            </a:r>
+          </a:p>
+          <a:p>
+            <a:pPr marL="1714500" lvl="3" indent="-342900">
+              <a:buFont typeface="Arial" panose="020B0604020202020204" pitchFamily="34" charset="0"/>
+              <a:buChar char="•"/>
+            </a:pPr>
+            <a:r>
+              <a:rPr lang="en-US" dirty="0">
+                <a:highlight>
+                  <a:srgbClr val="FFFF00"/>
+                </a:highlight>
+              </a:rPr>
+              <a:t>diffuse reflectivity of the material (value is multiplied by the "</a:t>
+            </a:r>
+            <a:r>
+              <a:rPr lang="en-US" dirty="0" err="1">
+                <a:highlight>
+                  <a:srgbClr val="FFFF00"/>
+                </a:highlight>
+              </a:rPr>
+              <a:t>Ke</a:t>
+            </a:r>
+            <a:r>
+              <a:rPr lang="en-US" dirty="0">
+                <a:highlight>
+                  <a:srgbClr val="FFFF00"/>
+                </a:highlight>
+              </a:rPr>
+              <a:t>" value)</a:t>
+            </a:r>
+          </a:p>
+          <a:p>
+            <a:pPr marL="800100" lvl="1" indent="-342900">
+              <a:buFont typeface="Arial" panose="020B0604020202020204" pitchFamily="34" charset="0"/>
+              <a:buChar char="•"/>
+            </a:pPr>
+            <a:r>
+              <a:rPr lang="en-US" dirty="0" err="1">
+                <a:solidFill>
+                  <a:prstClr val="black"/>
+                </a:solidFill>
+              </a:rPr>
+              <a:t>map_Bump</a:t>
+            </a:r>
+            <a:r>
+              <a:rPr lang="en-US" dirty="0">
+                <a:solidFill>
+                  <a:prstClr val="black"/>
+                </a:solidFill>
+              </a:rPr>
+              <a:t> = Specifies that a bump texture file is linked to the material. To be see how this is working against the normal.</a:t>
+            </a:r>
+          </a:p>
+          <a:p>
+            <a:pPr marL="1257300" lvl="2" indent="-342900">
+              <a:buFont typeface="Arial" panose="020B0604020202020204" pitchFamily="34" charset="0"/>
+              <a:buChar char="•"/>
+            </a:pPr>
+            <a:r>
+              <a:rPr lang="en-US" dirty="0">
+                <a:solidFill>
+                  <a:prstClr val="black"/>
+                </a:solidFill>
+              </a:rPr>
+              <a:t>Supported parameters: only </a:t>
+            </a:r>
+            <a:r>
+              <a:rPr lang="en-US" b="1" dirty="0" err="1">
+                <a:solidFill>
+                  <a:schemeClr val="accent1"/>
+                </a:solidFill>
+              </a:rPr>
+              <a:t>bm</a:t>
+            </a:r>
+            <a:r>
+              <a:rPr lang="en-US">
+                <a:solidFill>
+                  <a:prstClr val="black"/>
+                </a:solidFill>
+              </a:rPr>
+              <a:t> </a:t>
+            </a:r>
+            <a:r>
+              <a:rPr lang="en-US" dirty="0">
+                <a:solidFill>
+                  <a:prstClr val="black"/>
+                </a:solidFill>
+              </a:rPr>
+              <a:t>= float [0.0…1.0]</a:t>
+            </a:r>
+          </a:p>
+          <a:p>
+            <a:pPr marL="1714500" lvl="3" indent="-342900">
+              <a:buFont typeface="Arial" panose="020B0604020202020204" pitchFamily="34" charset="0"/>
+              <a:buChar char="•"/>
+            </a:pPr>
+            <a:endParaRPr lang="en-US" dirty="0">
+              <a:highlight>
+                <a:srgbClr val="FFFF00"/>
+              </a:highlight>
+            </a:endParaRPr>
+          </a:p>
+          <a:p>
+            <a:pPr marL="800100" lvl="1" indent="-342900">
+              <a:buFont typeface="Arial" panose="020B0604020202020204" pitchFamily="34" charset="0"/>
+              <a:buChar char="•"/>
+            </a:pPr>
+            <a:endParaRPr lang="en-US" dirty="0"/>
           </a:p>
         </p:txBody>
       </p:sp>
     </p:spTree>
     <p:extLst>
       <p:ext uri="{BB962C8B-B14F-4D97-AF65-F5344CB8AC3E}">
-        <p14:creationId xmlns:p14="http://schemas.microsoft.com/office/powerpoint/2010/main" val="2019959611"/>
+        <p14:creationId xmlns:p14="http://schemas.microsoft.com/office/powerpoint/2010/main" val="1691624654"/>
       </p:ext>
     </p:extLst>
   </p:cSld>
@@ -3787,8 +4124,12 @@
           <a:lstStyle/>
           <a:p>
             <a:r>
+              <a:rPr lang="en-US" dirty="0" err="1"/>
+              <a:t>Parametes</a:t>
+            </a:r>
+            <a:r>
               <a:rPr lang="en-US" dirty="0"/>
-              <a:t>Known limitations:</a:t>
+              <a:t> and known limitations:</a:t>
             </a:r>
           </a:p>
         </p:txBody>
@@ -3808,7 +4149,7 @@
         <p:spPr>
           <a:xfrm>
             <a:off x="243281" y="595836"/>
-            <a:ext cx="11862033" cy="3447098"/>
+            <a:ext cx="11862033" cy="5447645"/>
           </a:xfrm>
           <a:prstGeom prst="rect">
             <a:avLst/>
@@ -3821,48 +4162,13 @@
           </a:bodyPr>
           <a:lstStyle/>
           <a:p>
+            <a:pPr marL="342900" indent="-342900">
+              <a:buFont typeface="+mj-lt"/>
+              <a:buAutoNum type="arabicPeriod"/>
+            </a:pPr>
             <a:r>
               <a:rPr lang="en-US" dirty="0"/>
-              <a:t>2. MTL structure: </a:t>
-            </a:r>
-            <a:r>
-              <a:rPr lang="en-US" i="1" dirty="0" err="1">
-                <a:solidFill>
-                  <a:srgbClr val="00B0F0"/>
-                </a:solidFill>
-              </a:rPr>
-              <a:t>map_ka</a:t>
-            </a:r>
-            <a:r>
-              <a:rPr lang="en-US" dirty="0"/>
-              <a:t>, </a:t>
-            </a:r>
-            <a:r>
-              <a:rPr lang="en-US" i="1" dirty="0" err="1">
-                <a:solidFill>
-                  <a:srgbClr val="00B0F0"/>
-                </a:solidFill>
-              </a:rPr>
-              <a:t>map_kd</a:t>
-            </a:r>
-            <a:r>
-              <a:rPr lang="en-US" i="1" dirty="0">
-                <a:solidFill>
-                  <a:srgbClr val="00B0F0"/>
-                </a:solidFill>
-              </a:rPr>
-              <a:t> </a:t>
-            </a:r>
-            <a:r>
-              <a:rPr lang="en-US" dirty="0"/>
-              <a:t>are supported without “options”:</a:t>
-            </a:r>
-            <a:br>
-              <a:rPr lang="en-US" dirty="0"/>
-            </a:br>
-            <a:r>
-              <a:rPr lang="en-US" dirty="0"/>
-              <a:t>Examples:</a:t>
+              <a:t>MTL parser (continue)</a:t>
             </a:r>
           </a:p>
           <a:p>
@@ -3871,37 +4177,142 @@
               <a:buChar char="•"/>
             </a:pPr>
             <a:r>
-              <a:rPr lang="en-US" dirty="0">
-                <a:highlight>
-                  <a:srgbClr val="00FF00"/>
-                </a:highlight>
+              <a:rPr lang="en-US" dirty="0"/>
+              <a:t>Illum = “specifies the illumination model to use in the material” (</a:t>
+            </a:r>
+            <a:r>
+              <a:rPr lang="en-US" sz="1050" dirty="0"/>
+              <a:t>hint: search for “</a:t>
+            </a:r>
+            <a:r>
+              <a:rPr lang="en-US" sz="1050" i="1" dirty="0"/>
+              <a:t>The illumination models are:</a:t>
+            </a:r>
+            <a:r>
+              <a:rPr lang="en-US" sz="1050" dirty="0"/>
+              <a:t>” </a:t>
+            </a:r>
+            <a:r>
+              <a:rPr lang="en-US" sz="1050" dirty="0">
+                <a:hlinkClick r:id="rId2"/>
               </a:rPr>
-              <a:t>OK</a:t>
+              <a:t>http://paulbourke.net/dataformats/mtl/</a:t>
             </a:r>
             <a:r>
               <a:rPr lang="en-US" dirty="0"/>
-              <a:t> =&gt; “</a:t>
-            </a:r>
-            <a:r>
-              <a:rPr lang="en-US" i="1" dirty="0" err="1">
-                <a:solidFill>
-                  <a:schemeClr val="accent6"/>
-                </a:solidFill>
-              </a:rPr>
-              <a:t>map_Ka</a:t>
-            </a:r>
-            <a:r>
-              <a:rPr lang="en-US" i="1" dirty="0">
-                <a:solidFill>
-                  <a:schemeClr val="accent6"/>
-                </a:solidFill>
-              </a:rPr>
-              <a:t> mapfile.png</a:t>
-            </a:r>
-            <a:r>
-              <a:rPr lang="en-US" dirty="0"/>
-              <a:t>”</a:t>
-            </a:r>
+              <a:t>)</a:t>
+            </a:r>
+          </a:p>
+          <a:p>
+            <a:pPr marL="1257300" lvl="2" indent="-342900">
+              <a:buFont typeface="Arial" panose="020B0604020202020204" pitchFamily="34" charset="0"/>
+              <a:buChar char="•"/>
+            </a:pPr>
+            <a:r>
+              <a:rPr lang="en-US" sz="1200" dirty="0"/>
+              <a:t>0		Color on and Ambient off</a:t>
+            </a:r>
+          </a:p>
+          <a:p>
+            <a:pPr marL="1257300" lvl="2" indent="-342900">
+              <a:buFont typeface="Arial" panose="020B0604020202020204" pitchFamily="34" charset="0"/>
+              <a:buChar char="•"/>
+            </a:pPr>
+            <a:r>
+              <a:rPr lang="en-US" sz="1200" dirty="0"/>
+              <a:t>1		Color on and Ambient on</a:t>
+            </a:r>
+          </a:p>
+          <a:p>
+            <a:pPr marL="1257300" lvl="2" indent="-342900">
+              <a:buFont typeface="Arial" panose="020B0604020202020204" pitchFamily="34" charset="0"/>
+              <a:buChar char="•"/>
+            </a:pPr>
+            <a:r>
+              <a:rPr lang="en-US" sz="1200" dirty="0"/>
+              <a:t>2		Highlight on</a:t>
+            </a:r>
+          </a:p>
+          <a:p>
+            <a:pPr marL="1257300" lvl="2" indent="-342900">
+              <a:buFont typeface="Arial" panose="020B0604020202020204" pitchFamily="34" charset="0"/>
+              <a:buChar char="•"/>
+            </a:pPr>
+            <a:r>
+              <a:rPr lang="en-US" sz="1200" dirty="0"/>
+              <a:t>3		Reflection on and Ray trace on</a:t>
+            </a:r>
+          </a:p>
+          <a:p>
+            <a:pPr marL="1257300" lvl="2" indent="-342900">
+              <a:buFont typeface="Arial" panose="020B0604020202020204" pitchFamily="34" charset="0"/>
+              <a:buChar char="•"/>
+            </a:pPr>
+            <a:r>
+              <a:rPr lang="en-US" sz="1200" dirty="0"/>
+              <a:t>4		Transparency: Glass on; Reflection: Ray trace on</a:t>
+            </a:r>
+          </a:p>
+          <a:p>
+            <a:pPr marL="1257300" lvl="2" indent="-342900">
+              <a:buFont typeface="Arial" panose="020B0604020202020204" pitchFamily="34" charset="0"/>
+              <a:buChar char="•"/>
+            </a:pPr>
+            <a:r>
+              <a:rPr lang="en-US" sz="1200" dirty="0"/>
+              <a:t> 5		Reflection: Fresnel on and Ray trace on</a:t>
+            </a:r>
+          </a:p>
+          <a:p>
+            <a:pPr marL="1257300" lvl="2" indent="-342900">
+              <a:buFont typeface="Arial" panose="020B0604020202020204" pitchFamily="34" charset="0"/>
+              <a:buChar char="•"/>
+            </a:pPr>
+            <a:r>
+              <a:rPr lang="en-US" sz="1200" dirty="0"/>
+              <a:t> 6		Transparency: Refraction on; Reflection: Fresnel off and Ray trace on</a:t>
+            </a:r>
+          </a:p>
+          <a:p>
+            <a:pPr marL="1257300" lvl="2" indent="-342900">
+              <a:buFont typeface="Arial" panose="020B0604020202020204" pitchFamily="34" charset="0"/>
+              <a:buChar char="•"/>
+            </a:pPr>
+            <a:r>
+              <a:rPr lang="en-US" sz="1200" dirty="0"/>
+              <a:t> 7		Transparency: Refraction on; Reflection: Fresnel on and Ray trace on</a:t>
+            </a:r>
+          </a:p>
+          <a:p>
+            <a:pPr marL="1257300" lvl="2" indent="-342900">
+              <a:buFont typeface="Arial" panose="020B0604020202020204" pitchFamily="34" charset="0"/>
+              <a:buChar char="•"/>
+            </a:pPr>
+            <a:r>
+              <a:rPr lang="en-US" sz="1200" dirty="0"/>
+              <a:t> 8		Reflection on and Ray trace off</a:t>
+            </a:r>
+          </a:p>
+          <a:p>
+            <a:pPr marL="1257300" lvl="2" indent="-342900">
+              <a:buFont typeface="Arial" panose="020B0604020202020204" pitchFamily="34" charset="0"/>
+              <a:buChar char="•"/>
+            </a:pPr>
+            <a:r>
+              <a:rPr lang="en-US" sz="1200" dirty="0"/>
+              <a:t> 9		Transparency: Glass on; Reflection: Ray trace off</a:t>
+            </a:r>
+          </a:p>
+          <a:p>
+            <a:pPr marL="1257300" lvl="2" indent="-342900">
+              <a:buFont typeface="Arial" panose="020B0604020202020204" pitchFamily="34" charset="0"/>
+              <a:buChar char="•"/>
+            </a:pPr>
+            <a:r>
+              <a:rPr lang="en-US" sz="1200" dirty="0"/>
+              <a:t> 10		Casts shadows onto invisible surfaces</a:t>
+            </a:r>
+            <a:endParaRPr lang="en-US" dirty="0"/>
           </a:p>
           <a:p>
             <a:pPr marL="800100" lvl="1" indent="-342900">
@@ -3909,52 +4320,26 @@
               <a:buChar char="•"/>
             </a:pPr>
             <a:r>
+              <a:rPr lang="en-US" dirty="0"/>
+              <a:t>d factor = “the amount this material dissolves into the background.  A  factor of 1.0 is fully opaque.  This is the default when a new material is created.  A factor of 0.0 is fully dissolved (completely transparent).”</a:t>
+            </a:r>
+          </a:p>
+          <a:p>
+            <a:pPr marL="800100" lvl="1" indent="-342900">
+              <a:buFont typeface="Arial" panose="020B0604020202020204" pitchFamily="34" charset="0"/>
+              <a:buChar char="•"/>
+            </a:pPr>
+            <a:r>
+              <a:rPr lang="en-US" dirty="0"/>
+              <a:t>Sharpness = </a:t>
+            </a:r>
+            <a:r>
               <a:rPr lang="en-US" dirty="0">
-                <a:highlight>
-                  <a:srgbClr val="FF0000"/>
-                </a:highlight>
-              </a:rPr>
-              <a:t>NOK</a:t>
-            </a:r>
-            <a:r>
-              <a:rPr lang="en-US" dirty="0"/>
-              <a:t> =&gt; “</a:t>
-            </a:r>
-            <a:r>
-              <a:rPr lang="en-US" i="1" dirty="0" err="1">
                 <a:solidFill>
                   <a:srgbClr val="FF0000"/>
                 </a:solidFill>
               </a:rPr>
-              <a:t>map_Ka</a:t>
-            </a:r>
-            <a:r>
-              <a:rPr lang="en-US" i="1" dirty="0">
-                <a:solidFill>
-                  <a:srgbClr val="FF0000"/>
-                </a:solidFill>
-              </a:rPr>
-              <a:t> -s 1 1 1 -o 0 0 0 -mm 0 1 </a:t>
-            </a:r>
-            <a:r>
-              <a:rPr lang="en-US" i="1" dirty="0" err="1">
-                <a:solidFill>
-                  <a:srgbClr val="FF0000"/>
-                </a:solidFill>
-              </a:rPr>
-              <a:t>chrome.mpc</a:t>
-            </a:r>
-            <a:r>
-              <a:rPr lang="en-US" dirty="0"/>
-              <a:t>” (</a:t>
-            </a:r>
-            <a:r>
-              <a:rPr lang="en-US" u="sng" dirty="0"/>
-              <a:t>program will crash</a:t>
-            </a:r>
-            <a:r>
-              <a:rPr lang="en-US" dirty="0"/>
-              <a:t>!)</a:t>
+              <a:t>not supported</a:t>
             </a:r>
           </a:p>
           <a:p>
@@ -3964,141 +4349,61 @@
             </a:pPr>
             <a:r>
               <a:rPr lang="en-US" dirty="0"/>
-              <a:t>Options that are not supported (according to </a:t>
-            </a:r>
-            <a:r>
-              <a:rPr lang="en-US" dirty="0">
-                <a:hlinkClick r:id="rId2"/>
-              </a:rPr>
-              <a:t>http://paulbourke.net/dataformats/mtl/</a:t>
-            </a:r>
+              <a:t>Ns = specular exponent for the current material. Values = 0..1000</a:t>
+            </a:r>
+          </a:p>
+          <a:p>
+            <a:pPr marL="800100" lvl="1" indent="-342900">
+              <a:buFont typeface="Arial" panose="020B0604020202020204" pitchFamily="34" charset="0"/>
+              <a:buChar char="•"/>
+            </a:pPr>
             <a:r>
               <a:rPr lang="en-US" dirty="0"/>
-              <a:t> )</a:t>
-            </a:r>
-          </a:p>
-          <a:p>
-            <a:pPr marL="1257300" lvl="2" indent="-342900">
-              <a:buFont typeface="Courier New" panose="02070309020205020404" pitchFamily="49" charset="0"/>
-              <a:buChar char="o"/>
-            </a:pPr>
-            <a:r>
-              <a:rPr lang="en-US" sz="1100" dirty="0"/>
-              <a:t>-</a:t>
-            </a:r>
-            <a:r>
-              <a:rPr lang="en-US" sz="1100" dirty="0" err="1"/>
-              <a:t>blendu</a:t>
-            </a:r>
-            <a:r>
-              <a:rPr lang="en-US" sz="1100" dirty="0"/>
-              <a:t> on | off</a:t>
-            </a:r>
-          </a:p>
-          <a:p>
-            <a:pPr marL="1257300" lvl="2" indent="-342900">
-              <a:buFont typeface="Courier New" panose="02070309020205020404" pitchFamily="49" charset="0"/>
-              <a:buChar char="o"/>
-            </a:pPr>
-            <a:r>
-              <a:rPr lang="en-US" sz="1100" dirty="0"/>
-              <a:t>-</a:t>
-            </a:r>
-            <a:r>
-              <a:rPr lang="en-US" sz="1100" dirty="0" err="1"/>
-              <a:t>blendv</a:t>
-            </a:r>
-            <a:r>
-              <a:rPr lang="en-US" sz="1100" dirty="0"/>
-              <a:t> on | off</a:t>
-            </a:r>
-          </a:p>
-          <a:p>
-            <a:pPr marL="1257300" lvl="2" indent="-342900">
-              <a:buFont typeface="Courier New" panose="02070309020205020404" pitchFamily="49" charset="0"/>
-              <a:buChar char="o"/>
-            </a:pPr>
-            <a:r>
-              <a:rPr lang="en-US" sz="1100" dirty="0"/>
-              <a:t>-cc on | off</a:t>
-            </a:r>
-          </a:p>
-          <a:p>
-            <a:pPr marL="1257300" lvl="2" indent="-342900">
-              <a:buFont typeface="Courier New" panose="02070309020205020404" pitchFamily="49" charset="0"/>
-              <a:buChar char="o"/>
-            </a:pPr>
-            <a:r>
-              <a:rPr lang="en-US" sz="1100" dirty="0"/>
-              <a:t>-clamp on | off</a:t>
-            </a:r>
-          </a:p>
-          <a:p>
-            <a:pPr marL="1257300" lvl="2" indent="-342900">
-              <a:buFont typeface="Courier New" panose="02070309020205020404" pitchFamily="49" charset="0"/>
-              <a:buChar char="o"/>
-            </a:pPr>
-            <a:r>
-              <a:rPr lang="en-US" sz="1100" dirty="0"/>
-              <a:t>-mm base gain</a:t>
-            </a:r>
-          </a:p>
-          <a:p>
-            <a:pPr marL="1257300" lvl="2" indent="-342900">
-              <a:buFont typeface="Courier New" panose="02070309020205020404" pitchFamily="49" charset="0"/>
-              <a:buChar char="o"/>
-            </a:pPr>
-            <a:r>
-              <a:rPr lang="en-US" sz="1100" dirty="0"/>
-              <a:t>-o u v w</a:t>
-            </a:r>
-          </a:p>
-          <a:p>
-            <a:pPr marL="1257300" lvl="2" indent="-342900">
-              <a:buFont typeface="Courier New" panose="02070309020205020404" pitchFamily="49" charset="0"/>
-              <a:buChar char="o"/>
-            </a:pPr>
-            <a:r>
-              <a:rPr lang="en-US" sz="1100" dirty="0"/>
-              <a:t>-s u v w</a:t>
-            </a:r>
-          </a:p>
-          <a:p>
-            <a:pPr marL="1257300" lvl="2" indent="-342900">
-              <a:buFont typeface="Courier New" panose="02070309020205020404" pitchFamily="49" charset="0"/>
-              <a:buChar char="o"/>
-            </a:pPr>
-            <a:r>
-              <a:rPr lang="en-US" sz="1100" dirty="0"/>
-              <a:t>-t u v w</a:t>
-            </a:r>
-          </a:p>
-          <a:p>
-            <a:pPr marL="1257300" lvl="2" indent="-342900">
-              <a:buFont typeface="Courier New" panose="02070309020205020404" pitchFamily="49" charset="0"/>
-              <a:buChar char="o"/>
-            </a:pPr>
-            <a:r>
-              <a:rPr lang="en-US" sz="1100" dirty="0"/>
-              <a:t>-</a:t>
-            </a:r>
-            <a:r>
-              <a:rPr lang="en-US" sz="1100" dirty="0" err="1"/>
-              <a:t>texres</a:t>
-            </a:r>
-            <a:r>
-              <a:rPr lang="en-US" sz="1100" dirty="0"/>
-              <a:t> value</a:t>
-            </a:r>
-            <a:br>
-              <a:rPr lang="en-US" sz="1100" dirty="0"/>
-            </a:br>
-            <a:endParaRPr lang="en-US" sz="1100" dirty="0"/>
-          </a:p>
-          <a:p>
+              <a:t>Ni =  Specifies the optical density for the surface. Values = 0.001..10 (usually values are &gt;1.0)</a:t>
+            </a:r>
+          </a:p>
+          <a:p>
+            <a:pPr lvl="1"/>
+            <a:endParaRPr lang="en-US" dirty="0"/>
+          </a:p>
+          <a:p>
+            <a:pPr lvl="1"/>
+            <a:r>
+              <a:rPr lang="en-US" b="1" dirty="0"/>
+              <a:t>Note</a:t>
+            </a:r>
             <a:r>
               <a:rPr lang="en-US" dirty="0"/>
-              <a:t>3. All strings are US-ASCII</a:t>
+              <a:t>:</a:t>
+            </a:r>
+          </a:p>
+          <a:p>
+            <a:pPr lvl="1"/>
+            <a:r>
+              <a:rPr lang="en-US" dirty="0"/>
+              <a:t> - Ka - material ambient is multiplied by the texture value</a:t>
+            </a:r>
+          </a:p>
+          <a:p>
+            <a:pPr lvl="1"/>
+            <a:r>
+              <a:rPr lang="en-US" dirty="0"/>
+              <a:t> - </a:t>
+            </a:r>
+            <a:r>
+              <a:rPr lang="en-US" dirty="0" err="1"/>
+              <a:t>Kd</a:t>
+            </a:r>
+            <a:r>
+              <a:rPr lang="en-US" dirty="0"/>
+              <a:t> - material diffuse is multiplied by the texture value</a:t>
+            </a:r>
+          </a:p>
+          <a:p>
+            <a:pPr lvl="1"/>
+            <a:r>
+              <a:rPr lang="en-US" dirty="0"/>
+              <a:t> - Ks - material specular is multiplied by the texture value</a:t>
             </a:r>
           </a:p>
         </p:txBody>
@@ -4106,7 +4411,7 @@
     </p:spTree>
     <p:extLst>
       <p:ext uri="{BB962C8B-B14F-4D97-AF65-F5344CB8AC3E}">
-        <p14:creationId xmlns:p14="http://schemas.microsoft.com/office/powerpoint/2010/main" val="4179726180"/>
+        <p14:creationId xmlns:p14="http://schemas.microsoft.com/office/powerpoint/2010/main" val="2019959611"/>
       </p:ext>
     </p:extLst>
   </p:cSld>
@@ -4135,6 +4440,381 @@
       </p:grpSpPr>
       <p:sp>
         <p:nvSpPr>
+          <p:cNvPr id="4" name="Textfeld 3">
+            <a:extLst>
+              <a:ext uri="{FF2B5EF4-FFF2-40B4-BE49-F238E27FC236}">
+                <a16:creationId xmlns:a16="http://schemas.microsoft.com/office/drawing/2014/main" id="{1E6CB427-E49A-4BF4-9E5E-CD11C40C3810}"/>
+              </a:ext>
+            </a:extLst>
+          </p:cNvPr>
+          <p:cNvSpPr txBox="1"/>
+          <p:nvPr/>
+        </p:nvSpPr>
+        <p:spPr>
+          <a:xfrm>
+            <a:off x="243281" y="226503"/>
+            <a:ext cx="11862033" cy="369332"/>
+          </a:xfrm>
+          <a:prstGeom prst="rect">
+            <a:avLst/>
+          </a:prstGeom>
+          <a:noFill/>
+        </p:spPr>
+        <p:txBody>
+          <a:bodyPr wrap="square" rtlCol="0">
+            <a:spAutoFit/>
+          </a:bodyPr>
+          <a:lstStyle/>
+          <a:p>
+            <a:r>
+              <a:rPr lang="en-US" dirty="0"/>
+              <a:t>Known limitations:</a:t>
+            </a:r>
+          </a:p>
+        </p:txBody>
+      </p:sp>
+      <p:sp>
+        <p:nvSpPr>
+          <p:cNvPr id="23" name="Textfeld 22">
+            <a:extLst>
+              <a:ext uri="{FF2B5EF4-FFF2-40B4-BE49-F238E27FC236}">
+                <a16:creationId xmlns:a16="http://schemas.microsoft.com/office/drawing/2014/main" id="{D4EEA3AA-84FE-4E76-B685-386FFC9EF8BD}"/>
+              </a:ext>
+            </a:extLst>
+          </p:cNvPr>
+          <p:cNvSpPr txBox="1"/>
+          <p:nvPr/>
+        </p:nvSpPr>
+        <p:spPr>
+          <a:xfrm>
+            <a:off x="243281" y="595836"/>
+            <a:ext cx="11862033" cy="3447098"/>
+          </a:xfrm>
+          <a:prstGeom prst="rect">
+            <a:avLst/>
+          </a:prstGeom>
+          <a:noFill/>
+        </p:spPr>
+        <p:txBody>
+          <a:bodyPr wrap="square" rtlCol="0">
+            <a:spAutoFit/>
+          </a:bodyPr>
+          <a:lstStyle/>
+          <a:p>
+            <a:r>
+              <a:rPr lang="en-US" dirty="0"/>
+              <a:t>2. MTL structure: </a:t>
+            </a:r>
+            <a:r>
+              <a:rPr lang="en-US" i="1" dirty="0" err="1">
+                <a:solidFill>
+                  <a:srgbClr val="00B0F0"/>
+                </a:solidFill>
+              </a:rPr>
+              <a:t>map_ka</a:t>
+            </a:r>
+            <a:r>
+              <a:rPr lang="en-US" dirty="0"/>
+              <a:t>, </a:t>
+            </a:r>
+            <a:r>
+              <a:rPr lang="en-US" i="1" dirty="0" err="1">
+                <a:solidFill>
+                  <a:srgbClr val="00B0F0"/>
+                </a:solidFill>
+              </a:rPr>
+              <a:t>map_kd</a:t>
+            </a:r>
+            <a:r>
+              <a:rPr lang="en-US" i="1" dirty="0">
+                <a:solidFill>
+                  <a:srgbClr val="00B0F0"/>
+                </a:solidFill>
+              </a:rPr>
+              <a:t> </a:t>
+            </a:r>
+            <a:r>
+              <a:rPr lang="en-US" dirty="0"/>
+              <a:t>are supported without “options”:</a:t>
+            </a:r>
+            <a:br>
+              <a:rPr lang="en-US" dirty="0"/>
+            </a:br>
+            <a:r>
+              <a:rPr lang="en-US" dirty="0"/>
+              <a:t>Examples:</a:t>
+            </a:r>
+          </a:p>
+          <a:p>
+            <a:pPr marL="800100" lvl="1" indent="-342900">
+              <a:buFont typeface="Arial" panose="020B0604020202020204" pitchFamily="34" charset="0"/>
+              <a:buChar char="•"/>
+            </a:pPr>
+            <a:r>
+              <a:rPr lang="en-US" dirty="0">
+                <a:highlight>
+                  <a:srgbClr val="00FF00"/>
+                </a:highlight>
+              </a:rPr>
+              <a:t>OK</a:t>
+            </a:r>
+            <a:r>
+              <a:rPr lang="en-US" dirty="0"/>
+              <a:t> =&gt; “</a:t>
+            </a:r>
+            <a:r>
+              <a:rPr lang="en-US" i="1" dirty="0" err="1">
+                <a:solidFill>
+                  <a:schemeClr val="accent6"/>
+                </a:solidFill>
+              </a:rPr>
+              <a:t>map_Ka</a:t>
+            </a:r>
+            <a:r>
+              <a:rPr lang="en-US" i="1" dirty="0">
+                <a:solidFill>
+                  <a:schemeClr val="accent6"/>
+                </a:solidFill>
+              </a:rPr>
+              <a:t> mapfile.png</a:t>
+            </a:r>
+            <a:r>
+              <a:rPr lang="en-US" dirty="0"/>
+              <a:t>”</a:t>
+            </a:r>
+          </a:p>
+          <a:p>
+            <a:pPr marL="800100" lvl="1" indent="-342900">
+              <a:buFont typeface="Arial" panose="020B0604020202020204" pitchFamily="34" charset="0"/>
+              <a:buChar char="•"/>
+            </a:pPr>
+            <a:r>
+              <a:rPr lang="en-US" dirty="0">
+                <a:highlight>
+                  <a:srgbClr val="FF0000"/>
+                </a:highlight>
+              </a:rPr>
+              <a:t>NOK</a:t>
+            </a:r>
+            <a:r>
+              <a:rPr lang="en-US" dirty="0"/>
+              <a:t> =&gt; “</a:t>
+            </a:r>
+            <a:r>
+              <a:rPr lang="en-US" i="1" dirty="0" err="1">
+                <a:solidFill>
+                  <a:srgbClr val="FF0000"/>
+                </a:solidFill>
+              </a:rPr>
+              <a:t>map_Ka</a:t>
+            </a:r>
+            <a:r>
+              <a:rPr lang="en-US" i="1" dirty="0">
+                <a:solidFill>
+                  <a:srgbClr val="FF0000"/>
+                </a:solidFill>
+              </a:rPr>
+              <a:t> -s 1 1 1 -o 0 0 0 -mm 0 1 </a:t>
+            </a:r>
+            <a:r>
+              <a:rPr lang="en-US" i="1" dirty="0" err="1">
+                <a:solidFill>
+                  <a:srgbClr val="FF0000"/>
+                </a:solidFill>
+              </a:rPr>
+              <a:t>chrome.mpc</a:t>
+            </a:r>
+            <a:r>
+              <a:rPr lang="en-US" dirty="0"/>
+              <a:t>” (</a:t>
+            </a:r>
+            <a:r>
+              <a:rPr lang="en-US" u="sng" dirty="0"/>
+              <a:t>program will crash</a:t>
+            </a:r>
+            <a:r>
+              <a:rPr lang="en-US" dirty="0"/>
+              <a:t>!)</a:t>
+            </a:r>
+          </a:p>
+          <a:p>
+            <a:pPr marL="800100" lvl="1" indent="-342900">
+              <a:buFont typeface="Arial" panose="020B0604020202020204" pitchFamily="34" charset="0"/>
+              <a:buChar char="•"/>
+            </a:pPr>
+            <a:r>
+              <a:rPr lang="en-US" dirty="0"/>
+              <a:t>Options that are not supported (according to </a:t>
+            </a:r>
+            <a:r>
+              <a:rPr lang="en-US" dirty="0">
+                <a:hlinkClick r:id="rId2"/>
+              </a:rPr>
+              <a:t>http://paulbourke.net/dataformats/mtl/</a:t>
+            </a:r>
+            <a:r>
+              <a:rPr lang="en-US" dirty="0"/>
+              <a:t> )</a:t>
+            </a:r>
+          </a:p>
+          <a:p>
+            <a:pPr marL="1257300" lvl="2" indent="-342900">
+              <a:buFont typeface="Courier New" panose="02070309020205020404" pitchFamily="49" charset="0"/>
+              <a:buChar char="o"/>
+            </a:pPr>
+            <a:r>
+              <a:rPr lang="en-US" sz="1100" dirty="0"/>
+              <a:t>-</a:t>
+            </a:r>
+            <a:r>
+              <a:rPr lang="en-US" sz="1100" dirty="0" err="1"/>
+              <a:t>blendu</a:t>
+            </a:r>
+            <a:r>
+              <a:rPr lang="en-US" sz="1100" dirty="0"/>
+              <a:t> on | off</a:t>
+            </a:r>
+          </a:p>
+          <a:p>
+            <a:pPr marL="1257300" lvl="2" indent="-342900">
+              <a:buFont typeface="Courier New" panose="02070309020205020404" pitchFamily="49" charset="0"/>
+              <a:buChar char="o"/>
+            </a:pPr>
+            <a:r>
+              <a:rPr lang="en-US" sz="1100" dirty="0"/>
+              <a:t>-</a:t>
+            </a:r>
+            <a:r>
+              <a:rPr lang="en-US" sz="1100" dirty="0" err="1"/>
+              <a:t>blendv</a:t>
+            </a:r>
+            <a:r>
+              <a:rPr lang="en-US" sz="1100" dirty="0"/>
+              <a:t> on | off</a:t>
+            </a:r>
+          </a:p>
+          <a:p>
+            <a:pPr marL="1257300" lvl="2" indent="-342900">
+              <a:buFont typeface="Courier New" panose="02070309020205020404" pitchFamily="49" charset="0"/>
+              <a:buChar char="o"/>
+            </a:pPr>
+            <a:r>
+              <a:rPr lang="en-US" sz="1100" dirty="0"/>
+              <a:t>-cc on | off</a:t>
+            </a:r>
+          </a:p>
+          <a:p>
+            <a:pPr marL="1257300" lvl="2" indent="-342900">
+              <a:buFont typeface="Courier New" panose="02070309020205020404" pitchFamily="49" charset="0"/>
+              <a:buChar char="o"/>
+            </a:pPr>
+            <a:r>
+              <a:rPr lang="en-US" sz="1100" dirty="0"/>
+              <a:t>-clamp on | off</a:t>
+            </a:r>
+          </a:p>
+          <a:p>
+            <a:pPr marL="1257300" lvl="2" indent="-342900">
+              <a:buFont typeface="Courier New" panose="02070309020205020404" pitchFamily="49" charset="0"/>
+              <a:buChar char="o"/>
+            </a:pPr>
+            <a:r>
+              <a:rPr lang="en-US" sz="1100" dirty="0"/>
+              <a:t>-mm base gain</a:t>
+            </a:r>
+          </a:p>
+          <a:p>
+            <a:pPr marL="1257300" lvl="2" indent="-342900">
+              <a:buFont typeface="Courier New" panose="02070309020205020404" pitchFamily="49" charset="0"/>
+              <a:buChar char="o"/>
+            </a:pPr>
+            <a:r>
+              <a:rPr lang="en-US" sz="1100" dirty="0"/>
+              <a:t>-o u v w</a:t>
+            </a:r>
+          </a:p>
+          <a:p>
+            <a:pPr marL="1257300" lvl="2" indent="-342900">
+              <a:buFont typeface="Courier New" panose="02070309020205020404" pitchFamily="49" charset="0"/>
+              <a:buChar char="o"/>
+            </a:pPr>
+            <a:r>
+              <a:rPr lang="en-US" sz="1100" dirty="0"/>
+              <a:t>-s u v w</a:t>
+            </a:r>
+          </a:p>
+          <a:p>
+            <a:pPr marL="1257300" lvl="2" indent="-342900">
+              <a:buFont typeface="Courier New" panose="02070309020205020404" pitchFamily="49" charset="0"/>
+              <a:buChar char="o"/>
+            </a:pPr>
+            <a:r>
+              <a:rPr lang="en-US" sz="1100" dirty="0"/>
+              <a:t>-t u v w</a:t>
+            </a:r>
+          </a:p>
+          <a:p>
+            <a:pPr marL="1257300" lvl="2" indent="-342900">
+              <a:buFont typeface="Courier New" panose="02070309020205020404" pitchFamily="49" charset="0"/>
+              <a:buChar char="o"/>
+            </a:pPr>
+            <a:r>
+              <a:rPr lang="en-US" sz="1100" dirty="0"/>
+              <a:t>-</a:t>
+            </a:r>
+            <a:r>
+              <a:rPr lang="en-US" sz="1100" dirty="0" err="1"/>
+              <a:t>texres</a:t>
+            </a:r>
+            <a:r>
+              <a:rPr lang="en-US" sz="1100" dirty="0"/>
+              <a:t> value</a:t>
+            </a:r>
+            <a:br>
+              <a:rPr lang="en-US" sz="1100" dirty="0"/>
+            </a:br>
+            <a:endParaRPr lang="en-US" sz="1100" dirty="0"/>
+          </a:p>
+          <a:p>
+            <a:r>
+              <a:rPr lang="en-US" dirty="0"/>
+              <a:t>3. All strings are US-ASCII</a:t>
+            </a:r>
+          </a:p>
+        </p:txBody>
+      </p:sp>
+    </p:spTree>
+    <p:extLst>
+      <p:ext uri="{BB962C8B-B14F-4D97-AF65-F5344CB8AC3E}">
+        <p14:creationId xmlns:p14="http://schemas.microsoft.com/office/powerpoint/2010/main" val="4179726180"/>
+      </p:ext>
+    </p:extLst>
+  </p:cSld>
+  <p:clrMapOvr>
+    <a:masterClrMapping/>
+  </p:clrMapOvr>
+</p:sld>
+</file>
+
+<file path=ppt/slides/slide13.xml><?xml version="1.0" encoding="utf-8"?>
+<p:sld xmlns:a="http://schemas.openxmlformats.org/drawingml/2006/main" xmlns:r="http://schemas.openxmlformats.org/officeDocument/2006/relationships" xmlns:p="http://schemas.openxmlformats.org/presentationml/2006/main">
+  <p:cSld>
+    <p:spTree>
+      <p:nvGrpSpPr>
+        <p:cNvPr id="1" name=""/>
+        <p:cNvGrpSpPr/>
+        <p:nvPr/>
+      </p:nvGrpSpPr>
+      <p:grpSpPr>
+        <a:xfrm>
+          <a:off x="0" y="0"/>
+          <a:ext cx="0" cy="0"/>
+          <a:chOff x="0" y="0"/>
+          <a:chExt cx="0" cy="0"/>
+        </a:xfrm>
+      </p:grpSpPr>
+      <p:sp>
+        <p:nvSpPr>
           <p:cNvPr id="2" name="Titel 1">
             <a:extLst>
               <a:ext uri="{FF2B5EF4-FFF2-40B4-BE49-F238E27FC236}">
@@ -4222,7 +4902,7 @@
 </p:sld>
 </file>
 
-<file path=ppt/slides/slide13.xml><?xml version="1.0" encoding="utf-8"?>
+<file path=ppt/slides/slide14.xml><?xml version="1.0" encoding="utf-8"?>
 <p:sld xmlns:a="http://schemas.openxmlformats.org/drawingml/2006/main" xmlns:r="http://schemas.openxmlformats.org/officeDocument/2006/relationships" xmlns:p="http://schemas.openxmlformats.org/presentationml/2006/main">
   <p:cSld>
     <p:spTree>
@@ -4831,7 +5511,21 @@
             </a:pPr>
             <a:r>
               <a:rPr lang="en-US" sz="1800" dirty="0"/>
-              <a:t>How to export from Blender to OBJ </a:t>
+              <a:t>How to export from Blender to OBJ</a:t>
+            </a:r>
+          </a:p>
+          <a:p>
+            <a:pPr lvl="1"/>
+            <a:r>
+              <a:rPr lang="en-US" sz="1400" dirty="0"/>
+              <a:t>Known limitations of Blender</a:t>
+            </a:r>
+          </a:p>
+          <a:p>
+            <a:pPr lvl="1"/>
+            <a:r>
+              <a:rPr lang="en-US" sz="1400" dirty="0"/>
+              <a:t>Example of exporting settings </a:t>
             </a:r>
           </a:p>
           <a:p>
@@ -4943,90 +5637,15 @@
           <a:p>
             <a:r>
               <a:rPr lang="en-US" sz="1800" dirty="0"/>
-              <a:t>In order to have the OBJ and MTL files compatible with this parser you need to export from Blender with the triangulate faces option check!</a:t>
-            </a:r>
-          </a:p>
-        </p:txBody>
-      </p:sp>
-      <p:pic>
-        <p:nvPicPr>
-          <p:cNvPr id="4" name="Grafik 3">
-            <a:extLst>
-              <a:ext uri="{FF2B5EF4-FFF2-40B4-BE49-F238E27FC236}">
-                <a16:creationId xmlns:a16="http://schemas.microsoft.com/office/drawing/2014/main" id="{A491CDB6-37C0-461F-801D-933BC594B9AE}"/>
-              </a:ext>
-            </a:extLst>
-          </p:cNvPr>
-          <p:cNvPicPr>
-            <a:picLocks noChangeAspect="1"/>
-          </p:cNvPicPr>
-          <p:nvPr/>
-        </p:nvPicPr>
-        <p:blipFill>
-          <a:blip r:embed="rId2"/>
-          <a:stretch>
-            <a:fillRect/>
-          </a:stretch>
-        </p:blipFill>
-        <p:spPr>
-          <a:xfrm>
-            <a:off x="823344" y="1747008"/>
-            <a:ext cx="2324100" cy="2971800"/>
-          </a:xfrm>
-          <a:prstGeom prst="rect">
-            <a:avLst/>
-          </a:prstGeom>
-        </p:spPr>
-      </p:pic>
-      <p:sp>
-        <p:nvSpPr>
-          <p:cNvPr id="5" name="Ellipse 4">
-            <a:extLst>
-              <a:ext uri="{FF2B5EF4-FFF2-40B4-BE49-F238E27FC236}">
-                <a16:creationId xmlns:a16="http://schemas.microsoft.com/office/drawing/2014/main" id="{71A9AC74-6A57-4476-8ECA-A7B44754E26E}"/>
-              </a:ext>
-            </a:extLst>
-          </p:cNvPr>
-          <p:cNvSpPr/>
-          <p:nvPr/>
-        </p:nvSpPr>
-        <p:spPr>
-          <a:xfrm>
-            <a:off x="1578703" y="3531765"/>
-            <a:ext cx="1568741" cy="243281"/>
-          </a:xfrm>
-          <a:prstGeom prst="ellipse">
-            <a:avLst/>
-          </a:prstGeom>
-          <a:noFill/>
-          <a:ln>
-            <a:solidFill>
-              <a:srgbClr val="FF0000"/>
-            </a:solidFill>
-          </a:ln>
-        </p:spPr>
-        <p:style>
-          <a:lnRef idx="2">
-            <a:schemeClr val="accent1">
-              <a:shade val="50000"/>
-            </a:schemeClr>
-          </a:lnRef>
-          <a:fillRef idx="1">
-            <a:schemeClr val="accent1"/>
-          </a:fillRef>
-          <a:effectRef idx="0">
-            <a:schemeClr val="accent1"/>
-          </a:effectRef>
-          <a:fontRef idx="minor">
-            <a:schemeClr val="lt1"/>
-          </a:fontRef>
-        </p:style>
-        <p:txBody>
-          <a:bodyPr rtlCol="0" anchor="ctr"/>
-          <a:lstStyle/>
-          <a:p>
-            <a:pPr algn="ctr"/>
-            <a:endParaRPr lang="en-US"/>
+              <a:t>At this date [2021-10-06] the following limitations are known according to </a:t>
+            </a:r>
+            <a:br>
+              <a:rPr lang="en-US" sz="1800" dirty="0"/>
+            </a:br>
+            <a:r>
+              <a:rPr lang="en-US" sz="1800" dirty="0"/>
+              <a:t>https://docs.blender.org/manual/en/latest/addons/import_export/scene_obj.html?highlight=mtl</a:t>
+            </a:r>
           </a:p>
         </p:txBody>
       </p:sp>
@@ -5060,8 +5679,296 @@
           <a:p>
             <a:r>
               <a:rPr lang="en-US" dirty="0"/>
-              <a:t>How to export from Blender to OBJ </a:t>
-            </a:r>
+              <a:t>How to export from Blender to OBJ: Known limitations of Blender</a:t>
+            </a:r>
+          </a:p>
+        </p:txBody>
+      </p:sp>
+      <p:sp>
+        <p:nvSpPr>
+          <p:cNvPr id="2" name="Rechteck 1">
+            <a:extLst>
+              <a:ext uri="{FF2B5EF4-FFF2-40B4-BE49-F238E27FC236}">
+                <a16:creationId xmlns:a16="http://schemas.microsoft.com/office/drawing/2014/main" id="{47357A42-4F35-45A5-A5DB-37521A6EEDAC}"/>
+              </a:ext>
+            </a:extLst>
+          </p:cNvPr>
+          <p:cNvSpPr/>
+          <p:nvPr/>
+        </p:nvSpPr>
+        <p:spPr>
+          <a:xfrm>
+            <a:off x="594920" y="1645502"/>
+            <a:ext cx="10515600" cy="4524315"/>
+          </a:xfrm>
+          <a:prstGeom prst="rect">
+            <a:avLst/>
+          </a:prstGeom>
+        </p:spPr>
+        <p:txBody>
+          <a:bodyPr wrap="square">
+            <a:spAutoFit/>
+          </a:bodyPr>
+          <a:lstStyle/>
+          <a:p>
+            <a:r>
+              <a:rPr lang="en-US" i="1" dirty="0">
+                <a:solidFill>
+                  <a:schemeClr val="accent1"/>
+                </a:solidFill>
+                <a:latin typeface="Lato"/>
+              </a:rPr>
+              <a:t>The OBJ format is a popular plain text format, however, it has only basic geometry and material support.</a:t>
+            </a:r>
+          </a:p>
+          <a:p>
+            <a:r>
+              <a:rPr lang="en-US" i="1" dirty="0">
+                <a:solidFill>
+                  <a:schemeClr val="accent1"/>
+                </a:solidFill>
+                <a:latin typeface="Lato"/>
+              </a:rPr>
+              <a:t>Mesh: vertices, faces, edges, </a:t>
+            </a:r>
+            <a:r>
+              <a:rPr lang="en-US" i="1" dirty="0" err="1">
+                <a:solidFill>
+                  <a:schemeClr val="accent1"/>
+                </a:solidFill>
+                <a:latin typeface="Lato"/>
+              </a:rPr>
+              <a:t>normals</a:t>
+            </a:r>
+            <a:r>
+              <a:rPr lang="en-US" i="1" dirty="0">
+                <a:solidFill>
+                  <a:schemeClr val="accent1"/>
+                </a:solidFill>
+                <a:latin typeface="Lato"/>
+              </a:rPr>
+              <a:t>, UVs</a:t>
+            </a:r>
+          </a:p>
+          <a:p>
+            <a:pPr marL="285750" indent="-285750">
+              <a:buFont typeface="Arial" panose="020B0604020202020204" pitchFamily="34" charset="0"/>
+              <a:buChar char="•"/>
+            </a:pPr>
+            <a:r>
+              <a:rPr lang="en-US" i="1" dirty="0">
+                <a:solidFill>
+                  <a:schemeClr val="accent1"/>
+                </a:solidFill>
+                <a:latin typeface="Lato"/>
+              </a:rPr>
+              <a:t>Separation by groups/objects</a:t>
+            </a:r>
+          </a:p>
+          <a:p>
+            <a:pPr marL="285750" indent="-285750">
+              <a:buFont typeface="Arial" panose="020B0604020202020204" pitchFamily="34" charset="0"/>
+              <a:buChar char="•"/>
+            </a:pPr>
+            <a:r>
+              <a:rPr lang="en-US" i="1" dirty="0">
+                <a:solidFill>
+                  <a:schemeClr val="accent1"/>
+                </a:solidFill>
+                <a:latin typeface="Lato"/>
+              </a:rPr>
+              <a:t>Materials/textures</a:t>
+            </a:r>
+          </a:p>
+          <a:p>
+            <a:pPr marL="285750" indent="-285750">
+              <a:buFont typeface="Arial" panose="020B0604020202020204" pitchFamily="34" charset="0"/>
+              <a:buChar char="•"/>
+            </a:pPr>
+            <a:r>
+              <a:rPr lang="en-US" i="1" dirty="0">
+                <a:solidFill>
+                  <a:schemeClr val="accent1"/>
+                </a:solidFill>
+                <a:latin typeface="Lato"/>
+              </a:rPr>
+              <a:t>NURBS curves and surfaces</a:t>
+            </a:r>
+          </a:p>
+          <a:p>
+            <a:endParaRPr lang="en-US" i="1" dirty="0">
+              <a:solidFill>
+                <a:schemeClr val="accent1"/>
+              </a:solidFill>
+              <a:latin typeface="Lato"/>
+            </a:endParaRPr>
+          </a:p>
+          <a:p>
+            <a:r>
+              <a:rPr lang="en-US" b="1" i="1" u="sng" dirty="0">
+                <a:solidFill>
+                  <a:schemeClr val="accent1"/>
+                </a:solidFill>
+                <a:latin typeface="inherit"/>
+              </a:rPr>
+              <a:t>Note</a:t>
+            </a:r>
+          </a:p>
+          <a:p>
+            <a:r>
+              <a:rPr lang="en-US" i="1" dirty="0">
+                <a:solidFill>
+                  <a:schemeClr val="accent1"/>
+                </a:solidFill>
+                <a:latin typeface="Lato"/>
+              </a:rPr>
+              <a:t>There is </a:t>
+            </a:r>
+            <a:r>
+              <a:rPr lang="en-US" b="1" i="1" u="sng" dirty="0">
+                <a:solidFill>
+                  <a:srgbClr val="FF0000"/>
+                </a:solidFill>
+                <a:latin typeface="Lato"/>
+              </a:rPr>
+              <a:t>no support</a:t>
+            </a:r>
+            <a:r>
+              <a:rPr lang="en-US" i="1" dirty="0">
+                <a:solidFill>
+                  <a:schemeClr val="accent1"/>
+                </a:solidFill>
+                <a:latin typeface="Lato"/>
+              </a:rPr>
+              <a:t> for:</a:t>
+            </a:r>
+          </a:p>
+          <a:p>
+            <a:pPr marL="285750" indent="-285750">
+              <a:buFontTx/>
+              <a:buChar char="-"/>
+            </a:pPr>
+            <a:r>
+              <a:rPr lang="en-US" i="1" dirty="0">
+                <a:solidFill>
+                  <a:schemeClr val="accent1"/>
+                </a:solidFill>
+                <a:latin typeface="Lato"/>
+              </a:rPr>
+              <a:t>Mesh vertex colors</a:t>
+            </a:r>
+          </a:p>
+          <a:p>
+            <a:pPr marL="285750" indent="-285750">
+              <a:buFontTx/>
+              <a:buChar char="-"/>
+            </a:pPr>
+            <a:r>
+              <a:rPr lang="en-US" i="1" dirty="0">
+                <a:solidFill>
+                  <a:schemeClr val="accent1"/>
+                </a:solidFill>
+                <a:latin typeface="Lato"/>
+              </a:rPr>
+              <a:t>Armatures</a:t>
+            </a:r>
+          </a:p>
+          <a:p>
+            <a:pPr marL="285750" indent="-285750">
+              <a:buFontTx/>
+              <a:buChar char="-"/>
+            </a:pPr>
+            <a:r>
+              <a:rPr lang="en-US" i="1" dirty="0">
+                <a:solidFill>
+                  <a:schemeClr val="accent1"/>
+                </a:solidFill>
+                <a:latin typeface="Lato"/>
+              </a:rPr>
+              <a:t>Animation</a:t>
+            </a:r>
+          </a:p>
+          <a:p>
+            <a:pPr marL="285750" indent="-285750">
+              <a:buFontTx/>
+              <a:buChar char="-"/>
+            </a:pPr>
+            <a:r>
+              <a:rPr lang="en-US" i="1" dirty="0">
+                <a:solidFill>
+                  <a:schemeClr val="accent1"/>
+                </a:solidFill>
+                <a:latin typeface="Lato"/>
+              </a:rPr>
+              <a:t>Lights</a:t>
+            </a:r>
+          </a:p>
+          <a:p>
+            <a:pPr marL="285750" indent="-285750">
+              <a:buFontTx/>
+              <a:buChar char="-"/>
+            </a:pPr>
+            <a:r>
+              <a:rPr lang="en-US" i="1" dirty="0">
+                <a:solidFill>
+                  <a:schemeClr val="accent1"/>
+                </a:solidFill>
+                <a:latin typeface="Lato"/>
+              </a:rPr>
+              <a:t>Cameras</a:t>
+            </a:r>
+          </a:p>
+          <a:p>
+            <a:pPr marL="285750" indent="-285750">
+              <a:buFontTx/>
+              <a:buChar char="-"/>
+            </a:pPr>
+            <a:r>
+              <a:rPr lang="en-US" i="1" dirty="0">
+                <a:solidFill>
+                  <a:schemeClr val="accent1"/>
+                </a:solidFill>
+                <a:latin typeface="Lato"/>
+              </a:rPr>
+              <a:t>Empty objects</a:t>
+            </a:r>
+          </a:p>
+          <a:p>
+            <a:pPr marL="285750" indent="-285750">
+              <a:buFontTx/>
+              <a:buChar char="-"/>
+            </a:pPr>
+            <a:r>
+              <a:rPr lang="en-US" i="1" dirty="0">
+                <a:solidFill>
+                  <a:schemeClr val="accent1"/>
+                </a:solidFill>
+                <a:latin typeface="Lato"/>
+              </a:rPr>
+              <a:t>Parenting</a:t>
+            </a:r>
+          </a:p>
+          <a:p>
+            <a:pPr marL="285750" indent="-285750">
+              <a:buFontTx/>
+              <a:buChar char="-"/>
+            </a:pPr>
+            <a:r>
+              <a:rPr lang="en-US" i="1" dirty="0">
+                <a:solidFill>
+                  <a:schemeClr val="accent1"/>
+                </a:solidFill>
+                <a:latin typeface="Lato"/>
+              </a:rPr>
+              <a:t>Transformations.</a:t>
+            </a:r>
+            <a:endParaRPr lang="en-US" b="0" i="1" dirty="0">
+              <a:solidFill>
+                <a:schemeClr val="accent1"/>
+              </a:solidFill>
+              <a:effectLst/>
+              <a:latin typeface="Lato"/>
+            </a:endParaRPr>
           </a:p>
         </p:txBody>
       </p:sp>
@@ -5097,6 +6004,188 @@
       </p:grpSpPr>
       <p:sp>
         <p:nvSpPr>
+          <p:cNvPr id="3" name="Inhaltsplatzhalter 2">
+            <a:extLst>
+              <a:ext uri="{FF2B5EF4-FFF2-40B4-BE49-F238E27FC236}">
+                <a16:creationId xmlns:a16="http://schemas.microsoft.com/office/drawing/2014/main" id="{E12BFFCF-2553-44E9-85A5-CBC26F036EFE}"/>
+              </a:ext>
+            </a:extLst>
+          </p:cNvPr>
+          <p:cNvSpPr>
+            <a:spLocks noGrp="1"/>
+          </p:cNvSpPr>
+          <p:nvPr>
+            <p:ph idx="1"/>
+          </p:nvPr>
+        </p:nvSpPr>
+        <p:spPr>
+          <a:xfrm>
+            <a:off x="594920" y="860892"/>
+            <a:ext cx="10515600" cy="686878"/>
+          </a:xfrm>
+        </p:spPr>
+        <p:txBody>
+          <a:bodyPr>
+            <a:normAutofit/>
+          </a:bodyPr>
+          <a:lstStyle/>
+          <a:p>
+            <a:r>
+              <a:rPr lang="en-US" sz="1800" dirty="0"/>
+              <a:t>In order to have the OBJ and MTL files compatible with this parser you need to export from Blender with the triangulate faces option check!</a:t>
+            </a:r>
+          </a:p>
+        </p:txBody>
+      </p:sp>
+      <p:pic>
+        <p:nvPicPr>
+          <p:cNvPr id="4" name="Grafik 3">
+            <a:extLst>
+              <a:ext uri="{FF2B5EF4-FFF2-40B4-BE49-F238E27FC236}">
+                <a16:creationId xmlns:a16="http://schemas.microsoft.com/office/drawing/2014/main" id="{A491CDB6-37C0-461F-801D-933BC594B9AE}"/>
+              </a:ext>
+            </a:extLst>
+          </p:cNvPr>
+          <p:cNvPicPr>
+            <a:picLocks noChangeAspect="1"/>
+          </p:cNvPicPr>
+          <p:nvPr/>
+        </p:nvPicPr>
+        <p:blipFill>
+          <a:blip r:embed="rId2"/>
+          <a:stretch>
+            <a:fillRect/>
+          </a:stretch>
+        </p:blipFill>
+        <p:spPr>
+          <a:xfrm>
+            <a:off x="823344" y="1747008"/>
+            <a:ext cx="2324100" cy="2971800"/>
+          </a:xfrm>
+          <a:prstGeom prst="rect">
+            <a:avLst/>
+          </a:prstGeom>
+        </p:spPr>
+      </p:pic>
+      <p:sp>
+        <p:nvSpPr>
+          <p:cNvPr id="5" name="Ellipse 4">
+            <a:extLst>
+              <a:ext uri="{FF2B5EF4-FFF2-40B4-BE49-F238E27FC236}">
+                <a16:creationId xmlns:a16="http://schemas.microsoft.com/office/drawing/2014/main" id="{71A9AC74-6A57-4476-8ECA-A7B44754E26E}"/>
+              </a:ext>
+            </a:extLst>
+          </p:cNvPr>
+          <p:cNvSpPr/>
+          <p:nvPr/>
+        </p:nvSpPr>
+        <p:spPr>
+          <a:xfrm>
+            <a:off x="1578703" y="3531765"/>
+            <a:ext cx="1568741" cy="243281"/>
+          </a:xfrm>
+          <a:prstGeom prst="ellipse">
+            <a:avLst/>
+          </a:prstGeom>
+          <a:noFill/>
+          <a:ln>
+            <a:solidFill>
+              <a:srgbClr val="FF0000"/>
+            </a:solidFill>
+          </a:ln>
+        </p:spPr>
+        <p:style>
+          <a:lnRef idx="2">
+            <a:schemeClr val="accent1">
+              <a:shade val="50000"/>
+            </a:schemeClr>
+          </a:lnRef>
+          <a:fillRef idx="1">
+            <a:schemeClr val="accent1"/>
+          </a:fillRef>
+          <a:effectRef idx="0">
+            <a:schemeClr val="accent1"/>
+          </a:effectRef>
+          <a:fontRef idx="minor">
+            <a:schemeClr val="lt1"/>
+          </a:fontRef>
+        </p:style>
+        <p:txBody>
+          <a:bodyPr rtlCol="0" anchor="ctr"/>
+          <a:lstStyle/>
+          <a:p>
+            <a:pPr algn="ctr"/>
+            <a:endParaRPr lang="en-US"/>
+          </a:p>
+        </p:txBody>
+      </p:sp>
+      <p:sp>
+        <p:nvSpPr>
+          <p:cNvPr id="8" name="Textfeld 7">
+            <a:extLst>
+              <a:ext uri="{FF2B5EF4-FFF2-40B4-BE49-F238E27FC236}">
+                <a16:creationId xmlns:a16="http://schemas.microsoft.com/office/drawing/2014/main" id="{81AA0259-175A-4E0B-9EA9-DC738E72723C}"/>
+              </a:ext>
+            </a:extLst>
+          </p:cNvPr>
+          <p:cNvSpPr txBox="1"/>
+          <p:nvPr/>
+        </p:nvSpPr>
+        <p:spPr>
+          <a:xfrm>
+            <a:off x="243281" y="226503"/>
+            <a:ext cx="11862033" cy="369332"/>
+          </a:xfrm>
+          <a:prstGeom prst="rect">
+            <a:avLst/>
+          </a:prstGeom>
+          <a:noFill/>
+        </p:spPr>
+        <p:txBody>
+          <a:bodyPr wrap="square" rtlCol="0">
+            <a:spAutoFit/>
+          </a:bodyPr>
+          <a:lstStyle/>
+          <a:p>
+            <a:r>
+              <a:rPr lang="en-US" dirty="0"/>
+              <a:t>How to export from Blender to OBJ: Example of exporting settings </a:t>
+            </a:r>
+          </a:p>
+        </p:txBody>
+      </p:sp>
+    </p:spTree>
+    <p:extLst>
+      <p:ext uri="{BB962C8B-B14F-4D97-AF65-F5344CB8AC3E}">
+        <p14:creationId xmlns:p14="http://schemas.microsoft.com/office/powerpoint/2010/main" val="994001078"/>
+      </p:ext>
+    </p:extLst>
+  </p:cSld>
+  <p:clrMapOvr>
+    <a:masterClrMapping/>
+  </p:clrMapOvr>
+</p:sld>
+</file>
+
+<file path=ppt/slides/slide6.xml><?xml version="1.0" encoding="utf-8"?>
+<p:sld xmlns:a="http://schemas.openxmlformats.org/drawingml/2006/main" xmlns:r="http://schemas.openxmlformats.org/officeDocument/2006/relationships" xmlns:p="http://schemas.openxmlformats.org/presentationml/2006/main">
+  <p:cSld>
+    <p:spTree>
+      <p:nvGrpSpPr>
+        <p:cNvPr id="1" name=""/>
+        <p:cNvGrpSpPr/>
+        <p:nvPr/>
+      </p:nvGrpSpPr>
+      <p:grpSpPr>
+        <a:xfrm>
+          <a:off x="0" y="0"/>
+          <a:ext cx="0" cy="0"/>
+          <a:chOff x="0" y="0"/>
+          <a:chExt cx="0" cy="0"/>
+        </a:xfrm>
+      </p:grpSpPr>
+      <p:sp>
+        <p:nvSpPr>
           <p:cNvPr id="4" name="Textfeld 3">
             <a:extLst>
               <a:ext uri="{FF2B5EF4-FFF2-40B4-BE49-F238E27FC236}">
@@ -5728,7 +6817,7 @@
 </p:sld>
 </file>
 
-<file path=ppt/slides/slide6.xml><?xml version="1.0" encoding="utf-8"?>
+<file path=ppt/slides/slide7.xml><?xml version="1.0" encoding="utf-8"?>
 <p:sld xmlns:a="http://schemas.openxmlformats.org/drawingml/2006/main" xmlns:r="http://schemas.openxmlformats.org/officeDocument/2006/relationships" xmlns:p="http://schemas.openxmlformats.org/presentationml/2006/main">
   <p:cSld>
     <p:spTree>
@@ -7087,7 +8176,7 @@
 </p:sld>
 </file>
 
-<file path=ppt/slides/slide7.xml><?xml version="1.0" encoding="utf-8"?>
+<file path=ppt/slides/slide8.xml><?xml version="1.0" encoding="utf-8"?>
 <p:sld xmlns:a="http://schemas.openxmlformats.org/drawingml/2006/main" xmlns:r="http://schemas.openxmlformats.org/officeDocument/2006/relationships" xmlns:p="http://schemas.openxmlformats.org/presentationml/2006/main">
   <p:cSld>
     <p:spTree>
@@ -8179,7 +9268,7 @@
         </p:nvCxnSpPr>
         <p:spPr>
           <a:xfrm>
-            <a:off x="501758" y="5678790"/>
+            <a:off x="501758" y="5829792"/>
             <a:ext cx="9986601" cy="0"/>
           </a:xfrm>
           <a:prstGeom prst="line">
@@ -8224,7 +9313,7 @@
         <p:spPr>
           <a:xfrm>
             <a:off x="755009" y="1227368"/>
-            <a:ext cx="0" cy="4631166"/>
+            <a:ext cx="0" cy="4896595"/>
           </a:xfrm>
           <a:prstGeom prst="straightConnector1">
             <a:avLst/>
@@ -9001,8 +10090,8 @@
         </p:nvSpPr>
         <p:spPr>
           <a:xfrm>
-            <a:off x="5962452" y="1250630"/>
-            <a:ext cx="3131199" cy="3942141"/>
+            <a:off x="5985418" y="1250630"/>
+            <a:ext cx="3108233" cy="4428150"/>
           </a:xfrm>
           <a:prstGeom prst="rightBrace">
             <a:avLst>
@@ -9213,6 +10302,184 @@
           </p:txBody>
         </p:sp>
       </p:grpSp>
+      <p:sp>
+        <p:nvSpPr>
+          <p:cNvPr id="48" name="Rechteck 47">
+            <a:extLst>
+              <a:ext uri="{FF2B5EF4-FFF2-40B4-BE49-F238E27FC236}">
+                <a16:creationId xmlns:a16="http://schemas.microsoft.com/office/drawing/2014/main" id="{32B105A8-8868-4AA5-9049-437CB592542D}"/>
+              </a:ext>
+            </a:extLst>
+          </p:cNvPr>
+          <p:cNvSpPr/>
+          <p:nvPr/>
+        </p:nvSpPr>
+        <p:spPr>
+          <a:xfrm>
+            <a:off x="1544440" y="5512218"/>
+            <a:ext cx="4411751" cy="249831"/>
+          </a:xfrm>
+          <a:prstGeom prst="rect">
+            <a:avLst/>
+          </a:prstGeom>
+        </p:spPr>
+        <p:style>
+          <a:lnRef idx="2">
+            <a:schemeClr val="accent1">
+              <a:shade val="50000"/>
+            </a:schemeClr>
+          </a:lnRef>
+          <a:fillRef idx="1">
+            <a:schemeClr val="accent1"/>
+          </a:fillRef>
+          <a:effectRef idx="0">
+            <a:schemeClr val="accent1"/>
+          </a:effectRef>
+          <a:fontRef idx="minor">
+            <a:schemeClr val="lt1"/>
+          </a:fontRef>
+        </p:style>
+        <p:txBody>
+          <a:bodyPr rtlCol="0" anchor="ctr"/>
+          <a:lstStyle/>
+          <a:p>
+            <a:pPr algn="ctr"/>
+            <a:r>
+              <a:rPr lang="en-US" sz="1000" dirty="0" err="1"/>
+              <a:t>Map_Bump</a:t>
+            </a:r>
+            <a:r>
+              <a:rPr lang="en-US" sz="1000" dirty="0"/>
+              <a:t> file name</a:t>
+            </a:r>
+          </a:p>
+          <a:p>
+            <a:pPr algn="ctr"/>
+            <a:r>
+              <a:rPr lang="en-US" sz="1000" dirty="0"/>
+              <a:t>&lt;array of signed chars&gt;</a:t>
+            </a:r>
+          </a:p>
+        </p:txBody>
+      </p:sp>
+      <p:sp>
+        <p:nvSpPr>
+          <p:cNvPr id="49" name="Rechteck 48">
+            <a:extLst>
+              <a:ext uri="{FF2B5EF4-FFF2-40B4-BE49-F238E27FC236}">
+                <a16:creationId xmlns:a16="http://schemas.microsoft.com/office/drawing/2014/main" id="{E50F0E61-E4DF-42DE-AAE3-213016EACD9E}"/>
+              </a:ext>
+            </a:extLst>
+          </p:cNvPr>
+          <p:cNvSpPr/>
+          <p:nvPr/>
+        </p:nvSpPr>
+        <p:spPr>
+          <a:xfrm>
+            <a:off x="1544440" y="5512218"/>
+            <a:ext cx="692238" cy="249831"/>
+          </a:xfrm>
+          <a:prstGeom prst="rect">
+            <a:avLst/>
+          </a:prstGeom>
+          <a:solidFill>
+            <a:schemeClr val="accent2"/>
+          </a:solidFill>
+        </p:spPr>
+        <p:style>
+          <a:lnRef idx="2">
+            <a:schemeClr val="accent1">
+              <a:shade val="50000"/>
+            </a:schemeClr>
+          </a:lnRef>
+          <a:fillRef idx="1">
+            <a:schemeClr val="accent1"/>
+          </a:fillRef>
+          <a:effectRef idx="0">
+            <a:schemeClr val="accent1"/>
+          </a:effectRef>
+          <a:fontRef idx="minor">
+            <a:schemeClr val="lt1"/>
+          </a:fontRef>
+        </p:style>
+        <p:txBody>
+          <a:bodyPr rtlCol="0" anchor="ctr"/>
+          <a:lstStyle/>
+          <a:p>
+            <a:pPr algn="ctr"/>
+            <a:r>
+              <a:rPr lang="en-US" sz="800" dirty="0"/>
+              <a:t>No of chars</a:t>
+            </a:r>
+            <a:br>
+              <a:rPr lang="en-US" sz="800" dirty="0"/>
+            </a:br>
+            <a:r>
+              <a:rPr lang="en-US" sz="800" dirty="0"/>
+              <a:t>&lt;short&gt;</a:t>
+            </a:r>
+          </a:p>
+        </p:txBody>
+      </p:sp>
+      <p:sp>
+        <p:nvSpPr>
+          <p:cNvPr id="52" name="Rechteck 51">
+            <a:extLst>
+              <a:ext uri="{FF2B5EF4-FFF2-40B4-BE49-F238E27FC236}">
+                <a16:creationId xmlns:a16="http://schemas.microsoft.com/office/drawing/2014/main" id="{26A54F49-0F83-4450-AF11-909861DE3721}"/>
+              </a:ext>
+            </a:extLst>
+          </p:cNvPr>
+          <p:cNvSpPr/>
+          <p:nvPr/>
+        </p:nvSpPr>
+        <p:spPr>
+          <a:xfrm>
+            <a:off x="2243277" y="5512218"/>
+            <a:ext cx="692238" cy="249831"/>
+          </a:xfrm>
+          <a:prstGeom prst="rect">
+            <a:avLst/>
+          </a:prstGeom>
+          <a:solidFill>
+            <a:schemeClr val="accent2"/>
+          </a:solidFill>
+        </p:spPr>
+        <p:style>
+          <a:lnRef idx="2">
+            <a:schemeClr val="accent1">
+              <a:shade val="50000"/>
+            </a:schemeClr>
+          </a:lnRef>
+          <a:fillRef idx="1">
+            <a:schemeClr val="accent1"/>
+          </a:fillRef>
+          <a:effectRef idx="0">
+            <a:schemeClr val="accent1"/>
+          </a:effectRef>
+          <a:fontRef idx="minor">
+            <a:schemeClr val="lt1"/>
+          </a:fontRef>
+        </p:style>
+        <p:txBody>
+          <a:bodyPr rtlCol="0" anchor="ctr"/>
+          <a:lstStyle/>
+          <a:p>
+            <a:pPr algn="ctr"/>
+            <a:r>
+              <a:rPr lang="en-US" sz="800" dirty="0" err="1"/>
+              <a:t>bm</a:t>
+            </a:r>
+            <a:br>
+              <a:rPr lang="en-US" sz="800" dirty="0"/>
+            </a:br>
+            <a:r>
+              <a:rPr lang="en-US" sz="800" dirty="0"/>
+              <a:t>&lt;float&gt;</a:t>
+            </a:r>
+          </a:p>
+        </p:txBody>
+      </p:sp>
     </p:spTree>
     <p:extLst>
       <p:ext uri="{BB962C8B-B14F-4D97-AF65-F5344CB8AC3E}">
@@ -9226,7 +10493,7 @@
 </p:sld>
 </file>
 
-<file path=ppt/slides/slide8.xml><?xml version="1.0" encoding="utf-8"?>
+<file path=ppt/slides/slide9.xml><?xml version="1.0" encoding="utf-8"?>
 <p:sld xmlns:a="http://schemas.openxmlformats.org/drawingml/2006/main" xmlns:r="http://schemas.openxmlformats.org/officeDocument/2006/relationships" xmlns:p="http://schemas.openxmlformats.org/presentationml/2006/main">
   <p:cSld>
     <p:spTree>
@@ -10817,570 +12084,6 @@
     <p:extLst>
       <p:ext uri="{BB962C8B-B14F-4D97-AF65-F5344CB8AC3E}">
         <p14:creationId xmlns:p14="http://schemas.microsoft.com/office/powerpoint/2010/main" val="228621640"/>
-      </p:ext>
-    </p:extLst>
-  </p:cSld>
-  <p:clrMapOvr>
-    <a:masterClrMapping/>
-  </p:clrMapOvr>
-</p:sld>
-</file>
-
-<file path=ppt/slides/slide9.xml><?xml version="1.0" encoding="utf-8"?>
-<p:sld xmlns:a="http://schemas.openxmlformats.org/drawingml/2006/main" xmlns:r="http://schemas.openxmlformats.org/officeDocument/2006/relationships" xmlns:p="http://schemas.openxmlformats.org/presentationml/2006/main">
-  <p:cSld>
-    <p:spTree>
-      <p:nvGrpSpPr>
-        <p:cNvPr id="1" name=""/>
-        <p:cNvGrpSpPr/>
-        <p:nvPr/>
-      </p:nvGrpSpPr>
-      <p:grpSpPr>
-        <a:xfrm>
-          <a:off x="0" y="0"/>
-          <a:ext cx="0" cy="0"/>
-          <a:chOff x="0" y="0"/>
-          <a:chExt cx="0" cy="0"/>
-        </a:xfrm>
-      </p:grpSpPr>
-      <p:sp>
-        <p:nvSpPr>
-          <p:cNvPr id="4" name="Textfeld 3">
-            <a:extLst>
-              <a:ext uri="{FF2B5EF4-FFF2-40B4-BE49-F238E27FC236}">
-                <a16:creationId xmlns:a16="http://schemas.microsoft.com/office/drawing/2014/main" id="{1E6CB427-E49A-4BF4-9E5E-CD11C40C3810}"/>
-              </a:ext>
-            </a:extLst>
-          </p:cNvPr>
-          <p:cNvSpPr txBox="1"/>
-          <p:nvPr/>
-        </p:nvSpPr>
-        <p:spPr>
-          <a:xfrm>
-            <a:off x="243281" y="226503"/>
-            <a:ext cx="11862033" cy="369332"/>
-          </a:xfrm>
-          <a:prstGeom prst="rect">
-            <a:avLst/>
-          </a:prstGeom>
-          <a:noFill/>
-        </p:spPr>
-        <p:txBody>
-          <a:bodyPr wrap="square" rtlCol="0">
-            <a:spAutoFit/>
-          </a:bodyPr>
-          <a:lstStyle/>
-          <a:p>
-            <a:r>
-              <a:rPr lang="en-US" dirty="0" err="1"/>
-              <a:t>Parametes</a:t>
-            </a:r>
-            <a:r>
-              <a:rPr lang="en-US" dirty="0"/>
-              <a:t> and known limitations:</a:t>
-            </a:r>
-          </a:p>
-        </p:txBody>
-      </p:sp>
-      <p:sp>
-        <p:nvSpPr>
-          <p:cNvPr id="23" name="Textfeld 22">
-            <a:extLst>
-              <a:ext uri="{FF2B5EF4-FFF2-40B4-BE49-F238E27FC236}">
-                <a16:creationId xmlns:a16="http://schemas.microsoft.com/office/drawing/2014/main" id="{D4EEA3AA-84FE-4E76-B685-386FFC9EF8BD}"/>
-              </a:ext>
-            </a:extLst>
-          </p:cNvPr>
-          <p:cNvSpPr txBox="1"/>
-          <p:nvPr/>
-        </p:nvSpPr>
-        <p:spPr>
-          <a:xfrm>
-            <a:off x="243281" y="595836"/>
-            <a:ext cx="11862033" cy="5632311"/>
-          </a:xfrm>
-          <a:prstGeom prst="rect">
-            <a:avLst/>
-          </a:prstGeom>
-          <a:noFill/>
-        </p:spPr>
-        <p:txBody>
-          <a:bodyPr wrap="square" rtlCol="0">
-            <a:spAutoFit/>
-          </a:bodyPr>
-          <a:lstStyle/>
-          <a:p>
-            <a:pPr marL="342900" indent="-342900">
-              <a:buFont typeface="+mj-lt"/>
-              <a:buAutoNum type="arabicPeriod"/>
-            </a:pPr>
-            <a:r>
-              <a:rPr lang="en-US" dirty="0"/>
-              <a:t>MTL parser</a:t>
-            </a:r>
-          </a:p>
-          <a:p>
-            <a:pPr marL="800100" lvl="1" indent="-342900">
-              <a:buFont typeface="Arial" panose="020B0604020202020204" pitchFamily="34" charset="0"/>
-              <a:buChar char="•"/>
-            </a:pPr>
-            <a:r>
-              <a:rPr lang="en-US" dirty="0"/>
-              <a:t>Ka = “ambient reflectivity” (material ambient is multiplied by the texture value)</a:t>
-            </a:r>
-          </a:p>
-          <a:p>
-            <a:pPr marL="1257300" lvl="2" indent="-342900">
-              <a:buFont typeface="Arial" panose="020B0604020202020204" pitchFamily="34" charset="0"/>
-              <a:buChar char="•"/>
-            </a:pPr>
-            <a:r>
-              <a:rPr lang="en-US" dirty="0"/>
-              <a:t>Only “</a:t>
-            </a:r>
-            <a:r>
-              <a:rPr lang="en-US" b="1" dirty="0">
-                <a:solidFill>
-                  <a:schemeClr val="accent1"/>
-                </a:solidFill>
-              </a:rPr>
-              <a:t>Ka</a:t>
-            </a:r>
-            <a:r>
-              <a:rPr lang="en-US" dirty="0">
-                <a:solidFill>
-                  <a:schemeClr val="accent1"/>
-                </a:solidFill>
-              </a:rPr>
-              <a:t> r g b</a:t>
-            </a:r>
-            <a:r>
-              <a:rPr lang="en-US" dirty="0"/>
-              <a:t>” is supported. Same for “</a:t>
-            </a:r>
-            <a:r>
-              <a:rPr lang="en-US" b="1" dirty="0" err="1">
-                <a:solidFill>
-                  <a:schemeClr val="accent1"/>
-                </a:solidFill>
-              </a:rPr>
-              <a:t>Kd</a:t>
-            </a:r>
-            <a:r>
-              <a:rPr lang="en-US" dirty="0"/>
-              <a:t>” and “</a:t>
-            </a:r>
-            <a:r>
-              <a:rPr lang="en-US" b="1" dirty="0">
-                <a:solidFill>
-                  <a:schemeClr val="accent1"/>
-                </a:solidFill>
-              </a:rPr>
-              <a:t>Ks</a:t>
-            </a:r>
-            <a:r>
-              <a:rPr lang="en-US" dirty="0"/>
-              <a:t>”</a:t>
-            </a:r>
-          </a:p>
-          <a:p>
-            <a:pPr marL="1714500" lvl="3" indent="-342900">
-              <a:buFont typeface="Arial" panose="020B0604020202020204" pitchFamily="34" charset="0"/>
-              <a:buChar char="•"/>
-            </a:pPr>
-            <a:r>
-              <a:rPr lang="en-US" dirty="0"/>
-              <a:t>Not supporting “</a:t>
-            </a:r>
-            <a:r>
-              <a:rPr lang="es-ES" dirty="0">
-                <a:solidFill>
-                  <a:srgbClr val="FF0000"/>
-                </a:solidFill>
-              </a:rPr>
-              <a:t>Ka spectral file.rfl factor</a:t>
-            </a:r>
-            <a:r>
-              <a:rPr lang="es-ES" dirty="0"/>
-              <a:t>” </a:t>
-            </a:r>
-          </a:p>
-          <a:p>
-            <a:pPr marL="1714500" lvl="3" indent="-342900">
-              <a:buFont typeface="Arial" panose="020B0604020202020204" pitchFamily="34" charset="0"/>
-              <a:buChar char="•"/>
-            </a:pPr>
-            <a:r>
-              <a:rPr lang="en-US" dirty="0"/>
-              <a:t>Not supporting “</a:t>
-            </a:r>
-            <a:r>
-              <a:rPr lang="es-ES" dirty="0">
-                <a:solidFill>
-                  <a:srgbClr val="FF0000"/>
-                </a:solidFill>
-              </a:rPr>
-              <a:t>Ka xyz x y z</a:t>
-            </a:r>
-            <a:r>
-              <a:rPr lang="en-US" dirty="0"/>
-              <a:t>”</a:t>
-            </a:r>
-          </a:p>
-          <a:p>
-            <a:pPr marL="1257300" lvl="2" indent="-342900">
-              <a:buFont typeface="Arial" panose="020B0604020202020204" pitchFamily="34" charset="0"/>
-              <a:buChar char="•"/>
-            </a:pPr>
-            <a:r>
-              <a:rPr lang="en-US" dirty="0" err="1"/>
-              <a:t>map_Ka</a:t>
-            </a:r>
-            <a:r>
-              <a:rPr lang="en-US" dirty="0"/>
-              <a:t> (</a:t>
-            </a:r>
-            <a:r>
-              <a:rPr lang="en-US" dirty="0">
-                <a:solidFill>
-                  <a:srgbClr val="FF0000"/>
-                </a:solidFill>
-              </a:rPr>
-              <a:t>!! see “</a:t>
-            </a:r>
-            <a:r>
-              <a:rPr lang="en-US" i="1" dirty="0">
-                <a:solidFill>
-                  <a:srgbClr val="00B0F0"/>
-                </a:solidFill>
-              </a:rPr>
-              <a:t>2. MTL structure</a:t>
-            </a:r>
-            <a:r>
-              <a:rPr lang="en-US" dirty="0">
-                <a:solidFill>
-                  <a:srgbClr val="FF0000"/>
-                </a:solidFill>
-              </a:rPr>
-              <a:t>” for limitations !!</a:t>
-            </a:r>
-            <a:r>
-              <a:rPr lang="en-US" dirty="0"/>
-              <a:t>)</a:t>
-            </a:r>
-          </a:p>
-          <a:p>
-            <a:pPr marL="1714500" lvl="3" indent="-342900">
-              <a:buFont typeface="Arial" panose="020B0604020202020204" pitchFamily="34" charset="0"/>
-              <a:buChar char="•"/>
-            </a:pPr>
-            <a:r>
-              <a:rPr lang="en-US" dirty="0"/>
-              <a:t>Specifies that a color texture file or a color procedural texture file is applied to the ambient reflectivity of the material.  During rendering, the "</a:t>
-            </a:r>
-            <a:r>
-              <a:rPr lang="en-US" dirty="0" err="1"/>
-              <a:t>map_Ka</a:t>
-            </a:r>
-            <a:r>
-              <a:rPr lang="en-US" dirty="0"/>
-              <a:t>" value is multiplied by the "Ka" value.</a:t>
-            </a:r>
-          </a:p>
-          <a:p>
-            <a:pPr marL="800100" lvl="1" indent="-342900">
-              <a:buFont typeface="Arial" panose="020B0604020202020204" pitchFamily="34" charset="0"/>
-              <a:buChar char="•"/>
-            </a:pPr>
-            <a:r>
-              <a:rPr lang="en-US" dirty="0"/>
-              <a:t>Ks = “specular reflectivity”</a:t>
-            </a:r>
-          </a:p>
-          <a:p>
-            <a:pPr marL="1257300" lvl="2" indent="-342900">
-              <a:buFont typeface="Arial" panose="020B0604020202020204" pitchFamily="34" charset="0"/>
-              <a:buChar char="•"/>
-            </a:pPr>
-            <a:r>
-              <a:rPr lang="en-US" dirty="0" err="1"/>
-              <a:t>map_Ks</a:t>
-            </a:r>
-            <a:r>
-              <a:rPr lang="en-US" dirty="0"/>
-              <a:t> (</a:t>
-            </a:r>
-            <a:r>
-              <a:rPr lang="en-US" dirty="0">
-                <a:solidFill>
-                  <a:srgbClr val="FF0000"/>
-                </a:solidFill>
-              </a:rPr>
-              <a:t>!! see “</a:t>
-            </a:r>
-            <a:r>
-              <a:rPr lang="en-US" i="1" dirty="0">
-                <a:solidFill>
-                  <a:srgbClr val="00B0F0"/>
-                </a:solidFill>
-              </a:rPr>
-              <a:t>2. MTL structure</a:t>
-            </a:r>
-            <a:r>
-              <a:rPr lang="en-US" dirty="0">
-                <a:solidFill>
-                  <a:srgbClr val="FF0000"/>
-                </a:solidFill>
-              </a:rPr>
-              <a:t>” for limitations !!</a:t>
-            </a:r>
-            <a:r>
-              <a:rPr lang="en-US" dirty="0"/>
-              <a:t>)</a:t>
-            </a:r>
-          </a:p>
-          <a:p>
-            <a:pPr marL="1714500" lvl="3" indent="-342900">
-              <a:buFont typeface="Arial" panose="020B0604020202020204" pitchFamily="34" charset="0"/>
-              <a:buChar char="•"/>
-            </a:pPr>
-            <a:r>
-              <a:rPr lang="en-US" dirty="0"/>
-              <a:t>specular reflectivity of the material (value is multiplied by the "Ks" value)</a:t>
-            </a:r>
-          </a:p>
-          <a:p>
-            <a:pPr marL="800100" lvl="1" indent="-342900">
-              <a:buFont typeface="Arial" panose="020B0604020202020204" pitchFamily="34" charset="0"/>
-              <a:buChar char="•"/>
-            </a:pPr>
-            <a:r>
-              <a:rPr lang="en-US" dirty="0" err="1"/>
-              <a:t>Kd</a:t>
-            </a:r>
-            <a:r>
-              <a:rPr lang="en-US" dirty="0"/>
-              <a:t> = “diffuse reflectivity”</a:t>
-            </a:r>
-          </a:p>
-          <a:p>
-            <a:pPr marL="1257300" lvl="2" indent="-342900">
-              <a:buFont typeface="Arial" panose="020B0604020202020204" pitchFamily="34" charset="0"/>
-              <a:buChar char="•"/>
-            </a:pPr>
-            <a:r>
-              <a:rPr lang="en-US" dirty="0" err="1"/>
-              <a:t>map_Kd</a:t>
-            </a:r>
-            <a:r>
-              <a:rPr lang="en-US" dirty="0"/>
-              <a:t> (</a:t>
-            </a:r>
-            <a:r>
-              <a:rPr lang="en-US" dirty="0">
-                <a:solidFill>
-                  <a:srgbClr val="FF0000"/>
-                </a:solidFill>
-              </a:rPr>
-              <a:t>!! see “</a:t>
-            </a:r>
-            <a:r>
-              <a:rPr lang="en-US" i="1" dirty="0">
-                <a:solidFill>
-                  <a:srgbClr val="00B0F0"/>
-                </a:solidFill>
-              </a:rPr>
-              <a:t>2. MTL structure</a:t>
-            </a:r>
-            <a:r>
-              <a:rPr lang="en-US" dirty="0">
-                <a:solidFill>
-                  <a:srgbClr val="FF0000"/>
-                </a:solidFill>
-              </a:rPr>
-              <a:t>” for limitations !!</a:t>
-            </a:r>
-            <a:r>
-              <a:rPr lang="en-US" dirty="0"/>
-              <a:t>)</a:t>
-            </a:r>
-          </a:p>
-          <a:p>
-            <a:pPr marL="1714500" lvl="3" indent="-342900">
-              <a:buFont typeface="Arial" panose="020B0604020202020204" pitchFamily="34" charset="0"/>
-              <a:buChar char="•"/>
-            </a:pPr>
-            <a:r>
-              <a:rPr lang="en-US" dirty="0"/>
-              <a:t>diffuse reflectivity of the material (value is multiplied by the "</a:t>
-            </a:r>
-            <a:r>
-              <a:rPr lang="en-US" dirty="0" err="1"/>
-              <a:t>Kd</a:t>
-            </a:r>
-            <a:r>
-              <a:rPr lang="en-US" dirty="0"/>
-              <a:t>" value)</a:t>
-            </a:r>
-          </a:p>
-          <a:p>
-            <a:pPr marL="800100" lvl="1" indent="-342900">
-              <a:buFont typeface="Arial" panose="020B0604020202020204" pitchFamily="34" charset="0"/>
-              <a:buChar char="•"/>
-            </a:pPr>
-            <a:r>
-              <a:rPr lang="en-US" dirty="0" err="1">
-                <a:highlight>
-                  <a:srgbClr val="FFFF00"/>
-                </a:highlight>
-              </a:rPr>
-              <a:t>Ke</a:t>
-            </a:r>
-            <a:r>
-              <a:rPr lang="en-US" dirty="0">
-                <a:highlight>
-                  <a:srgbClr val="FFFF00"/>
-                </a:highlight>
-              </a:rPr>
-              <a:t>= “emissive  </a:t>
-            </a:r>
-            <a:r>
-              <a:rPr lang="en-US" dirty="0" err="1">
-                <a:highlight>
-                  <a:srgbClr val="FFFF00"/>
-                </a:highlight>
-              </a:rPr>
-              <a:t>coeficient</a:t>
-            </a:r>
-            <a:r>
-              <a:rPr lang="en-US" dirty="0">
-                <a:highlight>
-                  <a:srgbClr val="FFFF00"/>
-                </a:highlight>
-              </a:rPr>
-              <a:t>”</a:t>
-            </a:r>
-          </a:p>
-          <a:p>
-            <a:pPr marL="1257300" lvl="2" indent="-342900">
-              <a:buFont typeface="Arial" panose="020B0604020202020204" pitchFamily="34" charset="0"/>
-              <a:buChar char="•"/>
-            </a:pPr>
-            <a:r>
-              <a:rPr lang="en-US" dirty="0">
-                <a:highlight>
-                  <a:srgbClr val="FFFF00"/>
-                </a:highlight>
-              </a:rPr>
-              <a:t>It goes together with ambient, diffuse and specular and represents the amount of light emitted by the material. If you also have a defined emission color the material will irradiate light.</a:t>
-            </a:r>
-          </a:p>
-          <a:p>
-            <a:pPr marL="1257300" lvl="2" indent="-342900">
-              <a:buFont typeface="Arial" panose="020B0604020202020204" pitchFamily="34" charset="0"/>
-              <a:buChar char="•"/>
-            </a:pPr>
-            <a:r>
-              <a:rPr lang="en-US" dirty="0" err="1">
-                <a:highlight>
-                  <a:srgbClr val="FFFF00"/>
-                </a:highlight>
-              </a:rPr>
-              <a:t>map_Ke</a:t>
-            </a:r>
-            <a:r>
-              <a:rPr lang="en-US" dirty="0">
-                <a:highlight>
-                  <a:srgbClr val="FFFF00"/>
-                </a:highlight>
-              </a:rPr>
-              <a:t> (</a:t>
-            </a:r>
-            <a:r>
-              <a:rPr lang="en-US" dirty="0">
-                <a:solidFill>
-                  <a:srgbClr val="FF0000"/>
-                </a:solidFill>
-                <a:highlight>
-                  <a:srgbClr val="FFFF00"/>
-                </a:highlight>
-              </a:rPr>
-              <a:t>!! see “</a:t>
-            </a:r>
-            <a:r>
-              <a:rPr lang="en-US" i="1" dirty="0">
-                <a:solidFill>
-                  <a:srgbClr val="00B0F0"/>
-                </a:solidFill>
-                <a:highlight>
-                  <a:srgbClr val="FFFF00"/>
-                </a:highlight>
-              </a:rPr>
-              <a:t>2. MTL structure</a:t>
-            </a:r>
-            <a:r>
-              <a:rPr lang="en-US" dirty="0">
-                <a:solidFill>
-                  <a:srgbClr val="FF0000"/>
-                </a:solidFill>
-                <a:highlight>
-                  <a:srgbClr val="FFFF00"/>
-                </a:highlight>
-              </a:rPr>
-              <a:t>” for limitations !!</a:t>
-            </a:r>
-            <a:r>
-              <a:rPr lang="en-US" dirty="0">
-                <a:highlight>
-                  <a:srgbClr val="FFFF00"/>
-                </a:highlight>
-              </a:rPr>
-              <a:t>)</a:t>
-            </a:r>
-          </a:p>
-          <a:p>
-            <a:pPr marL="1714500" lvl="3" indent="-342900">
-              <a:buFont typeface="Arial" panose="020B0604020202020204" pitchFamily="34" charset="0"/>
-              <a:buChar char="•"/>
-            </a:pPr>
-            <a:r>
-              <a:rPr lang="en-US" dirty="0">
-                <a:highlight>
-                  <a:srgbClr val="FFFF00"/>
-                </a:highlight>
-              </a:rPr>
-              <a:t>diffuse reflectivity of the material (value is multiplied by the "</a:t>
-            </a:r>
-            <a:r>
-              <a:rPr lang="en-US" dirty="0" err="1">
-                <a:highlight>
-                  <a:srgbClr val="FFFF00"/>
-                </a:highlight>
-              </a:rPr>
-              <a:t>Ke</a:t>
-            </a:r>
-            <a:r>
-              <a:rPr lang="en-US" dirty="0">
-                <a:highlight>
-                  <a:srgbClr val="FFFF00"/>
-                </a:highlight>
-              </a:rPr>
-              <a:t>" value)</a:t>
-            </a:r>
-          </a:p>
-          <a:p>
-            <a:pPr marL="800100" lvl="1" indent="-342900">
-              <a:buFont typeface="Arial" panose="020B0604020202020204" pitchFamily="34" charset="0"/>
-              <a:buChar char="•"/>
-            </a:pPr>
-            <a:endParaRPr lang="en-US" dirty="0"/>
-          </a:p>
-        </p:txBody>
-      </p:sp>
-    </p:spTree>
-    <p:extLst>
-      <p:ext uri="{BB962C8B-B14F-4D97-AF65-F5344CB8AC3E}">
-        <p14:creationId xmlns:p14="http://schemas.microsoft.com/office/powerpoint/2010/main" val="1691624654"/>
       </p:ext>
     </p:extLst>
   </p:cSld>

</xml_diff>

<commit_message>
fix an issue with the case the program is call without any parameters
</commit_message>
<xml_diff>
--- a/docs/OBJ to binary structure_20210611_V1.1.pptx
+++ b/docs/OBJ to binary structure_20210611_V1.1.pptx
@@ -4029,20 +4029,12 @@
               <a:t>bm</a:t>
             </a:r>
             <a:r>
-              <a:rPr lang="en-US">
-                <a:solidFill>
-                  <a:prstClr val="black"/>
-                </a:solidFill>
-              </a:rPr>
-              <a:t> </a:t>
-            </a:r>
-            <a:r>
               <a:rPr lang="en-US" dirty="0">
                 <a:solidFill>
                   <a:prstClr val="black"/>
                 </a:solidFill>
               </a:rPr>
-              <a:t>= float [0.0…1.0]</a:t>
+              <a:t> = float [0.0…1.0]</a:t>
             </a:r>
           </a:p>
           <a:p>
@@ -10090,8 +10082,8 @@
         </p:nvSpPr>
         <p:spPr>
           <a:xfrm>
-            <a:off x="5985418" y="1250630"/>
-            <a:ext cx="3108233" cy="4428150"/>
+            <a:off x="5985418" y="1250629"/>
+            <a:ext cx="3108233" cy="4579155"/>
           </a:xfrm>
           <a:prstGeom prst="rightBrace">
             <a:avLst>
@@ -10435,7 +10427,7 @@
         </p:nvSpPr>
         <p:spPr>
           <a:xfrm>
-            <a:off x="2243277" y="5512218"/>
+            <a:off x="5978481" y="5512218"/>
             <a:ext cx="692238" cy="249831"/>
           </a:xfrm>
           <a:prstGeom prst="rect">

</xml_diff>